<commit_message>
dopisana kapitola o ide
</commit_message>
<xml_diff>
--- a/seminare/diplomovy-seminar-1/pics/DiplomovkaSchemy.pptx
+++ b/seminare/diplomovy-seminar-1/pics/DiplomovkaSchemy.pptx
@@ -8,6 +8,8 @@
     <p:sldId id="256" r:id="rId2"/>
     <p:sldId id="257" r:id="rId3"/>
     <p:sldId id="258" r:id="rId4"/>
+    <p:sldId id="259" r:id="rId5"/>
+    <p:sldId id="260" r:id="rId6"/>
   </p:sldIdLst>
   <p:sldSz cx="12192000" cy="6858000"/>
   <p:notesSz cx="6858000" cy="9144000"/>
@@ -245,7 +247,7 @@
           <a:p>
             <a:fld id="{F8CAFAE9-194C-4790-A945-25BD67049D41}" type="datetimeFigureOut">
               <a:rPr lang="sk-SK" smtClean="0"/>
-              <a:t>25. 03. 2018</a:t>
+              <a:t>26. 03. 2018</a:t>
             </a:fld>
             <a:endParaRPr lang="sk-SK"/>
           </a:p>
@@ -415,7 +417,7 @@
           <a:p>
             <a:fld id="{F8CAFAE9-194C-4790-A945-25BD67049D41}" type="datetimeFigureOut">
               <a:rPr lang="sk-SK" smtClean="0"/>
-              <a:t>25. 03. 2018</a:t>
+              <a:t>26. 03. 2018</a:t>
             </a:fld>
             <a:endParaRPr lang="sk-SK"/>
           </a:p>
@@ -595,7 +597,7 @@
           <a:p>
             <a:fld id="{F8CAFAE9-194C-4790-A945-25BD67049D41}" type="datetimeFigureOut">
               <a:rPr lang="sk-SK" smtClean="0"/>
-              <a:t>25. 03. 2018</a:t>
+              <a:t>26. 03. 2018</a:t>
             </a:fld>
             <a:endParaRPr lang="sk-SK"/>
           </a:p>
@@ -765,7 +767,7 @@
           <a:p>
             <a:fld id="{F8CAFAE9-194C-4790-A945-25BD67049D41}" type="datetimeFigureOut">
               <a:rPr lang="sk-SK" smtClean="0"/>
-              <a:t>25. 03. 2018</a:t>
+              <a:t>26. 03. 2018</a:t>
             </a:fld>
             <a:endParaRPr lang="sk-SK"/>
           </a:p>
@@ -1011,7 +1013,7 @@
           <a:p>
             <a:fld id="{F8CAFAE9-194C-4790-A945-25BD67049D41}" type="datetimeFigureOut">
               <a:rPr lang="sk-SK" smtClean="0"/>
-              <a:t>25. 03. 2018</a:t>
+              <a:t>26. 03. 2018</a:t>
             </a:fld>
             <a:endParaRPr lang="sk-SK"/>
           </a:p>
@@ -1243,7 +1245,7 @@
           <a:p>
             <a:fld id="{F8CAFAE9-194C-4790-A945-25BD67049D41}" type="datetimeFigureOut">
               <a:rPr lang="sk-SK" smtClean="0"/>
-              <a:t>25. 03. 2018</a:t>
+              <a:t>26. 03. 2018</a:t>
             </a:fld>
             <a:endParaRPr lang="sk-SK"/>
           </a:p>
@@ -1610,7 +1612,7 @@
           <a:p>
             <a:fld id="{F8CAFAE9-194C-4790-A945-25BD67049D41}" type="datetimeFigureOut">
               <a:rPr lang="sk-SK" smtClean="0"/>
-              <a:t>25. 03. 2018</a:t>
+              <a:t>26. 03. 2018</a:t>
             </a:fld>
             <a:endParaRPr lang="sk-SK"/>
           </a:p>
@@ -1728,7 +1730,7 @@
           <a:p>
             <a:fld id="{F8CAFAE9-194C-4790-A945-25BD67049D41}" type="datetimeFigureOut">
               <a:rPr lang="sk-SK" smtClean="0"/>
-              <a:t>25. 03. 2018</a:t>
+              <a:t>26. 03. 2018</a:t>
             </a:fld>
             <a:endParaRPr lang="sk-SK"/>
           </a:p>
@@ -1823,7 +1825,7 @@
           <a:p>
             <a:fld id="{F8CAFAE9-194C-4790-A945-25BD67049D41}" type="datetimeFigureOut">
               <a:rPr lang="sk-SK" smtClean="0"/>
-              <a:t>25. 03. 2018</a:t>
+              <a:t>26. 03. 2018</a:t>
             </a:fld>
             <a:endParaRPr lang="sk-SK"/>
           </a:p>
@@ -2100,7 +2102,7 @@
           <a:p>
             <a:fld id="{F8CAFAE9-194C-4790-A945-25BD67049D41}" type="datetimeFigureOut">
               <a:rPr lang="sk-SK" smtClean="0"/>
-              <a:t>25. 03. 2018</a:t>
+              <a:t>26. 03. 2018</a:t>
             </a:fld>
             <a:endParaRPr lang="sk-SK"/>
           </a:p>
@@ -2353,7 +2355,7 @@
           <a:p>
             <a:fld id="{F8CAFAE9-194C-4790-A945-25BD67049D41}" type="datetimeFigureOut">
               <a:rPr lang="sk-SK" smtClean="0"/>
-              <a:t>25. 03. 2018</a:t>
+              <a:t>26. 03. 2018</a:t>
             </a:fld>
             <a:endParaRPr lang="sk-SK"/>
           </a:p>
@@ -2566,7 +2568,7 @@
           <a:p>
             <a:fld id="{F8CAFAE9-194C-4790-A945-25BD67049D41}" type="datetimeFigureOut">
               <a:rPr lang="sk-SK" smtClean="0"/>
-              <a:t>25. 03. 2018</a:t>
+              <a:t>26. 03. 2018</a:t>
             </a:fld>
             <a:endParaRPr lang="sk-SK"/>
           </a:p>
@@ -4395,49 +4397,7 @@
                 <a:latin typeface="Courier New" panose="02070309020205020404" pitchFamily="49" charset="0"/>
                 <a:cs typeface="Courier New" panose="02070309020205020404" pitchFamily="49" charset="0"/>
               </a:rPr>
-              <a:t>DefaultMutableTreeNode rootTreeNode, </a:t>
-            </a:r>
-            <a:r>
-              <a:rPr kumimoji="0" lang="sk-SK" altLang="sk-SK" sz="1200" b="0" i="0" u="none" strike="noStrike" cap="none" normalizeH="0" baseline="0" noProof="1" smtClean="0">
-                <a:ln>
-                  <a:noFill/>
-                </a:ln>
-                <a:solidFill>
-                  <a:srgbClr val="000000"/>
-                </a:solidFill>
-                <a:effectLst/>
-                <a:latin typeface="Courier New" panose="02070309020205020404" pitchFamily="49" charset="0"/>
-                <a:cs typeface="Courier New" panose="02070309020205020404" pitchFamily="49" charset="0"/>
-              </a:rPr>
-              <a:t>treeNode</a:t>
-            </a:r>
-            <a:r>
-              <a:rPr kumimoji="0" lang="sk-SK" altLang="sk-SK" sz="1200" b="0" i="0" u="none" strike="noStrike" cap="none" normalizeH="0" baseline="0" noProof="1" smtClean="0">
-                <a:ln>
-                  <a:noFill/>
-                </a:ln>
-                <a:solidFill>
-                  <a:srgbClr val="000000"/>
-                </a:solidFill>
-                <a:effectLst/>
-                <a:latin typeface="Courier New" panose="02070309020205020404" pitchFamily="49" charset="0"/>
-                <a:cs typeface="Courier New" panose="02070309020205020404" pitchFamily="49" charset="0"/>
-              </a:rPr>
-              <a:t>;</a:t>
-            </a:r>
-            <a:r>
-              <a:rPr kumimoji="0" lang="sk-SK" altLang="sk-SK" sz="1200" b="0" i="0" u="none" strike="noStrike" cap="none" normalizeH="0" baseline="0" noProof="1" smtClean="0">
-                <a:ln>
-                  <a:noFill/>
-                </a:ln>
-                <a:solidFill>
-                  <a:srgbClr val="000000"/>
-                </a:solidFill>
-                <a:effectLst/>
-                <a:latin typeface="Courier New" panose="02070309020205020404" pitchFamily="49" charset="0"/>
-                <a:cs typeface="Courier New" panose="02070309020205020404" pitchFamily="49" charset="0"/>
-              </a:rPr>
-              <a:t/>
+              <a:t>DefaultMutableTreeNode rootTreeNode, treeNode;</a:t>
             </a:r>
             <a:br>
               <a:rPr kumimoji="0" lang="sk-SK" altLang="sk-SK" sz="1200" b="0" i="0" u="none" strike="noStrike" cap="none" normalizeH="0" baseline="0" noProof="1" smtClean="0">
@@ -4577,20 +4537,6 @@
               </a:rPr>
               <a:t>);</a:t>
             </a:r>
-            <a:r>
-              <a:rPr kumimoji="0" lang="sk-SK" altLang="sk-SK" sz="1200" b="0" i="0" u="none" strike="noStrike" cap="none" normalizeH="0" baseline="0" noProof="1" smtClean="0">
-                <a:ln>
-                  <a:noFill/>
-                </a:ln>
-                <a:solidFill>
-                  <a:srgbClr val="000000"/>
-                </a:solidFill>
-                <a:effectLst/>
-                <a:latin typeface="Courier New" panose="02070309020205020404" pitchFamily="49" charset="0"/>
-                <a:cs typeface="Courier New" panose="02070309020205020404" pitchFamily="49" charset="0"/>
-              </a:rPr>
-              <a:t/>
-            </a:r>
             <a:br>
               <a:rPr kumimoji="0" lang="sk-SK" altLang="sk-SK" sz="1200" b="0" i="0" u="none" strike="noStrike" cap="none" normalizeH="0" baseline="0" noProof="1" smtClean="0">
                 <a:ln>
@@ -5251,35 +5197,7 @@
                 <a:latin typeface="Courier New" panose="02070309020205020404" pitchFamily="49" charset="0"/>
                 <a:cs typeface="Courier New" panose="02070309020205020404" pitchFamily="49" charset="0"/>
               </a:rPr>
-              <a:t>rootTreeNode.add(treeNode</a:t>
-            </a:r>
-            <a:r>
-              <a:rPr kumimoji="0" lang="sk-SK" altLang="sk-SK" sz="1200" b="0" i="0" u="none" strike="noStrike" cap="none" normalizeH="0" baseline="0" noProof="1" smtClean="0">
-                <a:ln>
-                  <a:noFill/>
-                </a:ln>
-                <a:solidFill>
-                  <a:srgbClr val="000000"/>
-                </a:solidFill>
-                <a:effectLst/>
-                <a:latin typeface="Courier New" panose="02070309020205020404" pitchFamily="49" charset="0"/>
-                <a:cs typeface="Courier New" panose="02070309020205020404" pitchFamily="49" charset="0"/>
-              </a:rPr>
-              <a:t>);</a:t>
-            </a:r>
-            <a:r>
-              <a:rPr kumimoji="0" lang="sk-SK" altLang="sk-SK" sz="1200" b="0" i="0" u="none" strike="noStrike" cap="none" normalizeH="0" baseline="0" noProof="1" smtClean="0">
-                <a:ln>
-                  <a:noFill/>
-                </a:ln>
-                <a:solidFill>
-                  <a:srgbClr val="000000"/>
-                </a:solidFill>
-                <a:effectLst/>
-                <a:latin typeface="Courier New" panose="02070309020205020404" pitchFamily="49" charset="0"/>
-                <a:cs typeface="Courier New" panose="02070309020205020404" pitchFamily="49" charset="0"/>
-              </a:rPr>
-              <a:t/>
+              <a:t>rootTreeNode.add(treeNode);</a:t>
             </a:r>
             <a:br>
               <a:rPr kumimoji="0" lang="sk-SK" altLang="sk-SK" sz="1200" b="0" i="0" u="none" strike="noStrike" cap="none" normalizeH="0" baseline="0" noProof="1" smtClean="0">
@@ -5361,35 +5279,7 @@
                 <a:latin typeface="Courier New" panose="02070309020205020404" pitchFamily="49" charset="0"/>
                 <a:cs typeface="Courier New" panose="02070309020205020404" pitchFamily="49" charset="0"/>
               </a:rPr>
-              <a:t>DefaultTreeModel(rootTreeNode</a:t>
-            </a:r>
-            <a:r>
-              <a:rPr kumimoji="0" lang="sk-SK" altLang="sk-SK" sz="1200" b="0" i="0" u="none" strike="noStrike" cap="none" normalizeH="0" baseline="0" noProof="1" smtClean="0">
-                <a:ln>
-                  <a:noFill/>
-                </a:ln>
-                <a:solidFill>
-                  <a:srgbClr val="000000"/>
-                </a:solidFill>
-                <a:effectLst/>
-                <a:latin typeface="Courier New" panose="02070309020205020404" pitchFamily="49" charset="0"/>
-                <a:cs typeface="Courier New" panose="02070309020205020404" pitchFamily="49" charset="0"/>
-              </a:rPr>
-              <a:t>);</a:t>
-            </a:r>
-            <a:r>
-              <a:rPr kumimoji="0" lang="sk-SK" altLang="sk-SK" sz="1200" b="0" i="0" u="none" strike="noStrike" cap="none" normalizeH="0" baseline="0" noProof="1" smtClean="0">
-                <a:ln>
-                  <a:noFill/>
-                </a:ln>
-                <a:solidFill>
-                  <a:srgbClr val="000000"/>
-                </a:solidFill>
-                <a:effectLst/>
-                <a:latin typeface="Courier New" panose="02070309020205020404" pitchFamily="49" charset="0"/>
-                <a:cs typeface="Courier New" panose="02070309020205020404" pitchFamily="49" charset="0"/>
-              </a:rPr>
-              <a:t/>
+              <a:t>DefaultTreeModel(rootTreeNode);</a:t>
             </a:r>
             <a:br>
               <a:rPr kumimoji="0" lang="sk-SK" altLang="sk-SK" sz="1200" b="0" i="0" u="none" strike="noStrike" cap="none" normalizeH="0" baseline="0" noProof="1" smtClean="0">
@@ -5595,6 +5485,1623 @@
           <a:chExt cx="0" cy="0"/>
         </a:xfrm>
       </p:grpSpPr>
+      <p:sp>
+        <p:nvSpPr>
+          <p:cNvPr id="3" name="Rectangle 1"/>
+          <p:cNvSpPr>
+            <a:spLocks noChangeArrowheads="1"/>
+          </p:cNvSpPr>
+          <p:nvPr/>
+        </p:nvSpPr>
+        <p:spPr bwMode="auto">
+          <a:xfrm>
+            <a:off x="249811" y="127415"/>
+            <a:ext cx="3454400" cy="2554545"/>
+          </a:xfrm>
+          <a:prstGeom prst="rect">
+            <a:avLst/>
+          </a:prstGeom>
+          <a:solidFill>
+            <a:srgbClr val="FFFFFF"/>
+          </a:solidFill>
+          <a:ln>
+            <a:noFill/>
+          </a:ln>
+          <a:effectLst/>
+          <a:extLst>
+            <a:ext uri="{91240B29-F687-4F45-9708-019B960494DF}">
+              <a14:hiddenLine xmlns:a14="http://schemas.microsoft.com/office/drawing/2010/main" w="9525">
+                <a:solidFill>
+                  <a:schemeClr val="tx1"/>
+                </a:solidFill>
+                <a:miter lim="800000"/>
+                <a:headEnd/>
+                <a:tailEnd/>
+              </a14:hiddenLine>
+            </a:ext>
+            <a:ext uri="{AF507438-7753-43E0-B8FC-AC1667EBCBE1}">
+              <a14:hiddenEffects xmlns:a14="http://schemas.microsoft.com/office/drawing/2010/main">
+                <a:effectLst>
+                  <a:outerShdw dist="35921" dir="2700000" algn="ctr" rotWithShape="0">
+                    <a:schemeClr val="bg2"/>
+                  </a:outerShdw>
+                </a:effectLst>
+              </a14:hiddenEffects>
+            </a:ext>
+          </a:extLst>
+        </p:spPr>
+        <p:txBody>
+          <a:bodyPr vert="horz" wrap="square" lIns="91440" tIns="45720" rIns="91440" bIns="45720" numCol="1" anchor="ctr" anchorCtr="0" compatLnSpc="1">
+            <a:prstTxWarp prst="textNoShape">
+              <a:avLst/>
+            </a:prstTxWarp>
+            <a:spAutoFit/>
+          </a:bodyPr>
+          <a:lstStyle/>
+          <a:p>
+            <a:pPr marL="0" marR="0" lvl="0" indent="0" algn="l" defTabSz="914400" rtl="0" eaLnBrk="0" fontAlgn="base" latinLnBrk="0" hangingPunct="0">
+              <a:lnSpc>
+                <a:spcPct val="100000"/>
+              </a:lnSpc>
+              <a:spcBef>
+                <a:spcPct val="0"/>
+              </a:spcBef>
+              <a:spcAft>
+                <a:spcPct val="0"/>
+              </a:spcAft>
+              <a:buClrTx/>
+              <a:buSzTx/>
+              <a:buFontTx/>
+              <a:buNone/>
+              <a:tabLst/>
+            </a:pPr>
+            <a:r>
+              <a:rPr kumimoji="0" lang="sk-SK" altLang="sk-SK" sz="2000" b="1" i="0" u="none" strike="noStrike" cap="none" normalizeH="0" baseline="0" noProof="1" smtClean="0">
+                <a:ln>
+                  <a:noFill/>
+                </a:ln>
+                <a:solidFill>
+                  <a:srgbClr val="000080"/>
+                </a:solidFill>
+                <a:effectLst/>
+                <a:latin typeface="Courier New" panose="02070309020205020404" pitchFamily="49" charset="0"/>
+                <a:cs typeface="Courier New" panose="02070309020205020404" pitchFamily="49" charset="0"/>
+              </a:rPr>
+              <a:t>while</a:t>
+            </a:r>
+            <a:r>
+              <a:rPr kumimoji="0" lang="sk-SK" altLang="sk-SK" sz="2000" b="0" i="0" u="none" strike="noStrike" cap="none" normalizeH="0" baseline="0" noProof="1" smtClean="0">
+                <a:ln>
+                  <a:noFill/>
+                </a:ln>
+                <a:solidFill>
+                  <a:srgbClr val="000000"/>
+                </a:solidFill>
+                <a:effectLst/>
+                <a:latin typeface="Courier New" panose="02070309020205020404" pitchFamily="49" charset="0"/>
+                <a:cs typeface="Courier New" panose="02070309020205020404" pitchFamily="49" charset="0"/>
+              </a:rPr>
+              <a:t>(b != </a:t>
+            </a:r>
+            <a:r>
+              <a:rPr kumimoji="0" lang="sk-SK" altLang="sk-SK" sz="2000" b="0" i="0" u="none" strike="noStrike" cap="none" normalizeH="0" baseline="0" noProof="1" smtClean="0">
+                <a:ln>
+                  <a:noFill/>
+                </a:ln>
+                <a:solidFill>
+                  <a:srgbClr val="0000FF"/>
+                </a:solidFill>
+                <a:effectLst/>
+                <a:latin typeface="Courier New" panose="02070309020205020404" pitchFamily="49" charset="0"/>
+                <a:cs typeface="Courier New" panose="02070309020205020404" pitchFamily="49" charset="0"/>
+              </a:rPr>
+              <a:t>0</a:t>
+            </a:r>
+            <a:r>
+              <a:rPr kumimoji="0" lang="sk-SK" altLang="sk-SK" sz="2000" b="0" i="0" u="none" strike="noStrike" cap="none" normalizeH="0" baseline="0" noProof="1" smtClean="0">
+                <a:ln>
+                  <a:noFill/>
+                </a:ln>
+                <a:solidFill>
+                  <a:srgbClr val="000000"/>
+                </a:solidFill>
+                <a:effectLst/>
+                <a:latin typeface="Courier New" panose="02070309020205020404" pitchFamily="49" charset="0"/>
+                <a:cs typeface="Courier New" panose="02070309020205020404" pitchFamily="49" charset="0"/>
+              </a:rPr>
+              <a:t>) {</a:t>
+            </a:r>
+            <a:br>
+              <a:rPr kumimoji="0" lang="sk-SK" altLang="sk-SK" sz="2000" b="0" i="0" u="none" strike="noStrike" cap="none" normalizeH="0" baseline="0" noProof="1" smtClean="0">
+                <a:ln>
+                  <a:noFill/>
+                </a:ln>
+                <a:solidFill>
+                  <a:srgbClr val="000000"/>
+                </a:solidFill>
+                <a:effectLst/>
+                <a:latin typeface="Courier New" panose="02070309020205020404" pitchFamily="49" charset="0"/>
+                <a:cs typeface="Courier New" panose="02070309020205020404" pitchFamily="49" charset="0"/>
+              </a:rPr>
+            </a:br>
+            <a:r>
+              <a:rPr kumimoji="0" lang="sk-SK" altLang="sk-SK" sz="2000" b="0" i="0" u="none" strike="noStrike" cap="none" normalizeH="0" baseline="0" noProof="1" smtClean="0">
+                <a:ln>
+                  <a:noFill/>
+                </a:ln>
+                <a:solidFill>
+                  <a:srgbClr val="000000"/>
+                </a:solidFill>
+                <a:effectLst/>
+                <a:latin typeface="Courier New" panose="02070309020205020404" pitchFamily="49" charset="0"/>
+                <a:cs typeface="Courier New" panose="02070309020205020404" pitchFamily="49" charset="0"/>
+              </a:rPr>
+              <a:t>    </a:t>
+            </a:r>
+            <a:r>
+              <a:rPr kumimoji="0" lang="sk-SK" altLang="sk-SK" sz="2000" b="1" i="0" u="none" strike="noStrike" cap="none" normalizeH="0" baseline="0" noProof="1" smtClean="0">
+                <a:ln>
+                  <a:noFill/>
+                </a:ln>
+                <a:solidFill>
+                  <a:srgbClr val="000080"/>
+                </a:solidFill>
+                <a:effectLst/>
+                <a:latin typeface="Courier New" panose="02070309020205020404" pitchFamily="49" charset="0"/>
+                <a:cs typeface="Courier New" panose="02070309020205020404" pitchFamily="49" charset="0"/>
+              </a:rPr>
+              <a:t>if</a:t>
+            </a:r>
+            <a:r>
+              <a:rPr kumimoji="0" lang="sk-SK" altLang="sk-SK" sz="2000" b="0" i="0" u="none" strike="noStrike" cap="none" normalizeH="0" baseline="0" noProof="1" smtClean="0">
+                <a:ln>
+                  <a:noFill/>
+                </a:ln>
+                <a:solidFill>
+                  <a:srgbClr val="000000"/>
+                </a:solidFill>
+                <a:effectLst/>
+                <a:latin typeface="Courier New" panose="02070309020205020404" pitchFamily="49" charset="0"/>
+                <a:cs typeface="Courier New" panose="02070309020205020404" pitchFamily="49" charset="0"/>
+              </a:rPr>
+              <a:t>(a &gt; b) {</a:t>
+            </a:r>
+            <a:br>
+              <a:rPr kumimoji="0" lang="sk-SK" altLang="sk-SK" sz="2000" b="0" i="0" u="none" strike="noStrike" cap="none" normalizeH="0" baseline="0" noProof="1" smtClean="0">
+                <a:ln>
+                  <a:noFill/>
+                </a:ln>
+                <a:solidFill>
+                  <a:srgbClr val="000000"/>
+                </a:solidFill>
+                <a:effectLst/>
+                <a:latin typeface="Courier New" panose="02070309020205020404" pitchFamily="49" charset="0"/>
+                <a:cs typeface="Courier New" panose="02070309020205020404" pitchFamily="49" charset="0"/>
+              </a:rPr>
+            </a:br>
+            <a:r>
+              <a:rPr kumimoji="0" lang="sk-SK" altLang="sk-SK" sz="2000" b="0" i="0" u="none" strike="noStrike" cap="none" normalizeH="0" baseline="0" noProof="1" smtClean="0">
+                <a:ln>
+                  <a:noFill/>
+                </a:ln>
+                <a:solidFill>
+                  <a:srgbClr val="000000"/>
+                </a:solidFill>
+                <a:effectLst/>
+                <a:latin typeface="Courier New" panose="02070309020205020404" pitchFamily="49" charset="0"/>
+                <a:cs typeface="Courier New" panose="02070309020205020404" pitchFamily="49" charset="0"/>
+              </a:rPr>
+              <a:t>        </a:t>
+            </a:r>
+            <a:r>
+              <a:rPr kumimoji="0" lang="sk-SK" altLang="sk-SK" sz="2000" b="1" i="0" u="none" strike="noStrike" cap="none" normalizeH="0" baseline="0" noProof="1" smtClean="0">
+                <a:ln>
+                  <a:noFill/>
+                </a:ln>
+                <a:solidFill>
+                  <a:srgbClr val="660E7A"/>
+                </a:solidFill>
+                <a:effectLst/>
+                <a:latin typeface="Courier New" panose="02070309020205020404" pitchFamily="49" charset="0"/>
+                <a:cs typeface="Courier New" panose="02070309020205020404" pitchFamily="49" charset="0"/>
+              </a:rPr>
+              <a:t>a </a:t>
+            </a:r>
+            <a:r>
+              <a:rPr kumimoji="0" lang="sk-SK" altLang="sk-SK" sz="2000" b="0" i="0" u="none" strike="noStrike" cap="none" normalizeH="0" baseline="0" noProof="1" smtClean="0">
+                <a:ln>
+                  <a:noFill/>
+                </a:ln>
+                <a:solidFill>
+                  <a:srgbClr val="000000"/>
+                </a:solidFill>
+                <a:effectLst/>
+                <a:latin typeface="Courier New" panose="02070309020205020404" pitchFamily="49" charset="0"/>
+                <a:cs typeface="Courier New" panose="02070309020205020404" pitchFamily="49" charset="0"/>
+              </a:rPr>
+              <a:t>= a - b;</a:t>
+            </a:r>
+            <a:br>
+              <a:rPr kumimoji="0" lang="sk-SK" altLang="sk-SK" sz="2000" b="0" i="0" u="none" strike="noStrike" cap="none" normalizeH="0" baseline="0" noProof="1" smtClean="0">
+                <a:ln>
+                  <a:noFill/>
+                </a:ln>
+                <a:solidFill>
+                  <a:srgbClr val="000000"/>
+                </a:solidFill>
+                <a:effectLst/>
+                <a:latin typeface="Courier New" panose="02070309020205020404" pitchFamily="49" charset="0"/>
+                <a:cs typeface="Courier New" panose="02070309020205020404" pitchFamily="49" charset="0"/>
+              </a:rPr>
+            </a:br>
+            <a:r>
+              <a:rPr kumimoji="0" lang="sk-SK" altLang="sk-SK" sz="2000" b="0" i="0" u="none" strike="noStrike" cap="none" normalizeH="0" baseline="0" noProof="1" smtClean="0">
+                <a:ln>
+                  <a:noFill/>
+                </a:ln>
+                <a:solidFill>
+                  <a:srgbClr val="000000"/>
+                </a:solidFill>
+                <a:effectLst/>
+                <a:latin typeface="Courier New" panose="02070309020205020404" pitchFamily="49" charset="0"/>
+                <a:cs typeface="Courier New" panose="02070309020205020404" pitchFamily="49" charset="0"/>
+              </a:rPr>
+              <a:t>    } </a:t>
+            </a:r>
+            <a:r>
+              <a:rPr kumimoji="0" lang="sk-SK" altLang="sk-SK" sz="2000" b="1" i="0" u="none" strike="noStrike" cap="none" normalizeH="0" baseline="0" noProof="1" smtClean="0">
+                <a:ln>
+                  <a:noFill/>
+                </a:ln>
+                <a:solidFill>
+                  <a:srgbClr val="000080"/>
+                </a:solidFill>
+                <a:effectLst/>
+                <a:latin typeface="Courier New" panose="02070309020205020404" pitchFamily="49" charset="0"/>
+                <a:cs typeface="Courier New" panose="02070309020205020404" pitchFamily="49" charset="0"/>
+              </a:rPr>
+              <a:t>else </a:t>
+            </a:r>
+            <a:r>
+              <a:rPr kumimoji="0" lang="sk-SK" altLang="sk-SK" sz="2000" b="0" i="0" u="none" strike="noStrike" cap="none" normalizeH="0" baseline="0" noProof="1" smtClean="0">
+                <a:ln>
+                  <a:noFill/>
+                </a:ln>
+                <a:solidFill>
+                  <a:srgbClr val="000000"/>
+                </a:solidFill>
+                <a:effectLst/>
+                <a:latin typeface="Courier New" panose="02070309020205020404" pitchFamily="49" charset="0"/>
+                <a:cs typeface="Courier New" panose="02070309020205020404" pitchFamily="49" charset="0"/>
+              </a:rPr>
+              <a:t>{</a:t>
+            </a:r>
+            <a:br>
+              <a:rPr kumimoji="0" lang="sk-SK" altLang="sk-SK" sz="2000" b="0" i="0" u="none" strike="noStrike" cap="none" normalizeH="0" baseline="0" noProof="1" smtClean="0">
+                <a:ln>
+                  <a:noFill/>
+                </a:ln>
+                <a:solidFill>
+                  <a:srgbClr val="000000"/>
+                </a:solidFill>
+                <a:effectLst/>
+                <a:latin typeface="Courier New" panose="02070309020205020404" pitchFamily="49" charset="0"/>
+                <a:cs typeface="Courier New" panose="02070309020205020404" pitchFamily="49" charset="0"/>
+              </a:rPr>
+            </a:br>
+            <a:r>
+              <a:rPr kumimoji="0" lang="sk-SK" altLang="sk-SK" sz="2000" b="0" i="0" u="none" strike="noStrike" cap="none" normalizeH="0" baseline="0" noProof="1" smtClean="0">
+                <a:ln>
+                  <a:noFill/>
+                </a:ln>
+                <a:solidFill>
+                  <a:srgbClr val="000000"/>
+                </a:solidFill>
+                <a:effectLst/>
+                <a:latin typeface="Courier New" panose="02070309020205020404" pitchFamily="49" charset="0"/>
+                <a:cs typeface="Courier New" panose="02070309020205020404" pitchFamily="49" charset="0"/>
+              </a:rPr>
+              <a:t>        </a:t>
+            </a:r>
+            <a:r>
+              <a:rPr kumimoji="0" lang="sk-SK" altLang="sk-SK" sz="2000" b="1" i="0" u="none" strike="noStrike" cap="none" normalizeH="0" baseline="0" noProof="1" smtClean="0">
+                <a:ln>
+                  <a:noFill/>
+                </a:ln>
+                <a:solidFill>
+                  <a:srgbClr val="660E7A"/>
+                </a:solidFill>
+                <a:effectLst/>
+                <a:latin typeface="Courier New" panose="02070309020205020404" pitchFamily="49" charset="0"/>
+                <a:cs typeface="Courier New" panose="02070309020205020404" pitchFamily="49" charset="0"/>
+              </a:rPr>
+              <a:t>b </a:t>
+            </a:r>
+            <a:r>
+              <a:rPr kumimoji="0" lang="sk-SK" altLang="sk-SK" sz="2000" b="0" i="0" u="none" strike="noStrike" cap="none" normalizeH="0" baseline="0" noProof="1" smtClean="0">
+                <a:ln>
+                  <a:noFill/>
+                </a:ln>
+                <a:solidFill>
+                  <a:srgbClr val="000000"/>
+                </a:solidFill>
+                <a:effectLst/>
+                <a:latin typeface="Courier New" panose="02070309020205020404" pitchFamily="49" charset="0"/>
+                <a:cs typeface="Courier New" panose="02070309020205020404" pitchFamily="49" charset="0"/>
+              </a:rPr>
+              <a:t>= b - a;</a:t>
+            </a:r>
+            <a:br>
+              <a:rPr kumimoji="0" lang="sk-SK" altLang="sk-SK" sz="2000" b="0" i="0" u="none" strike="noStrike" cap="none" normalizeH="0" baseline="0" noProof="1" smtClean="0">
+                <a:ln>
+                  <a:noFill/>
+                </a:ln>
+                <a:solidFill>
+                  <a:srgbClr val="000000"/>
+                </a:solidFill>
+                <a:effectLst/>
+                <a:latin typeface="Courier New" panose="02070309020205020404" pitchFamily="49" charset="0"/>
+                <a:cs typeface="Courier New" panose="02070309020205020404" pitchFamily="49" charset="0"/>
+              </a:rPr>
+            </a:br>
+            <a:r>
+              <a:rPr kumimoji="0" lang="sk-SK" altLang="sk-SK" sz="2000" b="0" i="0" u="none" strike="noStrike" cap="none" normalizeH="0" baseline="0" noProof="1" smtClean="0">
+                <a:ln>
+                  <a:noFill/>
+                </a:ln>
+                <a:solidFill>
+                  <a:srgbClr val="000000"/>
+                </a:solidFill>
+                <a:effectLst/>
+                <a:latin typeface="Courier New" panose="02070309020205020404" pitchFamily="49" charset="0"/>
+                <a:cs typeface="Courier New" panose="02070309020205020404" pitchFamily="49" charset="0"/>
+              </a:rPr>
+              <a:t>    }</a:t>
+            </a:r>
+            <a:br>
+              <a:rPr kumimoji="0" lang="sk-SK" altLang="sk-SK" sz="2000" b="0" i="0" u="none" strike="noStrike" cap="none" normalizeH="0" baseline="0" noProof="1" smtClean="0">
+                <a:ln>
+                  <a:noFill/>
+                </a:ln>
+                <a:solidFill>
+                  <a:srgbClr val="000000"/>
+                </a:solidFill>
+                <a:effectLst/>
+                <a:latin typeface="Courier New" panose="02070309020205020404" pitchFamily="49" charset="0"/>
+                <a:cs typeface="Courier New" panose="02070309020205020404" pitchFamily="49" charset="0"/>
+              </a:rPr>
+            </a:br>
+            <a:r>
+              <a:rPr kumimoji="0" lang="sk-SK" altLang="sk-SK" sz="2000" b="0" i="0" u="none" strike="noStrike" cap="none" normalizeH="0" baseline="0" noProof="1" smtClean="0">
+                <a:ln>
+                  <a:noFill/>
+                </a:ln>
+                <a:solidFill>
+                  <a:srgbClr val="000000"/>
+                </a:solidFill>
+                <a:effectLst/>
+                <a:latin typeface="Courier New" panose="02070309020205020404" pitchFamily="49" charset="0"/>
+                <a:cs typeface="Courier New" panose="02070309020205020404" pitchFamily="49" charset="0"/>
+              </a:rPr>
+              <a:t>}</a:t>
+            </a:r>
+            <a:br>
+              <a:rPr kumimoji="0" lang="sk-SK" altLang="sk-SK" sz="2000" b="0" i="0" u="none" strike="noStrike" cap="none" normalizeH="0" baseline="0" noProof="1" smtClean="0">
+                <a:ln>
+                  <a:noFill/>
+                </a:ln>
+                <a:solidFill>
+                  <a:srgbClr val="000000"/>
+                </a:solidFill>
+                <a:effectLst/>
+                <a:latin typeface="Courier New" panose="02070309020205020404" pitchFamily="49" charset="0"/>
+                <a:cs typeface="Courier New" panose="02070309020205020404" pitchFamily="49" charset="0"/>
+              </a:rPr>
+            </a:br>
+            <a:r>
+              <a:rPr kumimoji="0" lang="sk-SK" altLang="sk-SK" sz="2000" b="1" i="0" u="none" strike="noStrike" cap="none" normalizeH="0" baseline="0" noProof="1" smtClean="0">
+                <a:ln>
+                  <a:noFill/>
+                </a:ln>
+                <a:solidFill>
+                  <a:srgbClr val="000080"/>
+                </a:solidFill>
+                <a:effectLst/>
+                <a:latin typeface="Courier New" panose="02070309020205020404" pitchFamily="49" charset="0"/>
+                <a:cs typeface="Courier New" panose="02070309020205020404" pitchFamily="49" charset="0"/>
+              </a:rPr>
+              <a:t>return </a:t>
+            </a:r>
+            <a:r>
+              <a:rPr kumimoji="0" lang="sk-SK" altLang="sk-SK" sz="2000" b="0" i="0" u="none" strike="noStrike" cap="none" normalizeH="0" baseline="0" noProof="1" smtClean="0">
+                <a:ln>
+                  <a:noFill/>
+                </a:ln>
+                <a:solidFill>
+                  <a:srgbClr val="000000"/>
+                </a:solidFill>
+                <a:effectLst/>
+                <a:latin typeface="Courier New" panose="02070309020205020404" pitchFamily="49" charset="0"/>
+                <a:cs typeface="Courier New" panose="02070309020205020404" pitchFamily="49" charset="0"/>
+              </a:rPr>
+              <a:t>a;</a:t>
+            </a:r>
+            <a:endParaRPr kumimoji="0" lang="sk-SK" altLang="sk-SK" sz="2000" b="0" i="0" u="none" strike="noStrike" cap="none" normalizeH="0" baseline="0" noProof="1" smtClean="0">
+              <a:ln>
+                <a:noFill/>
+              </a:ln>
+              <a:solidFill>
+                <a:schemeClr val="tx1"/>
+              </a:solidFill>
+              <a:effectLst/>
+              <a:latin typeface="Arial" panose="020B0604020202020204" pitchFamily="34" charset="0"/>
+            </a:endParaRPr>
+          </a:p>
+        </p:txBody>
+      </p:sp>
+      <p:cxnSp>
+        <p:nvCxnSpPr>
+          <p:cNvPr id="19" name="Rovná spojnica 18"/>
+          <p:cNvCxnSpPr>
+            <a:stCxn id="4" idx="2"/>
+          </p:cNvCxnSpPr>
+          <p:nvPr/>
+        </p:nvCxnSpPr>
+        <p:spPr>
+          <a:xfrm flipH="1">
+            <a:off x="4210911" y="678071"/>
+            <a:ext cx="1429806" cy="334611"/>
+          </a:xfrm>
+          <a:prstGeom prst="line">
+            <a:avLst/>
+          </a:prstGeom>
+          <a:ln>
+            <a:solidFill>
+              <a:schemeClr val="bg1">
+                <a:lumMod val="65000"/>
+              </a:schemeClr>
+            </a:solidFill>
+          </a:ln>
+        </p:spPr>
+        <p:style>
+          <a:lnRef idx="1">
+            <a:schemeClr val="dk1"/>
+          </a:lnRef>
+          <a:fillRef idx="0">
+            <a:schemeClr val="dk1"/>
+          </a:fillRef>
+          <a:effectRef idx="0">
+            <a:schemeClr val="dk1"/>
+          </a:effectRef>
+          <a:fontRef idx="minor">
+            <a:schemeClr val="tx1"/>
+          </a:fontRef>
+        </p:style>
+      </p:cxnSp>
+      <p:cxnSp>
+        <p:nvCxnSpPr>
+          <p:cNvPr id="21" name="Rovná spojnica 20"/>
+          <p:cNvCxnSpPr>
+            <a:stCxn id="4" idx="2"/>
+            <a:endCxn id="6" idx="0"/>
+          </p:cNvCxnSpPr>
+          <p:nvPr/>
+        </p:nvCxnSpPr>
+        <p:spPr>
+          <a:xfrm>
+            <a:off x="5640717" y="678071"/>
+            <a:ext cx="1299716" cy="334611"/>
+          </a:xfrm>
+          <a:prstGeom prst="line">
+            <a:avLst/>
+          </a:prstGeom>
+          <a:ln>
+            <a:solidFill>
+              <a:schemeClr val="bg1">
+                <a:lumMod val="65000"/>
+              </a:schemeClr>
+            </a:solidFill>
+          </a:ln>
+        </p:spPr>
+        <p:style>
+          <a:lnRef idx="1">
+            <a:schemeClr val="dk1"/>
+          </a:lnRef>
+          <a:fillRef idx="0">
+            <a:schemeClr val="dk1"/>
+          </a:fillRef>
+          <a:effectRef idx="0">
+            <a:schemeClr val="dk1"/>
+          </a:effectRef>
+          <a:fontRef idx="minor">
+            <a:schemeClr val="tx1"/>
+          </a:fontRef>
+        </p:style>
+      </p:cxnSp>
+      <p:cxnSp>
+        <p:nvCxnSpPr>
+          <p:cNvPr id="23" name="Rovná spojnica 22"/>
+          <p:cNvCxnSpPr>
+            <a:stCxn id="5" idx="2"/>
+            <a:endCxn id="7" idx="0"/>
+          </p:cNvCxnSpPr>
+          <p:nvPr/>
+        </p:nvCxnSpPr>
+        <p:spPr>
+          <a:xfrm flipH="1">
+            <a:off x="3457989" y="1382014"/>
+            <a:ext cx="752923" cy="519277"/>
+          </a:xfrm>
+          <a:prstGeom prst="line">
+            <a:avLst/>
+          </a:prstGeom>
+          <a:ln>
+            <a:solidFill>
+              <a:schemeClr val="bg1">
+                <a:lumMod val="65000"/>
+              </a:schemeClr>
+            </a:solidFill>
+          </a:ln>
+        </p:spPr>
+        <p:style>
+          <a:lnRef idx="1">
+            <a:schemeClr val="dk1"/>
+          </a:lnRef>
+          <a:fillRef idx="0">
+            <a:schemeClr val="dk1"/>
+          </a:fillRef>
+          <a:effectRef idx="0">
+            <a:schemeClr val="dk1"/>
+          </a:effectRef>
+          <a:fontRef idx="minor">
+            <a:schemeClr val="tx1"/>
+          </a:fontRef>
+        </p:style>
+      </p:cxnSp>
+      <p:cxnSp>
+        <p:nvCxnSpPr>
+          <p:cNvPr id="25" name="Rovná spojnica 24"/>
+          <p:cNvCxnSpPr>
+            <a:stCxn id="5" idx="2"/>
+            <a:endCxn id="10" idx="0"/>
+          </p:cNvCxnSpPr>
+          <p:nvPr/>
+        </p:nvCxnSpPr>
+        <p:spPr>
+          <a:xfrm>
+            <a:off x="4210912" y="1382014"/>
+            <a:ext cx="1512729" cy="519277"/>
+          </a:xfrm>
+          <a:prstGeom prst="line">
+            <a:avLst/>
+          </a:prstGeom>
+          <a:ln>
+            <a:solidFill>
+              <a:schemeClr val="bg1">
+                <a:lumMod val="65000"/>
+              </a:schemeClr>
+            </a:solidFill>
+          </a:ln>
+        </p:spPr>
+        <p:style>
+          <a:lnRef idx="1">
+            <a:schemeClr val="dk1"/>
+          </a:lnRef>
+          <a:fillRef idx="0">
+            <a:schemeClr val="dk1"/>
+          </a:fillRef>
+          <a:effectRef idx="0">
+            <a:schemeClr val="dk1"/>
+          </a:effectRef>
+          <a:fontRef idx="minor">
+            <a:schemeClr val="tx1"/>
+          </a:fontRef>
+        </p:style>
+      </p:cxnSp>
+      <p:cxnSp>
+        <p:nvCxnSpPr>
+          <p:cNvPr id="27" name="Rovná spojnica 26"/>
+          <p:cNvCxnSpPr>
+            <a:stCxn id="6" idx="2"/>
+            <a:endCxn id="11" idx="0"/>
+          </p:cNvCxnSpPr>
+          <p:nvPr/>
+        </p:nvCxnSpPr>
+        <p:spPr>
+          <a:xfrm>
+            <a:off x="6940433" y="1382014"/>
+            <a:ext cx="1185934" cy="519277"/>
+          </a:xfrm>
+          <a:prstGeom prst="line">
+            <a:avLst/>
+          </a:prstGeom>
+          <a:ln>
+            <a:solidFill>
+              <a:schemeClr val="bg1">
+                <a:lumMod val="65000"/>
+              </a:schemeClr>
+            </a:solidFill>
+          </a:ln>
+        </p:spPr>
+        <p:style>
+          <a:lnRef idx="1">
+            <a:schemeClr val="dk1"/>
+          </a:lnRef>
+          <a:fillRef idx="0">
+            <a:schemeClr val="dk1"/>
+          </a:fillRef>
+          <a:effectRef idx="0">
+            <a:schemeClr val="dk1"/>
+          </a:effectRef>
+          <a:fontRef idx="minor">
+            <a:schemeClr val="tx1"/>
+          </a:fontRef>
+        </p:style>
+      </p:cxnSp>
+      <p:cxnSp>
+        <p:nvCxnSpPr>
+          <p:cNvPr id="29" name="Rovná spojnica 28"/>
+          <p:cNvCxnSpPr>
+            <a:stCxn id="10" idx="2"/>
+            <a:endCxn id="13" idx="0"/>
+          </p:cNvCxnSpPr>
+          <p:nvPr/>
+        </p:nvCxnSpPr>
+        <p:spPr>
+          <a:xfrm flipH="1">
+            <a:off x="4934980" y="2270623"/>
+            <a:ext cx="788661" cy="708486"/>
+          </a:xfrm>
+          <a:prstGeom prst="line">
+            <a:avLst/>
+          </a:prstGeom>
+          <a:ln>
+            <a:solidFill>
+              <a:schemeClr val="bg1">
+                <a:lumMod val="65000"/>
+              </a:schemeClr>
+            </a:solidFill>
+          </a:ln>
+        </p:spPr>
+        <p:style>
+          <a:lnRef idx="1">
+            <a:schemeClr val="dk1"/>
+          </a:lnRef>
+          <a:fillRef idx="0">
+            <a:schemeClr val="dk1"/>
+          </a:fillRef>
+          <a:effectRef idx="0">
+            <a:schemeClr val="dk1"/>
+          </a:effectRef>
+          <a:fontRef idx="minor">
+            <a:schemeClr val="tx1"/>
+          </a:fontRef>
+        </p:style>
+      </p:cxnSp>
+      <p:cxnSp>
+        <p:nvCxnSpPr>
+          <p:cNvPr id="31" name="Rovná spojnica 30"/>
+          <p:cNvCxnSpPr>
+            <a:stCxn id="10" idx="2"/>
+            <a:endCxn id="16" idx="0"/>
+          </p:cNvCxnSpPr>
+          <p:nvPr/>
+        </p:nvCxnSpPr>
+        <p:spPr>
+          <a:xfrm>
+            <a:off x="5723641" y="2270623"/>
+            <a:ext cx="1069315" cy="708486"/>
+          </a:xfrm>
+          <a:prstGeom prst="line">
+            <a:avLst/>
+          </a:prstGeom>
+          <a:ln>
+            <a:solidFill>
+              <a:schemeClr val="bg1">
+                <a:lumMod val="65000"/>
+              </a:schemeClr>
+            </a:solidFill>
+          </a:ln>
+        </p:spPr>
+        <p:style>
+          <a:lnRef idx="1">
+            <a:schemeClr val="dk1"/>
+          </a:lnRef>
+          <a:fillRef idx="0">
+            <a:schemeClr val="dk1"/>
+          </a:fillRef>
+          <a:effectRef idx="0">
+            <a:schemeClr val="dk1"/>
+          </a:effectRef>
+          <a:fontRef idx="minor">
+            <a:schemeClr val="tx1"/>
+          </a:fontRef>
+        </p:style>
+      </p:cxnSp>
+      <p:cxnSp>
+        <p:nvCxnSpPr>
+          <p:cNvPr id="33" name="Rovná spojnica 32"/>
+          <p:cNvCxnSpPr>
+            <a:stCxn id="10" idx="2"/>
+            <a:endCxn id="17" idx="0"/>
+          </p:cNvCxnSpPr>
+          <p:nvPr/>
+        </p:nvCxnSpPr>
+        <p:spPr>
+          <a:xfrm>
+            <a:off x="5723641" y="2270623"/>
+            <a:ext cx="2727942" cy="708486"/>
+          </a:xfrm>
+          <a:prstGeom prst="line">
+            <a:avLst/>
+          </a:prstGeom>
+          <a:ln>
+            <a:solidFill>
+              <a:schemeClr val="bg1">
+                <a:lumMod val="65000"/>
+              </a:schemeClr>
+            </a:solidFill>
+          </a:ln>
+        </p:spPr>
+        <p:style>
+          <a:lnRef idx="1">
+            <a:schemeClr val="dk1"/>
+          </a:lnRef>
+          <a:fillRef idx="0">
+            <a:schemeClr val="dk1"/>
+          </a:fillRef>
+          <a:effectRef idx="0">
+            <a:schemeClr val="dk1"/>
+          </a:effectRef>
+          <a:fontRef idx="minor">
+            <a:schemeClr val="tx1"/>
+          </a:fontRef>
+        </p:style>
+      </p:cxnSp>
+      <p:cxnSp>
+        <p:nvCxnSpPr>
+          <p:cNvPr id="35" name="Rovná spojnica 34"/>
+          <p:cNvCxnSpPr>
+            <a:stCxn id="16" idx="2"/>
+          </p:cNvCxnSpPr>
+          <p:nvPr/>
+        </p:nvCxnSpPr>
+        <p:spPr>
+          <a:xfrm>
+            <a:off x="6792956" y="3348441"/>
+            <a:ext cx="47617" cy="319823"/>
+          </a:xfrm>
+          <a:prstGeom prst="line">
+            <a:avLst/>
+          </a:prstGeom>
+          <a:ln>
+            <a:solidFill>
+              <a:schemeClr val="bg1">
+                <a:lumMod val="65000"/>
+              </a:schemeClr>
+            </a:solidFill>
+          </a:ln>
+        </p:spPr>
+        <p:style>
+          <a:lnRef idx="1">
+            <a:schemeClr val="dk1"/>
+          </a:lnRef>
+          <a:fillRef idx="0">
+            <a:schemeClr val="dk1"/>
+          </a:fillRef>
+          <a:effectRef idx="0">
+            <a:schemeClr val="dk1"/>
+          </a:effectRef>
+          <a:fontRef idx="minor">
+            <a:schemeClr val="tx1"/>
+          </a:fontRef>
+        </p:style>
+      </p:cxnSp>
+      <p:cxnSp>
+        <p:nvCxnSpPr>
+          <p:cNvPr id="37" name="Rovná spojnica 36"/>
+          <p:cNvCxnSpPr>
+            <a:stCxn id="17" idx="2"/>
+          </p:cNvCxnSpPr>
+          <p:nvPr/>
+        </p:nvCxnSpPr>
+        <p:spPr>
+          <a:xfrm>
+            <a:off x="8451583" y="3348441"/>
+            <a:ext cx="126360" cy="222073"/>
+          </a:xfrm>
+          <a:prstGeom prst="line">
+            <a:avLst/>
+          </a:prstGeom>
+          <a:ln>
+            <a:solidFill>
+              <a:schemeClr val="bg1">
+                <a:lumMod val="65000"/>
+              </a:schemeClr>
+            </a:solidFill>
+          </a:ln>
+        </p:spPr>
+        <p:style>
+          <a:lnRef idx="1">
+            <a:schemeClr val="dk1"/>
+          </a:lnRef>
+          <a:fillRef idx="0">
+            <a:schemeClr val="dk1"/>
+          </a:fillRef>
+          <a:effectRef idx="0">
+            <a:schemeClr val="dk1"/>
+          </a:effectRef>
+          <a:fontRef idx="minor">
+            <a:schemeClr val="tx1"/>
+          </a:fontRef>
+        </p:style>
+      </p:cxnSp>
+      <p:cxnSp>
+        <p:nvCxnSpPr>
+          <p:cNvPr id="39" name="Rovná spojnica 38"/>
+          <p:cNvCxnSpPr>
+            <a:stCxn id="7" idx="2"/>
+            <a:endCxn id="8" idx="0"/>
+          </p:cNvCxnSpPr>
+          <p:nvPr/>
+        </p:nvCxnSpPr>
+        <p:spPr>
+          <a:xfrm flipH="1">
+            <a:off x="1807467" y="2270623"/>
+            <a:ext cx="1650522" cy="746549"/>
+          </a:xfrm>
+          <a:prstGeom prst="line">
+            <a:avLst/>
+          </a:prstGeom>
+          <a:ln>
+            <a:solidFill>
+              <a:schemeClr val="bg1">
+                <a:lumMod val="65000"/>
+              </a:schemeClr>
+            </a:solidFill>
+          </a:ln>
+        </p:spPr>
+        <p:style>
+          <a:lnRef idx="1">
+            <a:schemeClr val="dk1"/>
+          </a:lnRef>
+          <a:fillRef idx="0">
+            <a:schemeClr val="dk1"/>
+          </a:fillRef>
+          <a:effectRef idx="0">
+            <a:schemeClr val="dk1"/>
+          </a:effectRef>
+          <a:fontRef idx="minor">
+            <a:schemeClr val="tx1"/>
+          </a:fontRef>
+        </p:style>
+      </p:cxnSp>
+      <p:cxnSp>
+        <p:nvCxnSpPr>
+          <p:cNvPr id="41" name="Rovná spojnica 40"/>
+          <p:cNvCxnSpPr>
+            <a:stCxn id="7" idx="2"/>
+            <a:endCxn id="9" idx="0"/>
+          </p:cNvCxnSpPr>
+          <p:nvPr/>
+        </p:nvCxnSpPr>
+        <p:spPr>
+          <a:xfrm>
+            <a:off x="3457989" y="2270623"/>
+            <a:ext cx="0" cy="746549"/>
+          </a:xfrm>
+          <a:prstGeom prst="line">
+            <a:avLst/>
+          </a:prstGeom>
+          <a:ln>
+            <a:solidFill>
+              <a:schemeClr val="bg1">
+                <a:lumMod val="65000"/>
+              </a:schemeClr>
+            </a:solidFill>
+          </a:ln>
+        </p:spPr>
+        <p:style>
+          <a:lnRef idx="1">
+            <a:schemeClr val="dk1"/>
+          </a:lnRef>
+          <a:fillRef idx="0">
+            <a:schemeClr val="dk1"/>
+          </a:fillRef>
+          <a:effectRef idx="0">
+            <a:schemeClr val="dk1"/>
+          </a:effectRef>
+          <a:fontRef idx="minor">
+            <a:schemeClr val="tx1"/>
+          </a:fontRef>
+        </p:style>
+      </p:cxnSp>
+      <p:cxnSp>
+        <p:nvCxnSpPr>
+          <p:cNvPr id="43" name="Rovná spojnica 42"/>
+          <p:cNvCxnSpPr>
+            <a:stCxn id="13" idx="2"/>
+            <a:endCxn id="14" idx="0"/>
+          </p:cNvCxnSpPr>
+          <p:nvPr/>
+        </p:nvCxnSpPr>
+        <p:spPr>
+          <a:xfrm flipH="1">
+            <a:off x="3938296" y="3348441"/>
+            <a:ext cx="996684" cy="708486"/>
+          </a:xfrm>
+          <a:prstGeom prst="line">
+            <a:avLst/>
+          </a:prstGeom>
+          <a:ln>
+            <a:solidFill>
+              <a:schemeClr val="bg1">
+                <a:lumMod val="65000"/>
+              </a:schemeClr>
+            </a:solidFill>
+          </a:ln>
+        </p:spPr>
+        <p:style>
+          <a:lnRef idx="1">
+            <a:schemeClr val="dk1"/>
+          </a:lnRef>
+          <a:fillRef idx="0">
+            <a:schemeClr val="dk1"/>
+          </a:fillRef>
+          <a:effectRef idx="0">
+            <a:schemeClr val="dk1"/>
+          </a:effectRef>
+          <a:fontRef idx="minor">
+            <a:schemeClr val="tx1"/>
+          </a:fontRef>
+        </p:style>
+      </p:cxnSp>
+      <p:cxnSp>
+        <p:nvCxnSpPr>
+          <p:cNvPr id="45" name="Rovná spojnica 44"/>
+          <p:cNvCxnSpPr>
+            <a:stCxn id="13" idx="2"/>
+            <a:endCxn id="15" idx="0"/>
+          </p:cNvCxnSpPr>
+          <p:nvPr/>
+        </p:nvCxnSpPr>
+        <p:spPr>
+          <a:xfrm>
+            <a:off x="4934980" y="3348441"/>
+            <a:ext cx="669545" cy="708486"/>
+          </a:xfrm>
+          <a:prstGeom prst="line">
+            <a:avLst/>
+          </a:prstGeom>
+          <a:ln>
+            <a:solidFill>
+              <a:schemeClr val="bg1">
+                <a:lumMod val="65000"/>
+              </a:schemeClr>
+            </a:solidFill>
+          </a:ln>
+        </p:spPr>
+        <p:style>
+          <a:lnRef idx="1">
+            <a:schemeClr val="dk1"/>
+          </a:lnRef>
+          <a:fillRef idx="0">
+            <a:schemeClr val="dk1"/>
+          </a:fillRef>
+          <a:effectRef idx="0">
+            <a:schemeClr val="dk1"/>
+          </a:effectRef>
+          <a:fontRef idx="minor">
+            <a:schemeClr val="tx1"/>
+          </a:fontRef>
+        </p:style>
+      </p:cxnSp>
+      <p:sp>
+        <p:nvSpPr>
+          <p:cNvPr id="4" name="BlokTextu 3"/>
+          <p:cNvSpPr txBox="1"/>
+          <p:nvPr/>
+        </p:nvSpPr>
+        <p:spPr>
+          <a:xfrm>
+            <a:off x="5050972" y="308739"/>
+            <a:ext cx="1179490" cy="369332"/>
+          </a:xfrm>
+          <a:prstGeom prst="rect">
+            <a:avLst/>
+          </a:prstGeom>
+        </p:spPr>
+        <p:style>
+          <a:lnRef idx="1">
+            <a:schemeClr val="accent3"/>
+          </a:lnRef>
+          <a:fillRef idx="3">
+            <a:schemeClr val="accent3"/>
+          </a:fillRef>
+          <a:effectRef idx="2">
+            <a:schemeClr val="accent3"/>
+          </a:effectRef>
+          <a:fontRef idx="minor">
+            <a:schemeClr val="lt1"/>
+          </a:fontRef>
+        </p:style>
+        <p:txBody>
+          <a:bodyPr wrap="none" rtlCol="0">
+            <a:spAutoFit/>
+          </a:bodyPr>
+          <a:lstStyle/>
+          <a:p>
+            <a:r>
+              <a:rPr lang="sk-SK" dirty="0" smtClean="0"/>
+              <a:t>PROGRAM</a:t>
+            </a:r>
+          </a:p>
+        </p:txBody>
+      </p:sp>
+      <p:sp>
+        <p:nvSpPr>
+          <p:cNvPr id="5" name="BlokTextu 4"/>
+          <p:cNvSpPr txBox="1"/>
+          <p:nvPr/>
+        </p:nvSpPr>
+        <p:spPr>
+          <a:xfrm>
+            <a:off x="3810000" y="1012682"/>
+            <a:ext cx="801823" cy="369332"/>
+          </a:xfrm>
+          <a:prstGeom prst="rect">
+            <a:avLst/>
+          </a:prstGeom>
+        </p:spPr>
+        <p:style>
+          <a:lnRef idx="1">
+            <a:schemeClr val="accent1"/>
+          </a:lnRef>
+          <a:fillRef idx="3">
+            <a:schemeClr val="accent1"/>
+          </a:fillRef>
+          <a:effectRef idx="2">
+            <a:schemeClr val="accent1"/>
+          </a:effectRef>
+          <a:fontRef idx="minor">
+            <a:schemeClr val="lt1"/>
+          </a:fontRef>
+        </p:style>
+        <p:txBody>
+          <a:bodyPr wrap="none" rtlCol="0">
+            <a:spAutoFit/>
+          </a:bodyPr>
+          <a:lstStyle/>
+          <a:p>
+            <a:r>
+              <a:rPr lang="sk-SK" dirty="0" smtClean="0"/>
+              <a:t>WHILE</a:t>
+            </a:r>
+          </a:p>
+        </p:txBody>
+      </p:sp>
+      <p:sp>
+        <p:nvSpPr>
+          <p:cNvPr id="6" name="BlokTextu 5"/>
+          <p:cNvSpPr txBox="1"/>
+          <p:nvPr/>
+        </p:nvSpPr>
+        <p:spPr>
+          <a:xfrm>
+            <a:off x="6462577" y="1012682"/>
+            <a:ext cx="955711" cy="369332"/>
+          </a:xfrm>
+          <a:prstGeom prst="rect">
+            <a:avLst/>
+          </a:prstGeom>
+        </p:spPr>
+        <p:style>
+          <a:lnRef idx="1">
+            <a:schemeClr val="accent1"/>
+          </a:lnRef>
+          <a:fillRef idx="3">
+            <a:schemeClr val="accent1"/>
+          </a:fillRef>
+          <a:effectRef idx="2">
+            <a:schemeClr val="accent1"/>
+          </a:effectRef>
+          <a:fontRef idx="minor">
+            <a:schemeClr val="lt1"/>
+          </a:fontRef>
+        </p:style>
+        <p:txBody>
+          <a:bodyPr wrap="none" rtlCol="0">
+            <a:spAutoFit/>
+          </a:bodyPr>
+          <a:lstStyle/>
+          <a:p>
+            <a:r>
+              <a:rPr lang="sk-SK" dirty="0" smtClean="0"/>
+              <a:t>RETURN</a:t>
+            </a:r>
+          </a:p>
+        </p:txBody>
+      </p:sp>
+      <p:sp>
+        <p:nvSpPr>
+          <p:cNvPr id="7" name="BlokTextu 6"/>
+          <p:cNvSpPr txBox="1"/>
+          <p:nvPr/>
+        </p:nvSpPr>
+        <p:spPr>
+          <a:xfrm>
+            <a:off x="2890590" y="1901291"/>
+            <a:ext cx="1134798" cy="369332"/>
+          </a:xfrm>
+          <a:prstGeom prst="rect">
+            <a:avLst/>
+          </a:prstGeom>
+        </p:spPr>
+        <p:style>
+          <a:lnRef idx="1">
+            <a:schemeClr val="accent4"/>
+          </a:lnRef>
+          <a:fillRef idx="3">
+            <a:schemeClr val="accent4"/>
+          </a:fillRef>
+          <a:effectRef idx="2">
+            <a:schemeClr val="accent4"/>
+          </a:effectRef>
+          <a:fontRef idx="minor">
+            <a:schemeClr val="lt1"/>
+          </a:fontRef>
+        </p:style>
+        <p:txBody>
+          <a:bodyPr wrap="none" rtlCol="0">
+            <a:spAutoFit/>
+          </a:bodyPr>
+          <a:lstStyle/>
+          <a:p>
+            <a:r>
+              <a:rPr lang="sk-SK" dirty="0" smtClean="0"/>
+              <a:t>COND (!=)</a:t>
+            </a:r>
+          </a:p>
+        </p:txBody>
+      </p:sp>
+      <p:sp>
+        <p:nvSpPr>
+          <p:cNvPr id="8" name="BlokTextu 7"/>
+          <p:cNvSpPr txBox="1"/>
+          <p:nvPr/>
+        </p:nvSpPr>
+        <p:spPr>
+          <a:xfrm>
+            <a:off x="1099388" y="3017172"/>
+            <a:ext cx="1416157" cy="369332"/>
+          </a:xfrm>
+          <a:prstGeom prst="rect">
+            <a:avLst/>
+          </a:prstGeom>
+        </p:spPr>
+        <p:style>
+          <a:lnRef idx="1">
+            <a:schemeClr val="accent6"/>
+          </a:lnRef>
+          <a:fillRef idx="3">
+            <a:schemeClr val="accent6"/>
+          </a:fillRef>
+          <a:effectRef idx="2">
+            <a:schemeClr val="accent6"/>
+          </a:effectRef>
+          <a:fontRef idx="minor">
+            <a:schemeClr val="lt1"/>
+          </a:fontRef>
+        </p:style>
+        <p:txBody>
+          <a:bodyPr wrap="none" rtlCol="0">
+            <a:spAutoFit/>
+          </a:bodyPr>
+          <a:lstStyle/>
+          <a:p>
+            <a:r>
+              <a:rPr lang="sk-SK" dirty="0" smtClean="0"/>
+              <a:t>VARIABLE (A)</a:t>
+            </a:r>
+          </a:p>
+        </p:txBody>
+      </p:sp>
+      <p:sp>
+        <p:nvSpPr>
+          <p:cNvPr id="9" name="BlokTextu 8"/>
+          <p:cNvSpPr txBox="1"/>
+          <p:nvPr/>
+        </p:nvSpPr>
+        <p:spPr>
+          <a:xfrm>
+            <a:off x="2890590" y="3017172"/>
+            <a:ext cx="1134798" cy="369332"/>
+          </a:xfrm>
+          <a:prstGeom prst="rect">
+            <a:avLst/>
+          </a:prstGeom>
+        </p:spPr>
+        <p:style>
+          <a:lnRef idx="1">
+            <a:schemeClr val="accent2"/>
+          </a:lnRef>
+          <a:fillRef idx="3">
+            <a:schemeClr val="accent2"/>
+          </a:fillRef>
+          <a:effectRef idx="2">
+            <a:schemeClr val="accent2"/>
+          </a:effectRef>
+          <a:fontRef idx="minor">
+            <a:schemeClr val="lt1"/>
+          </a:fontRef>
+        </p:style>
+        <p:txBody>
+          <a:bodyPr wrap="none" rtlCol="0">
+            <a:spAutoFit/>
+          </a:bodyPr>
+          <a:lstStyle/>
+          <a:p>
+            <a:r>
+              <a:rPr lang="sk-SK" dirty="0" smtClean="0"/>
+              <a:t>CONST (0)</a:t>
+            </a:r>
+          </a:p>
+        </p:txBody>
+      </p:sp>
+      <p:sp>
+        <p:nvSpPr>
+          <p:cNvPr id="10" name="BlokTextu 9"/>
+          <p:cNvSpPr txBox="1"/>
+          <p:nvPr/>
+        </p:nvSpPr>
+        <p:spPr>
+          <a:xfrm>
+            <a:off x="5549555" y="1901291"/>
+            <a:ext cx="348172" cy="369332"/>
+          </a:xfrm>
+          <a:prstGeom prst="rect">
+            <a:avLst/>
+          </a:prstGeom>
+        </p:spPr>
+        <p:style>
+          <a:lnRef idx="1">
+            <a:schemeClr val="accent1"/>
+          </a:lnRef>
+          <a:fillRef idx="3">
+            <a:schemeClr val="accent1"/>
+          </a:fillRef>
+          <a:effectRef idx="2">
+            <a:schemeClr val="accent1"/>
+          </a:effectRef>
+          <a:fontRef idx="minor">
+            <a:schemeClr val="lt1"/>
+          </a:fontRef>
+        </p:style>
+        <p:txBody>
+          <a:bodyPr wrap="none" rtlCol="0">
+            <a:spAutoFit/>
+          </a:bodyPr>
+          <a:lstStyle/>
+          <a:p>
+            <a:r>
+              <a:rPr lang="sk-SK" dirty="0" smtClean="0"/>
+              <a:t>IF</a:t>
+            </a:r>
+          </a:p>
+        </p:txBody>
+      </p:sp>
+      <p:sp>
+        <p:nvSpPr>
+          <p:cNvPr id="11" name="BlokTextu 10"/>
+          <p:cNvSpPr txBox="1"/>
+          <p:nvPr/>
+        </p:nvSpPr>
+        <p:spPr>
+          <a:xfrm>
+            <a:off x="7418288" y="1901291"/>
+            <a:ext cx="1416157" cy="369332"/>
+          </a:xfrm>
+          <a:prstGeom prst="rect">
+            <a:avLst/>
+          </a:prstGeom>
+        </p:spPr>
+        <p:style>
+          <a:lnRef idx="1">
+            <a:schemeClr val="accent6"/>
+          </a:lnRef>
+          <a:fillRef idx="3">
+            <a:schemeClr val="accent6"/>
+          </a:fillRef>
+          <a:effectRef idx="2">
+            <a:schemeClr val="accent6"/>
+          </a:effectRef>
+          <a:fontRef idx="minor">
+            <a:schemeClr val="lt1"/>
+          </a:fontRef>
+        </p:style>
+        <p:txBody>
+          <a:bodyPr wrap="none" rtlCol="0">
+            <a:spAutoFit/>
+          </a:bodyPr>
+          <a:lstStyle/>
+          <a:p>
+            <a:r>
+              <a:rPr lang="sk-SK" dirty="0" smtClean="0"/>
+              <a:t>VARIABLE (A)</a:t>
+            </a:r>
+          </a:p>
+        </p:txBody>
+      </p:sp>
+      <p:sp>
+        <p:nvSpPr>
+          <p:cNvPr id="13" name="BlokTextu 12"/>
+          <p:cNvSpPr txBox="1"/>
+          <p:nvPr/>
+        </p:nvSpPr>
+        <p:spPr>
+          <a:xfrm>
+            <a:off x="4405251" y="2979109"/>
+            <a:ext cx="1059457" cy="369332"/>
+          </a:xfrm>
+          <a:prstGeom prst="rect">
+            <a:avLst/>
+          </a:prstGeom>
+        </p:spPr>
+        <p:style>
+          <a:lnRef idx="1">
+            <a:schemeClr val="accent4"/>
+          </a:lnRef>
+          <a:fillRef idx="3">
+            <a:schemeClr val="accent4"/>
+          </a:fillRef>
+          <a:effectRef idx="2">
+            <a:schemeClr val="accent4"/>
+          </a:effectRef>
+          <a:fontRef idx="minor">
+            <a:schemeClr val="lt1"/>
+          </a:fontRef>
+        </p:style>
+        <p:txBody>
+          <a:bodyPr wrap="none" rtlCol="0">
+            <a:spAutoFit/>
+          </a:bodyPr>
+          <a:lstStyle/>
+          <a:p>
+            <a:r>
+              <a:rPr lang="sk-SK" dirty="0" smtClean="0"/>
+              <a:t>COND (&gt;)</a:t>
+            </a:r>
+          </a:p>
+        </p:txBody>
+      </p:sp>
+      <p:sp>
+        <p:nvSpPr>
+          <p:cNvPr id="14" name="BlokTextu 13"/>
+          <p:cNvSpPr txBox="1"/>
+          <p:nvPr/>
+        </p:nvSpPr>
+        <p:spPr>
+          <a:xfrm>
+            <a:off x="3230217" y="4056927"/>
+            <a:ext cx="1416157" cy="369332"/>
+          </a:xfrm>
+          <a:prstGeom prst="rect">
+            <a:avLst/>
+          </a:prstGeom>
+        </p:spPr>
+        <p:style>
+          <a:lnRef idx="1">
+            <a:schemeClr val="accent6"/>
+          </a:lnRef>
+          <a:fillRef idx="3">
+            <a:schemeClr val="accent6"/>
+          </a:fillRef>
+          <a:effectRef idx="2">
+            <a:schemeClr val="accent6"/>
+          </a:effectRef>
+          <a:fontRef idx="minor">
+            <a:schemeClr val="lt1"/>
+          </a:fontRef>
+        </p:style>
+        <p:txBody>
+          <a:bodyPr wrap="none" rtlCol="0">
+            <a:spAutoFit/>
+          </a:bodyPr>
+          <a:lstStyle/>
+          <a:p>
+            <a:r>
+              <a:rPr lang="sk-SK" dirty="0" smtClean="0"/>
+              <a:t>VARIABLE (A)</a:t>
+            </a:r>
+          </a:p>
+        </p:txBody>
+      </p:sp>
+      <p:sp>
+        <p:nvSpPr>
+          <p:cNvPr id="15" name="BlokTextu 14"/>
+          <p:cNvSpPr txBox="1"/>
+          <p:nvPr/>
+        </p:nvSpPr>
+        <p:spPr>
+          <a:xfrm>
+            <a:off x="4900454" y="4056927"/>
+            <a:ext cx="1408142" cy="369332"/>
+          </a:xfrm>
+          <a:prstGeom prst="rect">
+            <a:avLst/>
+          </a:prstGeom>
+        </p:spPr>
+        <p:style>
+          <a:lnRef idx="1">
+            <a:schemeClr val="accent6"/>
+          </a:lnRef>
+          <a:fillRef idx="3">
+            <a:schemeClr val="accent6"/>
+          </a:fillRef>
+          <a:effectRef idx="2">
+            <a:schemeClr val="accent6"/>
+          </a:effectRef>
+          <a:fontRef idx="minor">
+            <a:schemeClr val="lt1"/>
+          </a:fontRef>
+        </p:style>
+        <p:txBody>
+          <a:bodyPr wrap="none" rtlCol="0">
+            <a:spAutoFit/>
+          </a:bodyPr>
+          <a:lstStyle/>
+          <a:p>
+            <a:r>
+              <a:rPr lang="sk-SK" dirty="0" smtClean="0"/>
+              <a:t>VARIABLE (B)</a:t>
+            </a:r>
+          </a:p>
+        </p:txBody>
+      </p:sp>
+      <p:sp>
+        <p:nvSpPr>
+          <p:cNvPr id="16" name="BlokTextu 15"/>
+          <p:cNvSpPr txBox="1"/>
+          <p:nvPr/>
+        </p:nvSpPr>
+        <p:spPr>
+          <a:xfrm>
+            <a:off x="6462577" y="2979109"/>
+            <a:ext cx="660758" cy="369332"/>
+          </a:xfrm>
+          <a:prstGeom prst="rect">
+            <a:avLst/>
+          </a:prstGeom>
+        </p:spPr>
+        <p:style>
+          <a:lnRef idx="1">
+            <a:schemeClr val="accent1"/>
+          </a:lnRef>
+          <a:fillRef idx="3">
+            <a:schemeClr val="accent1"/>
+          </a:fillRef>
+          <a:effectRef idx="2">
+            <a:schemeClr val="accent1"/>
+          </a:effectRef>
+          <a:fontRef idx="minor">
+            <a:schemeClr val="lt1"/>
+          </a:fontRef>
+        </p:style>
+        <p:txBody>
+          <a:bodyPr wrap="none" rtlCol="0">
+            <a:spAutoFit/>
+          </a:bodyPr>
+          <a:lstStyle/>
+          <a:p>
+            <a:r>
+              <a:rPr lang="sk-SK" dirty="0" smtClean="0"/>
+              <a:t>EXPR</a:t>
+            </a:r>
+          </a:p>
+        </p:txBody>
+      </p:sp>
+      <p:sp>
+        <p:nvSpPr>
+          <p:cNvPr id="17" name="BlokTextu 16"/>
+          <p:cNvSpPr txBox="1"/>
+          <p:nvPr/>
+        </p:nvSpPr>
+        <p:spPr>
+          <a:xfrm>
+            <a:off x="8121204" y="2979109"/>
+            <a:ext cx="660758" cy="369332"/>
+          </a:xfrm>
+          <a:prstGeom prst="rect">
+            <a:avLst/>
+          </a:prstGeom>
+        </p:spPr>
+        <p:style>
+          <a:lnRef idx="1">
+            <a:schemeClr val="accent1"/>
+          </a:lnRef>
+          <a:fillRef idx="3">
+            <a:schemeClr val="accent1"/>
+          </a:fillRef>
+          <a:effectRef idx="2">
+            <a:schemeClr val="accent1"/>
+          </a:effectRef>
+          <a:fontRef idx="minor">
+            <a:schemeClr val="lt1"/>
+          </a:fontRef>
+        </p:style>
+        <p:txBody>
+          <a:bodyPr wrap="none" rtlCol="0">
+            <a:spAutoFit/>
+          </a:bodyPr>
+          <a:lstStyle/>
+          <a:p>
+            <a:r>
+              <a:rPr lang="sk-SK" dirty="0" smtClean="0"/>
+              <a:t>EXPR</a:t>
+            </a:r>
+          </a:p>
+        </p:txBody>
+      </p:sp>
+      <p:sp>
+        <p:nvSpPr>
+          <p:cNvPr id="48" name="BlokTextu 47"/>
+          <p:cNvSpPr txBox="1"/>
+          <p:nvPr/>
+        </p:nvSpPr>
+        <p:spPr>
+          <a:xfrm>
+            <a:off x="6661678" y="3548927"/>
+            <a:ext cx="357790" cy="369332"/>
+          </a:xfrm>
+          <a:prstGeom prst="rect">
+            <a:avLst/>
+          </a:prstGeom>
+          <a:noFill/>
+        </p:spPr>
+        <p:txBody>
+          <a:bodyPr wrap="none" rtlCol="0">
+            <a:spAutoFit/>
+          </a:bodyPr>
+          <a:lstStyle/>
+          <a:p>
+            <a:r>
+              <a:rPr lang="sk-SK" dirty="0" smtClean="0"/>
+              <a:t>...</a:t>
+            </a:r>
+            <a:endParaRPr lang="sk-SK" dirty="0"/>
+          </a:p>
+        </p:txBody>
+      </p:sp>
+      <p:sp>
+        <p:nvSpPr>
+          <p:cNvPr id="49" name="BlokTextu 48"/>
+          <p:cNvSpPr txBox="1"/>
+          <p:nvPr/>
+        </p:nvSpPr>
+        <p:spPr>
+          <a:xfrm>
+            <a:off x="8424172" y="3448384"/>
+            <a:ext cx="357790" cy="369332"/>
+          </a:xfrm>
+          <a:prstGeom prst="rect">
+            <a:avLst/>
+          </a:prstGeom>
+          <a:noFill/>
+        </p:spPr>
+        <p:txBody>
+          <a:bodyPr wrap="none" rtlCol="0">
+            <a:spAutoFit/>
+          </a:bodyPr>
+          <a:lstStyle/>
+          <a:p>
+            <a:r>
+              <a:rPr lang="sk-SK" dirty="0" smtClean="0"/>
+              <a:t>...</a:t>
+            </a:r>
+            <a:endParaRPr lang="sk-SK" dirty="0"/>
+          </a:p>
+        </p:txBody>
+      </p:sp>
     </p:spTree>
     <p:extLst>
       <p:ext uri="{BB962C8B-B14F-4D97-AF65-F5344CB8AC3E}">
@@ -5605,6 +7112,1542 @@
   <p:clrMapOvr>
     <a:masterClrMapping/>
   </p:clrMapOvr>
+  <p:timing>
+    <p:tnLst>
+      <p:par>
+        <p:cTn id="1" dur="indefinite" restart="never" nodeType="tmRoot"/>
+      </p:par>
+    </p:tnLst>
+  </p:timing>
+</p:sld>
+</file>
+
+<file path=ppt/slides/slide4.xml><?xml version="1.0" encoding="utf-8"?>
+<p:sld xmlns:a="http://schemas.openxmlformats.org/drawingml/2006/main" xmlns:r="http://schemas.openxmlformats.org/officeDocument/2006/relationships" xmlns:p="http://schemas.openxmlformats.org/presentationml/2006/main">
+  <p:cSld>
+    <p:spTree>
+      <p:nvGrpSpPr>
+        <p:cNvPr id="1" name=""/>
+        <p:cNvGrpSpPr/>
+        <p:nvPr/>
+      </p:nvGrpSpPr>
+      <p:grpSpPr>
+        <a:xfrm>
+          <a:off x="0" y="0"/>
+          <a:ext cx="0" cy="0"/>
+          <a:chOff x="0" y="0"/>
+          <a:chExt cx="0" cy="0"/>
+        </a:xfrm>
+      </p:grpSpPr>
+      <p:pic>
+        <p:nvPicPr>
+          <p:cNvPr id="4" name="Obrázok 3"/>
+          <p:cNvPicPr>
+            <a:picLocks noChangeAspect="1"/>
+          </p:cNvPicPr>
+          <p:nvPr/>
+        </p:nvPicPr>
+        <p:blipFill>
+          <a:blip r:embed="rId2"/>
+          <a:stretch>
+            <a:fillRect/>
+          </a:stretch>
+        </p:blipFill>
+        <p:spPr>
+          <a:xfrm>
+            <a:off x="254000" y="251732"/>
+            <a:ext cx="2133600" cy="1390650"/>
+          </a:xfrm>
+          <a:prstGeom prst="rect">
+            <a:avLst/>
+          </a:prstGeom>
+        </p:spPr>
+      </p:pic>
+      <p:pic>
+        <p:nvPicPr>
+          <p:cNvPr id="5" name="Obrázok 4"/>
+          <p:cNvPicPr>
+            <a:picLocks noChangeAspect="1"/>
+          </p:cNvPicPr>
+          <p:nvPr/>
+        </p:nvPicPr>
+        <p:blipFill>
+          <a:blip r:embed="rId3"/>
+          <a:stretch>
+            <a:fillRect/>
+          </a:stretch>
+        </p:blipFill>
+        <p:spPr>
+          <a:xfrm>
+            <a:off x="254000" y="1785937"/>
+            <a:ext cx="2133600" cy="1419225"/>
+          </a:xfrm>
+          <a:prstGeom prst="rect">
+            <a:avLst/>
+          </a:prstGeom>
+        </p:spPr>
+      </p:pic>
+      <p:pic>
+        <p:nvPicPr>
+          <p:cNvPr id="6" name="Obrázok 5"/>
+          <p:cNvPicPr>
+            <a:picLocks noChangeAspect="1"/>
+          </p:cNvPicPr>
+          <p:nvPr/>
+        </p:nvPicPr>
+        <p:blipFill>
+          <a:blip r:embed="rId4"/>
+          <a:stretch>
+            <a:fillRect/>
+          </a:stretch>
+        </p:blipFill>
+        <p:spPr>
+          <a:xfrm>
+            <a:off x="5486400" y="251732"/>
+            <a:ext cx="2133600" cy="2390775"/>
+          </a:xfrm>
+          <a:prstGeom prst="rect">
+            <a:avLst/>
+          </a:prstGeom>
+        </p:spPr>
+      </p:pic>
+      <p:pic>
+        <p:nvPicPr>
+          <p:cNvPr id="7" name="Obrázok 6"/>
+          <p:cNvPicPr>
+            <a:picLocks noChangeAspect="1"/>
+          </p:cNvPicPr>
+          <p:nvPr/>
+        </p:nvPicPr>
+        <p:blipFill>
+          <a:blip r:embed="rId5" cstate="print">
+            <a:extLst>
+              <a:ext uri="{28A0092B-C50C-407E-A947-70E740481C1C}">
+                <a14:useLocalDpi xmlns:a14="http://schemas.microsoft.com/office/drawing/2010/main" val="0"/>
+              </a:ext>
+            </a:extLst>
+          </a:blip>
+          <a:stretch>
+            <a:fillRect/>
+          </a:stretch>
+        </p:blipFill>
+        <p:spPr>
+          <a:xfrm>
+            <a:off x="2200579" y="2015987"/>
+            <a:ext cx="167971" cy="167971"/>
+          </a:xfrm>
+          <a:prstGeom prst="rect">
+            <a:avLst/>
+          </a:prstGeom>
+        </p:spPr>
+      </p:pic>
+      <p:pic>
+        <p:nvPicPr>
+          <p:cNvPr id="8" name="Obrázok 7"/>
+          <p:cNvPicPr>
+            <a:picLocks noChangeAspect="1"/>
+          </p:cNvPicPr>
+          <p:nvPr/>
+        </p:nvPicPr>
+        <p:blipFill>
+          <a:blip r:embed="rId5" cstate="print">
+            <a:extLst>
+              <a:ext uri="{28A0092B-C50C-407E-A947-70E740481C1C}">
+                <a14:useLocalDpi xmlns:a14="http://schemas.microsoft.com/office/drawing/2010/main" val="0"/>
+              </a:ext>
+            </a:extLst>
+          </a:blip>
+          <a:stretch>
+            <a:fillRect/>
+          </a:stretch>
+        </p:blipFill>
+        <p:spPr>
+          <a:xfrm>
+            <a:off x="2200578" y="482462"/>
+            <a:ext cx="167971" cy="167971"/>
+          </a:xfrm>
+          <a:prstGeom prst="rect">
+            <a:avLst/>
+          </a:prstGeom>
+        </p:spPr>
+      </p:pic>
+      <p:pic>
+        <p:nvPicPr>
+          <p:cNvPr id="9" name="Obrázok 8"/>
+          <p:cNvPicPr>
+            <a:picLocks noChangeAspect="1"/>
+          </p:cNvPicPr>
+          <p:nvPr/>
+        </p:nvPicPr>
+        <p:blipFill>
+          <a:blip r:embed="rId5" cstate="print">
+            <a:extLst>
+              <a:ext uri="{28A0092B-C50C-407E-A947-70E740481C1C}">
+                <a14:useLocalDpi xmlns:a14="http://schemas.microsoft.com/office/drawing/2010/main" val="0"/>
+              </a:ext>
+            </a:extLst>
+          </a:blip>
+          <a:stretch>
+            <a:fillRect/>
+          </a:stretch>
+        </p:blipFill>
+        <p:spPr>
+          <a:xfrm>
+            <a:off x="2191052" y="975632"/>
+            <a:ext cx="167971" cy="167971"/>
+          </a:xfrm>
+          <a:prstGeom prst="rect">
+            <a:avLst/>
+          </a:prstGeom>
+        </p:spPr>
+      </p:pic>
+      <p:pic>
+        <p:nvPicPr>
+          <p:cNvPr id="10" name="Obrázok 9"/>
+          <p:cNvPicPr>
+            <a:picLocks noChangeAspect="1"/>
+          </p:cNvPicPr>
+          <p:nvPr/>
+        </p:nvPicPr>
+        <p:blipFill>
+          <a:blip r:embed="rId5" cstate="print">
+            <a:extLst>
+              <a:ext uri="{28A0092B-C50C-407E-A947-70E740481C1C}">
+                <a14:useLocalDpi xmlns:a14="http://schemas.microsoft.com/office/drawing/2010/main" val="0"/>
+              </a:ext>
+            </a:extLst>
+          </a:blip>
+          <a:stretch>
+            <a:fillRect/>
+          </a:stretch>
+        </p:blipFill>
+        <p:spPr>
+          <a:xfrm>
+            <a:off x="7429804" y="1298198"/>
+            <a:ext cx="167971" cy="167971"/>
+          </a:xfrm>
+          <a:prstGeom prst="rect">
+            <a:avLst/>
+          </a:prstGeom>
+        </p:spPr>
+      </p:pic>
+      <p:sp>
+        <p:nvSpPr>
+          <p:cNvPr id="11" name="BlokTextu 10"/>
+          <p:cNvSpPr txBox="1"/>
+          <p:nvPr/>
+        </p:nvSpPr>
+        <p:spPr>
+          <a:xfrm>
+            <a:off x="2741612" y="767229"/>
+            <a:ext cx="2390775" cy="584775"/>
+          </a:xfrm>
+          <a:prstGeom prst="rect">
+            <a:avLst/>
+          </a:prstGeom>
+          <a:noFill/>
+          <a:ln w="28575" cap="flat" cmpd="sng" algn="ctr">
+            <a:solidFill>
+              <a:srgbClr val="00B050"/>
+            </a:solidFill>
+            <a:prstDash val="solid"/>
+            <a:round/>
+            <a:headEnd type="none" w="med" len="med"/>
+            <a:tailEnd type="none" w="med" len="med"/>
+          </a:ln>
+        </p:spPr>
+        <p:style>
+          <a:lnRef idx="0">
+            <a:scrgbClr r="0" g="0" b="0"/>
+          </a:lnRef>
+          <a:fillRef idx="0">
+            <a:scrgbClr r="0" g="0" b="0"/>
+          </a:fillRef>
+          <a:effectRef idx="0">
+            <a:scrgbClr r="0" g="0" b="0"/>
+          </a:effectRef>
+          <a:fontRef idx="minor">
+            <a:schemeClr val="dk1"/>
+          </a:fontRef>
+        </p:style>
+        <p:txBody>
+          <a:bodyPr wrap="square" rtlCol="0">
+            <a:spAutoFit/>
+          </a:bodyPr>
+          <a:lstStyle/>
+          <a:p>
+            <a:r>
+              <a:rPr lang="sk-SK" sz="1600" dirty="0" smtClean="0"/>
+              <a:t>Použitie rovnakého názvu komponentu!</a:t>
+            </a:r>
+            <a:endParaRPr lang="sk-SK" sz="1600" dirty="0"/>
+          </a:p>
+        </p:txBody>
+      </p:sp>
+      <p:sp>
+        <p:nvSpPr>
+          <p:cNvPr id="12" name="BlokTextu 11"/>
+          <p:cNvSpPr txBox="1"/>
+          <p:nvPr/>
+        </p:nvSpPr>
+        <p:spPr>
+          <a:xfrm>
+            <a:off x="2751139" y="1723599"/>
+            <a:ext cx="2390775" cy="584775"/>
+          </a:xfrm>
+          <a:prstGeom prst="rect">
+            <a:avLst/>
+          </a:prstGeom>
+          <a:ln w="28575">
+            <a:solidFill>
+              <a:srgbClr val="C00000"/>
+            </a:solidFill>
+          </a:ln>
+        </p:spPr>
+        <p:style>
+          <a:lnRef idx="2">
+            <a:schemeClr val="dk1"/>
+          </a:lnRef>
+          <a:fillRef idx="1">
+            <a:schemeClr val="lt1"/>
+          </a:fillRef>
+          <a:effectRef idx="0">
+            <a:schemeClr val="dk1"/>
+          </a:effectRef>
+          <a:fontRef idx="minor">
+            <a:schemeClr val="dk1"/>
+          </a:fontRef>
+        </p:style>
+        <p:txBody>
+          <a:bodyPr wrap="square" rtlCol="0">
+            <a:spAutoFit/>
+          </a:bodyPr>
+          <a:lstStyle/>
+          <a:p>
+            <a:r>
+              <a:rPr lang="sk-SK" sz="1600" dirty="0" smtClean="0"/>
+              <a:t>Použitie rovnakého hardvérového prostriedku</a:t>
+            </a:r>
+            <a:endParaRPr lang="sk-SK" sz="1600" dirty="0"/>
+          </a:p>
+        </p:txBody>
+      </p:sp>
+      <p:cxnSp>
+        <p:nvCxnSpPr>
+          <p:cNvPr id="15" name="Rovná spojnica 14"/>
+          <p:cNvCxnSpPr>
+            <a:stCxn id="8" idx="3"/>
+            <a:endCxn id="11" idx="1"/>
+          </p:cNvCxnSpPr>
+          <p:nvPr/>
+        </p:nvCxnSpPr>
+        <p:spPr>
+          <a:xfrm>
+            <a:off x="2368549" y="566448"/>
+            <a:ext cx="373063" cy="493169"/>
+          </a:xfrm>
+          <a:prstGeom prst="line">
+            <a:avLst/>
+          </a:prstGeom>
+          <a:ln>
+            <a:solidFill>
+              <a:srgbClr val="00B050"/>
+            </a:solidFill>
+          </a:ln>
+        </p:spPr>
+        <p:style>
+          <a:lnRef idx="3">
+            <a:schemeClr val="dk1"/>
+          </a:lnRef>
+          <a:fillRef idx="0">
+            <a:schemeClr val="dk1"/>
+          </a:fillRef>
+          <a:effectRef idx="2">
+            <a:schemeClr val="dk1"/>
+          </a:effectRef>
+          <a:fontRef idx="minor">
+            <a:schemeClr val="tx1"/>
+          </a:fontRef>
+        </p:style>
+      </p:cxnSp>
+      <p:cxnSp>
+        <p:nvCxnSpPr>
+          <p:cNvPr id="17" name="Rovná spojnica 16"/>
+          <p:cNvCxnSpPr>
+            <a:stCxn id="7" idx="3"/>
+            <a:endCxn id="11" idx="1"/>
+          </p:cNvCxnSpPr>
+          <p:nvPr/>
+        </p:nvCxnSpPr>
+        <p:spPr>
+          <a:xfrm flipV="1">
+            <a:off x="2368550" y="1059617"/>
+            <a:ext cx="373062" cy="1040356"/>
+          </a:xfrm>
+          <a:prstGeom prst="line">
+            <a:avLst/>
+          </a:prstGeom>
+          <a:ln>
+            <a:solidFill>
+              <a:srgbClr val="00B050"/>
+            </a:solidFill>
+          </a:ln>
+        </p:spPr>
+        <p:style>
+          <a:lnRef idx="3">
+            <a:schemeClr val="dk1"/>
+          </a:lnRef>
+          <a:fillRef idx="0">
+            <a:schemeClr val="dk1"/>
+          </a:fillRef>
+          <a:effectRef idx="2">
+            <a:schemeClr val="dk1"/>
+          </a:effectRef>
+          <a:fontRef idx="minor">
+            <a:schemeClr val="tx1"/>
+          </a:fontRef>
+        </p:style>
+      </p:cxnSp>
+      <p:cxnSp>
+        <p:nvCxnSpPr>
+          <p:cNvPr id="19" name="Rovná spojnica 18"/>
+          <p:cNvCxnSpPr>
+            <a:stCxn id="9" idx="3"/>
+            <a:endCxn id="12" idx="1"/>
+          </p:cNvCxnSpPr>
+          <p:nvPr/>
+        </p:nvCxnSpPr>
+        <p:spPr>
+          <a:xfrm>
+            <a:off x="2359023" y="1059618"/>
+            <a:ext cx="392116" cy="956369"/>
+          </a:xfrm>
+          <a:prstGeom prst="line">
+            <a:avLst/>
+          </a:prstGeom>
+          <a:ln>
+            <a:solidFill>
+              <a:srgbClr val="C00000"/>
+            </a:solidFill>
+          </a:ln>
+        </p:spPr>
+        <p:style>
+          <a:lnRef idx="3">
+            <a:schemeClr val="accent2"/>
+          </a:lnRef>
+          <a:fillRef idx="0">
+            <a:schemeClr val="accent2"/>
+          </a:fillRef>
+          <a:effectRef idx="2">
+            <a:schemeClr val="accent2"/>
+          </a:effectRef>
+          <a:fontRef idx="minor">
+            <a:schemeClr val="tx1"/>
+          </a:fontRef>
+        </p:style>
+      </p:cxnSp>
+      <p:cxnSp>
+        <p:nvCxnSpPr>
+          <p:cNvPr id="21" name="Rovná spojnica 20"/>
+          <p:cNvCxnSpPr>
+            <a:stCxn id="6" idx="1"/>
+            <a:endCxn id="12" idx="3"/>
+          </p:cNvCxnSpPr>
+          <p:nvPr/>
+        </p:nvCxnSpPr>
+        <p:spPr>
+          <a:xfrm flipH="1">
+            <a:off x="5141914" y="1447120"/>
+            <a:ext cx="344486" cy="568867"/>
+          </a:xfrm>
+          <a:prstGeom prst="line">
+            <a:avLst/>
+          </a:prstGeom>
+          <a:ln>
+            <a:solidFill>
+              <a:srgbClr val="C00000"/>
+            </a:solidFill>
+          </a:ln>
+        </p:spPr>
+        <p:style>
+          <a:lnRef idx="3">
+            <a:schemeClr val="accent2"/>
+          </a:lnRef>
+          <a:fillRef idx="0">
+            <a:schemeClr val="accent2"/>
+          </a:fillRef>
+          <a:effectRef idx="2">
+            <a:schemeClr val="accent2"/>
+          </a:effectRef>
+          <a:fontRef idx="minor">
+            <a:schemeClr val="tx1"/>
+          </a:fontRef>
+        </p:style>
+      </p:cxnSp>
+    </p:spTree>
+    <p:extLst>
+      <p:ext uri="{BB962C8B-B14F-4D97-AF65-F5344CB8AC3E}">
+        <p14:creationId xmlns:p14="http://schemas.microsoft.com/office/powerpoint/2010/main" val="4195315047"/>
+      </p:ext>
+    </p:extLst>
+  </p:cSld>
+  <p:clrMapOvr>
+    <a:masterClrMapping/>
+  </p:clrMapOvr>
+  <p:timing>
+    <p:tnLst>
+      <p:par>
+        <p:cTn id="1" dur="indefinite" restart="never" nodeType="tmRoot"/>
+      </p:par>
+    </p:tnLst>
+  </p:timing>
+</p:sld>
+</file>
+
+<file path=ppt/slides/slide5.xml><?xml version="1.0" encoding="utf-8"?>
+<p:sld xmlns:a="http://schemas.openxmlformats.org/drawingml/2006/main" xmlns:r="http://schemas.openxmlformats.org/officeDocument/2006/relationships" xmlns:p="http://schemas.openxmlformats.org/presentationml/2006/main">
+  <p:cSld>
+    <p:spTree>
+      <p:nvGrpSpPr>
+        <p:cNvPr id="1" name=""/>
+        <p:cNvGrpSpPr/>
+        <p:nvPr/>
+      </p:nvGrpSpPr>
+      <p:grpSpPr>
+        <a:xfrm>
+          <a:off x="0" y="0"/>
+          <a:ext cx="0" cy="0"/>
+          <a:chOff x="0" y="0"/>
+          <a:chExt cx="0" cy="0"/>
+        </a:xfrm>
+      </p:grpSpPr>
+      <p:sp>
+        <p:nvSpPr>
+          <p:cNvPr id="4" name="Obdĺžnik 3"/>
+          <p:cNvSpPr/>
+          <p:nvPr/>
+        </p:nvSpPr>
+        <p:spPr>
+          <a:xfrm>
+            <a:off x="95250" y="104775"/>
+            <a:ext cx="3867150" cy="2571750"/>
+          </a:xfrm>
+          <a:prstGeom prst="rect">
+            <a:avLst/>
+          </a:prstGeom>
+        </p:spPr>
+        <p:style>
+          <a:lnRef idx="2">
+            <a:schemeClr val="accent6"/>
+          </a:lnRef>
+          <a:fillRef idx="1">
+            <a:schemeClr val="lt1"/>
+          </a:fillRef>
+          <a:effectRef idx="0">
+            <a:schemeClr val="accent6"/>
+          </a:effectRef>
+          <a:fontRef idx="minor">
+            <a:schemeClr val="dk1"/>
+          </a:fontRef>
+        </p:style>
+        <p:txBody>
+          <a:bodyPr rtlCol="0" anchor="ctr"/>
+          <a:lstStyle/>
+          <a:p>
+            <a:pPr algn="ctr"/>
+            <a:endParaRPr lang="sk-SK" dirty="0"/>
+          </a:p>
+        </p:txBody>
+      </p:sp>
+      <p:sp>
+        <p:nvSpPr>
+          <p:cNvPr id="5" name="Obdĺžnik 4"/>
+          <p:cNvSpPr/>
+          <p:nvPr/>
+        </p:nvSpPr>
+        <p:spPr>
+          <a:xfrm>
+            <a:off x="161925" y="1971675"/>
+            <a:ext cx="3695700" cy="638175"/>
+          </a:xfrm>
+          <a:prstGeom prst="rect">
+            <a:avLst/>
+          </a:prstGeom>
+          <a:noFill/>
+          <a:ln w="9525" cap="flat" cmpd="sng" algn="ctr">
+            <a:solidFill>
+              <a:schemeClr val="accent5"/>
+            </a:solidFill>
+            <a:prstDash val="solid"/>
+            <a:round/>
+            <a:headEnd type="none" w="med" len="med"/>
+            <a:tailEnd type="none" w="med" len="med"/>
+          </a:ln>
+        </p:spPr>
+        <p:style>
+          <a:lnRef idx="0">
+            <a:scrgbClr r="0" g="0" b="0"/>
+          </a:lnRef>
+          <a:fillRef idx="0">
+            <a:scrgbClr r="0" g="0" b="0"/>
+          </a:fillRef>
+          <a:effectRef idx="0">
+            <a:scrgbClr r="0" g="0" b="0"/>
+          </a:effectRef>
+          <a:fontRef idx="minor">
+            <a:schemeClr val="accent5"/>
+          </a:fontRef>
+        </p:style>
+        <p:txBody>
+          <a:bodyPr rtlCol="0" anchor="ctr"/>
+          <a:lstStyle/>
+          <a:p>
+            <a:pPr algn="ctr"/>
+            <a:endParaRPr lang="sk-SK"/>
+          </a:p>
+        </p:txBody>
+      </p:sp>
+      <p:sp>
+        <p:nvSpPr>
+          <p:cNvPr id="6" name="Obdĺžnik 5"/>
+          <p:cNvSpPr/>
+          <p:nvPr/>
+        </p:nvSpPr>
+        <p:spPr>
+          <a:xfrm>
+            <a:off x="161925" y="465654"/>
+            <a:ext cx="723900" cy="1420296"/>
+          </a:xfrm>
+          <a:prstGeom prst="rect">
+            <a:avLst/>
+          </a:prstGeom>
+          <a:noFill/>
+          <a:ln w="9525" cap="flat" cmpd="sng" algn="ctr">
+            <a:solidFill>
+              <a:schemeClr val="accent5"/>
+            </a:solidFill>
+            <a:prstDash val="solid"/>
+            <a:round/>
+            <a:headEnd type="none" w="med" len="med"/>
+            <a:tailEnd type="none" w="med" len="med"/>
+          </a:ln>
+        </p:spPr>
+        <p:style>
+          <a:lnRef idx="0">
+            <a:scrgbClr r="0" g="0" b="0"/>
+          </a:lnRef>
+          <a:fillRef idx="0">
+            <a:scrgbClr r="0" g="0" b="0"/>
+          </a:fillRef>
+          <a:effectRef idx="0">
+            <a:scrgbClr r="0" g="0" b="0"/>
+          </a:effectRef>
+          <a:fontRef idx="minor">
+            <a:schemeClr val="accent5"/>
+          </a:fontRef>
+        </p:style>
+        <p:txBody>
+          <a:bodyPr rtlCol="0" anchor="ctr"/>
+          <a:lstStyle/>
+          <a:p>
+            <a:pPr algn="ctr"/>
+            <a:endParaRPr lang="sk-SK"/>
+          </a:p>
+        </p:txBody>
+      </p:sp>
+      <p:sp>
+        <p:nvSpPr>
+          <p:cNvPr id="7" name="Obdĺžnik 6"/>
+          <p:cNvSpPr/>
+          <p:nvPr/>
+        </p:nvSpPr>
+        <p:spPr>
+          <a:xfrm>
+            <a:off x="962025" y="465654"/>
+            <a:ext cx="1085850" cy="1420296"/>
+          </a:xfrm>
+          <a:prstGeom prst="rect">
+            <a:avLst/>
+          </a:prstGeom>
+          <a:noFill/>
+          <a:ln w="9525" cap="flat" cmpd="sng" algn="ctr">
+            <a:solidFill>
+              <a:schemeClr val="accent5"/>
+            </a:solidFill>
+            <a:prstDash val="solid"/>
+            <a:round/>
+            <a:headEnd type="none" w="med" len="med"/>
+            <a:tailEnd type="none" w="med" len="med"/>
+          </a:ln>
+        </p:spPr>
+        <p:style>
+          <a:lnRef idx="0">
+            <a:scrgbClr r="0" g="0" b="0"/>
+          </a:lnRef>
+          <a:fillRef idx="0">
+            <a:scrgbClr r="0" g="0" b="0"/>
+          </a:fillRef>
+          <a:effectRef idx="0">
+            <a:scrgbClr r="0" g="0" b="0"/>
+          </a:effectRef>
+          <a:fontRef idx="minor">
+            <a:schemeClr val="accent5"/>
+          </a:fontRef>
+        </p:style>
+        <p:txBody>
+          <a:bodyPr rtlCol="0" anchor="ctr"/>
+          <a:lstStyle/>
+          <a:p>
+            <a:pPr algn="ctr"/>
+            <a:endParaRPr lang="sk-SK"/>
+          </a:p>
+        </p:txBody>
+      </p:sp>
+      <p:sp>
+        <p:nvSpPr>
+          <p:cNvPr id="8" name="Obdĺžnik 7"/>
+          <p:cNvSpPr/>
+          <p:nvPr/>
+        </p:nvSpPr>
+        <p:spPr>
+          <a:xfrm>
+            <a:off x="2133600" y="465654"/>
+            <a:ext cx="971550" cy="1420296"/>
+          </a:xfrm>
+          <a:prstGeom prst="rect">
+            <a:avLst/>
+          </a:prstGeom>
+          <a:noFill/>
+          <a:ln w="9525" cap="flat" cmpd="sng" algn="ctr">
+            <a:solidFill>
+              <a:schemeClr val="accent5"/>
+            </a:solidFill>
+            <a:prstDash val="solid"/>
+            <a:round/>
+            <a:headEnd type="none" w="med" len="med"/>
+            <a:tailEnd type="none" w="med" len="med"/>
+          </a:ln>
+        </p:spPr>
+        <p:style>
+          <a:lnRef idx="0">
+            <a:scrgbClr r="0" g="0" b="0"/>
+          </a:lnRef>
+          <a:fillRef idx="0">
+            <a:scrgbClr r="0" g="0" b="0"/>
+          </a:fillRef>
+          <a:effectRef idx="0">
+            <a:scrgbClr r="0" g="0" b="0"/>
+          </a:effectRef>
+          <a:fontRef idx="minor">
+            <a:schemeClr val="accent5"/>
+          </a:fontRef>
+        </p:style>
+        <p:txBody>
+          <a:bodyPr rtlCol="0" anchor="ctr"/>
+          <a:lstStyle/>
+          <a:p>
+            <a:pPr algn="ctr"/>
+            <a:endParaRPr lang="sk-SK"/>
+          </a:p>
+        </p:txBody>
+      </p:sp>
+      <p:sp>
+        <p:nvSpPr>
+          <p:cNvPr id="9" name="Obdĺžnik 8"/>
+          <p:cNvSpPr/>
+          <p:nvPr/>
+        </p:nvSpPr>
+        <p:spPr>
+          <a:xfrm>
+            <a:off x="3200400" y="465654"/>
+            <a:ext cx="657225" cy="1420296"/>
+          </a:xfrm>
+          <a:prstGeom prst="rect">
+            <a:avLst/>
+          </a:prstGeom>
+          <a:noFill/>
+          <a:ln w="9525" cap="flat" cmpd="sng" algn="ctr">
+            <a:solidFill>
+              <a:schemeClr val="accent5"/>
+            </a:solidFill>
+            <a:prstDash val="solid"/>
+            <a:round/>
+            <a:headEnd type="none" w="med" len="med"/>
+            <a:tailEnd type="none" w="med" len="med"/>
+          </a:ln>
+        </p:spPr>
+        <p:style>
+          <a:lnRef idx="0">
+            <a:scrgbClr r="0" g="0" b="0"/>
+          </a:lnRef>
+          <a:fillRef idx="0">
+            <a:scrgbClr r="0" g="0" b="0"/>
+          </a:fillRef>
+          <a:effectRef idx="0">
+            <a:scrgbClr r="0" g="0" b="0"/>
+          </a:effectRef>
+          <a:fontRef idx="minor">
+            <a:schemeClr val="accent5"/>
+          </a:fontRef>
+        </p:style>
+        <p:txBody>
+          <a:bodyPr rtlCol="0" anchor="ctr"/>
+          <a:lstStyle/>
+          <a:p>
+            <a:pPr algn="ctr"/>
+            <a:endParaRPr lang="sk-SK"/>
+          </a:p>
+        </p:txBody>
+      </p:sp>
+      <p:sp>
+        <p:nvSpPr>
+          <p:cNvPr id="10" name="BlokTextu 9"/>
+          <p:cNvSpPr txBox="1"/>
+          <p:nvPr/>
+        </p:nvSpPr>
+        <p:spPr>
+          <a:xfrm>
+            <a:off x="95250" y="96322"/>
+            <a:ext cx="2817887" cy="369332"/>
+          </a:xfrm>
+          <a:prstGeom prst="rect">
+            <a:avLst/>
+          </a:prstGeom>
+          <a:noFill/>
+        </p:spPr>
+        <p:txBody>
+          <a:bodyPr wrap="none" rtlCol="0">
+            <a:spAutoFit/>
+          </a:bodyPr>
+          <a:lstStyle/>
+          <a:p>
+            <a:r>
+              <a:rPr lang="sk-SK" dirty="0" smtClean="0"/>
+              <a:t>Základné rozloženie záložiek</a:t>
+            </a:r>
+            <a:endParaRPr lang="sk-SK" dirty="0"/>
+          </a:p>
+        </p:txBody>
+      </p:sp>
+      <p:sp>
+        <p:nvSpPr>
+          <p:cNvPr id="11" name="BlokTextu 10"/>
+          <p:cNvSpPr txBox="1"/>
+          <p:nvPr/>
+        </p:nvSpPr>
+        <p:spPr>
+          <a:xfrm rot="18900000">
+            <a:off x="1692707" y="2152262"/>
+            <a:ext cx="672235" cy="276999"/>
+          </a:xfrm>
+          <a:prstGeom prst="rect">
+            <a:avLst/>
+          </a:prstGeom>
+          <a:noFill/>
+        </p:spPr>
+        <p:txBody>
+          <a:bodyPr wrap="none" rtlCol="0">
+            <a:spAutoFit/>
+          </a:bodyPr>
+          <a:lstStyle/>
+          <a:p>
+            <a:r>
+              <a:rPr lang="sk-SK" sz="1200" dirty="0" smtClean="0"/>
+              <a:t>Konzola</a:t>
+            </a:r>
+            <a:endParaRPr lang="sk-SK" sz="1200" dirty="0"/>
+          </a:p>
+        </p:txBody>
+      </p:sp>
+      <p:sp>
+        <p:nvSpPr>
+          <p:cNvPr id="12" name="BlokTextu 11"/>
+          <p:cNvSpPr txBox="1"/>
+          <p:nvPr/>
+        </p:nvSpPr>
+        <p:spPr>
+          <a:xfrm rot="18900000">
+            <a:off x="-48165" y="968459"/>
+            <a:ext cx="1052724" cy="461665"/>
+          </a:xfrm>
+          <a:prstGeom prst="rect">
+            <a:avLst/>
+          </a:prstGeom>
+          <a:noFill/>
+        </p:spPr>
+        <p:txBody>
+          <a:bodyPr wrap="none" rtlCol="0">
+            <a:spAutoFit/>
+          </a:bodyPr>
+          <a:lstStyle/>
+          <a:p>
+            <a:pPr algn="ctr"/>
+            <a:r>
+              <a:rPr lang="sk-SK" sz="1200" dirty="0" smtClean="0"/>
+              <a:t>Ponuka</a:t>
+            </a:r>
+          </a:p>
+          <a:p>
+            <a:pPr algn="ctr"/>
+            <a:r>
+              <a:rPr lang="sk-SK" sz="1200" dirty="0" smtClean="0"/>
+              <a:t>komponentov</a:t>
+            </a:r>
+            <a:endParaRPr lang="sk-SK" sz="1200" dirty="0"/>
+          </a:p>
+        </p:txBody>
+      </p:sp>
+      <p:sp>
+        <p:nvSpPr>
+          <p:cNvPr id="13" name="BlokTextu 12"/>
+          <p:cNvSpPr txBox="1"/>
+          <p:nvPr/>
+        </p:nvSpPr>
+        <p:spPr>
+          <a:xfrm rot="18900000">
+            <a:off x="977831" y="852637"/>
+            <a:ext cx="1052724" cy="646331"/>
+          </a:xfrm>
+          <a:prstGeom prst="rect">
+            <a:avLst/>
+          </a:prstGeom>
+          <a:noFill/>
+        </p:spPr>
+        <p:txBody>
+          <a:bodyPr wrap="none" rtlCol="0">
+            <a:spAutoFit/>
+          </a:bodyPr>
+          <a:lstStyle/>
+          <a:p>
+            <a:pPr algn="ctr"/>
+            <a:r>
+              <a:rPr lang="sk-SK" sz="1200" dirty="0" smtClean="0"/>
+              <a:t>Inštancie </a:t>
+            </a:r>
+          </a:p>
+          <a:p>
+            <a:pPr algn="ctr"/>
+            <a:r>
+              <a:rPr lang="sk-SK" sz="1200" dirty="0"/>
+              <a:t>k</a:t>
+            </a:r>
+            <a:r>
+              <a:rPr lang="sk-SK" sz="1200" dirty="0" smtClean="0"/>
+              <a:t>omponentov</a:t>
+            </a:r>
+          </a:p>
+          <a:p>
+            <a:pPr algn="ctr"/>
+            <a:r>
+              <a:rPr lang="sk-SK" sz="1200" dirty="0" smtClean="0"/>
+              <a:t>projektu</a:t>
+            </a:r>
+            <a:endParaRPr lang="sk-SK" sz="1200" dirty="0"/>
+          </a:p>
+        </p:txBody>
+      </p:sp>
+      <p:sp>
+        <p:nvSpPr>
+          <p:cNvPr id="14" name="BlokTextu 13"/>
+          <p:cNvSpPr txBox="1"/>
+          <p:nvPr/>
+        </p:nvSpPr>
+        <p:spPr>
+          <a:xfrm rot="18900000">
+            <a:off x="2148098" y="838972"/>
+            <a:ext cx="913905" cy="646331"/>
+          </a:xfrm>
+          <a:prstGeom prst="rect">
+            <a:avLst/>
+          </a:prstGeom>
+          <a:noFill/>
+        </p:spPr>
+        <p:txBody>
+          <a:bodyPr wrap="none" rtlCol="0">
+            <a:spAutoFit/>
+          </a:bodyPr>
+          <a:lstStyle/>
+          <a:p>
+            <a:pPr algn="ctr"/>
+            <a:r>
+              <a:rPr lang="sk-SK" sz="1200" dirty="0" smtClean="0"/>
+              <a:t>Editor</a:t>
+            </a:r>
+          </a:p>
+          <a:p>
+            <a:pPr algn="ctr"/>
+            <a:r>
+              <a:rPr lang="sk-SK" sz="1200" dirty="0" smtClean="0"/>
+              <a:t>zdrojového </a:t>
+            </a:r>
+          </a:p>
+          <a:p>
+            <a:pPr algn="ctr"/>
+            <a:r>
+              <a:rPr lang="sk-SK" sz="1200" dirty="0" smtClean="0"/>
+              <a:t>kódu</a:t>
+            </a:r>
+          </a:p>
+        </p:txBody>
+      </p:sp>
+      <p:sp>
+        <p:nvSpPr>
+          <p:cNvPr id="15" name="BlokTextu 14"/>
+          <p:cNvSpPr txBox="1"/>
+          <p:nvPr/>
+        </p:nvSpPr>
+        <p:spPr>
+          <a:xfrm rot="18900000">
+            <a:off x="3165359" y="931305"/>
+            <a:ext cx="798360" cy="461665"/>
+          </a:xfrm>
+          <a:prstGeom prst="rect">
+            <a:avLst/>
+          </a:prstGeom>
+          <a:noFill/>
+        </p:spPr>
+        <p:txBody>
+          <a:bodyPr wrap="none" rtlCol="0">
+            <a:spAutoFit/>
+          </a:bodyPr>
+          <a:lstStyle/>
+          <a:p>
+            <a:r>
+              <a:rPr lang="sk-SK" sz="1200" dirty="0" smtClean="0"/>
+              <a:t>Vlastnosti</a:t>
+            </a:r>
+          </a:p>
+          <a:p>
+            <a:r>
+              <a:rPr lang="sk-SK" sz="1200" dirty="0" smtClean="0"/>
+              <a:t>inštancií</a:t>
+            </a:r>
+            <a:endParaRPr lang="sk-SK" sz="1200" dirty="0"/>
+          </a:p>
+        </p:txBody>
+      </p:sp>
+      <p:sp>
+        <p:nvSpPr>
+          <p:cNvPr id="16" name="Obdĺžnik 15"/>
+          <p:cNvSpPr/>
+          <p:nvPr/>
+        </p:nvSpPr>
+        <p:spPr>
+          <a:xfrm>
+            <a:off x="4127723" y="96322"/>
+            <a:ext cx="3903861" cy="2571750"/>
+          </a:xfrm>
+          <a:prstGeom prst="rect">
+            <a:avLst/>
+          </a:prstGeom>
+        </p:spPr>
+        <p:style>
+          <a:lnRef idx="2">
+            <a:schemeClr val="accent6"/>
+          </a:lnRef>
+          <a:fillRef idx="1">
+            <a:schemeClr val="lt1"/>
+          </a:fillRef>
+          <a:effectRef idx="0">
+            <a:schemeClr val="accent6"/>
+          </a:effectRef>
+          <a:fontRef idx="minor">
+            <a:schemeClr val="dk1"/>
+          </a:fontRef>
+        </p:style>
+        <p:txBody>
+          <a:bodyPr rtlCol="0" anchor="ctr"/>
+          <a:lstStyle/>
+          <a:p>
+            <a:pPr algn="ctr"/>
+            <a:endParaRPr lang="sk-SK" dirty="0"/>
+          </a:p>
+        </p:txBody>
+      </p:sp>
+      <p:sp>
+        <p:nvSpPr>
+          <p:cNvPr id="17" name="Obdĺžnik 16"/>
+          <p:cNvSpPr/>
+          <p:nvPr/>
+        </p:nvSpPr>
+        <p:spPr>
+          <a:xfrm>
+            <a:off x="4231109" y="2298534"/>
+            <a:ext cx="3695700" cy="302863"/>
+          </a:xfrm>
+          <a:prstGeom prst="rect">
+            <a:avLst/>
+          </a:prstGeom>
+          <a:noFill/>
+          <a:ln w="9525" cap="flat" cmpd="sng" algn="ctr">
+            <a:solidFill>
+              <a:schemeClr val="accent5"/>
+            </a:solidFill>
+            <a:prstDash val="solid"/>
+            <a:round/>
+            <a:headEnd type="none" w="med" len="med"/>
+            <a:tailEnd type="none" w="med" len="med"/>
+          </a:ln>
+        </p:spPr>
+        <p:style>
+          <a:lnRef idx="0">
+            <a:scrgbClr r="0" g="0" b="0"/>
+          </a:lnRef>
+          <a:fillRef idx="0">
+            <a:scrgbClr r="0" g="0" b="0"/>
+          </a:fillRef>
+          <a:effectRef idx="0">
+            <a:scrgbClr r="0" g="0" b="0"/>
+          </a:effectRef>
+          <a:fontRef idx="minor">
+            <a:schemeClr val="accent5"/>
+          </a:fontRef>
+        </p:style>
+        <p:txBody>
+          <a:bodyPr rtlCol="0" anchor="ctr"/>
+          <a:lstStyle/>
+          <a:p>
+            <a:pPr algn="ctr"/>
+            <a:endParaRPr lang="sk-SK"/>
+          </a:p>
+        </p:txBody>
+      </p:sp>
+      <p:sp>
+        <p:nvSpPr>
+          <p:cNvPr id="18" name="Obdĺžnik 17"/>
+          <p:cNvSpPr/>
+          <p:nvPr/>
+        </p:nvSpPr>
+        <p:spPr>
+          <a:xfrm>
+            <a:off x="4231109" y="457201"/>
+            <a:ext cx="723900" cy="899530"/>
+          </a:xfrm>
+          <a:prstGeom prst="rect">
+            <a:avLst/>
+          </a:prstGeom>
+          <a:noFill/>
+          <a:ln w="9525" cap="flat" cmpd="sng" algn="ctr">
+            <a:solidFill>
+              <a:schemeClr val="accent5"/>
+            </a:solidFill>
+            <a:prstDash val="solid"/>
+            <a:round/>
+            <a:headEnd type="none" w="med" len="med"/>
+            <a:tailEnd type="none" w="med" len="med"/>
+          </a:ln>
+        </p:spPr>
+        <p:style>
+          <a:lnRef idx="0">
+            <a:scrgbClr r="0" g="0" b="0"/>
+          </a:lnRef>
+          <a:fillRef idx="0">
+            <a:scrgbClr r="0" g="0" b="0"/>
+          </a:fillRef>
+          <a:effectRef idx="0">
+            <a:scrgbClr r="0" g="0" b="0"/>
+          </a:effectRef>
+          <a:fontRef idx="minor">
+            <a:schemeClr val="accent5"/>
+          </a:fontRef>
+        </p:style>
+        <p:txBody>
+          <a:bodyPr rtlCol="0" anchor="ctr"/>
+          <a:lstStyle/>
+          <a:p>
+            <a:pPr algn="ctr"/>
+            <a:endParaRPr lang="sk-SK"/>
+          </a:p>
+        </p:txBody>
+      </p:sp>
+      <p:sp>
+        <p:nvSpPr>
+          <p:cNvPr id="19" name="Obdĺžnik 18"/>
+          <p:cNvSpPr/>
+          <p:nvPr/>
+        </p:nvSpPr>
+        <p:spPr>
+          <a:xfrm>
+            <a:off x="5031208" y="457201"/>
+            <a:ext cx="1402405" cy="1752598"/>
+          </a:xfrm>
+          <a:prstGeom prst="rect">
+            <a:avLst/>
+          </a:prstGeom>
+          <a:noFill/>
+          <a:ln w="9525" cap="flat" cmpd="sng" algn="ctr">
+            <a:solidFill>
+              <a:schemeClr val="accent5"/>
+            </a:solidFill>
+            <a:prstDash val="solid"/>
+            <a:round/>
+            <a:headEnd type="none" w="med" len="med"/>
+            <a:tailEnd type="none" w="med" len="med"/>
+          </a:ln>
+        </p:spPr>
+        <p:style>
+          <a:lnRef idx="0">
+            <a:scrgbClr r="0" g="0" b="0"/>
+          </a:lnRef>
+          <a:fillRef idx="0">
+            <a:scrgbClr r="0" g="0" b="0"/>
+          </a:fillRef>
+          <a:effectRef idx="0">
+            <a:scrgbClr r="0" g="0" b="0"/>
+          </a:effectRef>
+          <a:fontRef idx="minor">
+            <a:schemeClr val="accent5"/>
+          </a:fontRef>
+        </p:style>
+        <p:txBody>
+          <a:bodyPr rtlCol="0" anchor="ctr"/>
+          <a:lstStyle/>
+          <a:p>
+            <a:pPr algn="ctr"/>
+            <a:endParaRPr lang="sk-SK"/>
+          </a:p>
+        </p:txBody>
+      </p:sp>
+      <p:sp>
+        <p:nvSpPr>
+          <p:cNvPr id="20" name="Obdĺžnik 19"/>
+          <p:cNvSpPr/>
+          <p:nvPr/>
+        </p:nvSpPr>
+        <p:spPr>
+          <a:xfrm>
+            <a:off x="6548066" y="457200"/>
+            <a:ext cx="1365409" cy="1752599"/>
+          </a:xfrm>
+          <a:prstGeom prst="rect">
+            <a:avLst/>
+          </a:prstGeom>
+          <a:noFill/>
+          <a:ln w="9525" cap="flat" cmpd="sng" algn="ctr">
+            <a:solidFill>
+              <a:schemeClr val="accent5"/>
+            </a:solidFill>
+            <a:prstDash val="solid"/>
+            <a:round/>
+            <a:headEnd type="none" w="med" len="med"/>
+            <a:tailEnd type="none" w="med" len="med"/>
+          </a:ln>
+        </p:spPr>
+        <p:style>
+          <a:lnRef idx="0">
+            <a:scrgbClr r="0" g="0" b="0"/>
+          </a:lnRef>
+          <a:fillRef idx="0">
+            <a:scrgbClr r="0" g="0" b="0"/>
+          </a:fillRef>
+          <a:effectRef idx="0">
+            <a:scrgbClr r="0" g="0" b="0"/>
+          </a:effectRef>
+          <a:fontRef idx="minor">
+            <a:schemeClr val="accent5"/>
+          </a:fontRef>
+        </p:style>
+        <p:txBody>
+          <a:bodyPr rtlCol="0" anchor="ctr"/>
+          <a:lstStyle/>
+          <a:p>
+            <a:pPr algn="ctr"/>
+            <a:endParaRPr lang="sk-SK"/>
+          </a:p>
+        </p:txBody>
+      </p:sp>
+      <p:sp>
+        <p:nvSpPr>
+          <p:cNvPr id="21" name="Obdĺžnik 20"/>
+          <p:cNvSpPr/>
+          <p:nvPr/>
+        </p:nvSpPr>
+        <p:spPr>
+          <a:xfrm>
+            <a:off x="4231109" y="1407561"/>
+            <a:ext cx="715069" cy="803660"/>
+          </a:xfrm>
+          <a:prstGeom prst="rect">
+            <a:avLst/>
+          </a:prstGeom>
+          <a:noFill/>
+          <a:ln w="9525" cap="flat" cmpd="sng" algn="ctr">
+            <a:solidFill>
+              <a:schemeClr val="accent5"/>
+            </a:solidFill>
+            <a:prstDash val="solid"/>
+            <a:round/>
+            <a:headEnd type="none" w="med" len="med"/>
+            <a:tailEnd type="none" w="med" len="med"/>
+          </a:ln>
+        </p:spPr>
+        <p:style>
+          <a:lnRef idx="0">
+            <a:scrgbClr r="0" g="0" b="0"/>
+          </a:lnRef>
+          <a:fillRef idx="0">
+            <a:scrgbClr r="0" g="0" b="0"/>
+          </a:fillRef>
+          <a:effectRef idx="0">
+            <a:scrgbClr r="0" g="0" b="0"/>
+          </a:effectRef>
+          <a:fontRef idx="minor">
+            <a:schemeClr val="accent5"/>
+          </a:fontRef>
+        </p:style>
+        <p:txBody>
+          <a:bodyPr rtlCol="0" anchor="ctr"/>
+          <a:lstStyle/>
+          <a:p>
+            <a:pPr algn="ctr"/>
+            <a:endParaRPr lang="sk-SK"/>
+          </a:p>
+        </p:txBody>
+      </p:sp>
+      <p:sp>
+        <p:nvSpPr>
+          <p:cNvPr id="22" name="BlokTextu 21"/>
+          <p:cNvSpPr txBox="1"/>
+          <p:nvPr/>
+        </p:nvSpPr>
+        <p:spPr>
+          <a:xfrm>
+            <a:off x="4164434" y="87869"/>
+            <a:ext cx="3131819" cy="369332"/>
+          </a:xfrm>
+          <a:prstGeom prst="rect">
+            <a:avLst/>
+          </a:prstGeom>
+          <a:noFill/>
+        </p:spPr>
+        <p:txBody>
+          <a:bodyPr wrap="none" rtlCol="0">
+            <a:spAutoFit/>
+          </a:bodyPr>
+          <a:lstStyle/>
+          <a:p>
+            <a:r>
+              <a:rPr lang="sk-SK" dirty="0" smtClean="0"/>
+              <a:t>Alternatívne rozloženie záložiek</a:t>
+            </a:r>
+            <a:endParaRPr lang="sk-SK" dirty="0"/>
+          </a:p>
+        </p:txBody>
+      </p:sp>
+      <p:sp>
+        <p:nvSpPr>
+          <p:cNvPr id="23" name="BlokTextu 22"/>
+          <p:cNvSpPr txBox="1"/>
+          <p:nvPr/>
+        </p:nvSpPr>
+        <p:spPr>
+          <a:xfrm>
+            <a:off x="5742841" y="2311465"/>
+            <a:ext cx="672235" cy="276999"/>
+          </a:xfrm>
+          <a:prstGeom prst="rect">
+            <a:avLst/>
+          </a:prstGeom>
+          <a:noFill/>
+        </p:spPr>
+        <p:txBody>
+          <a:bodyPr wrap="none" rtlCol="0">
+            <a:spAutoFit/>
+          </a:bodyPr>
+          <a:lstStyle/>
+          <a:p>
+            <a:r>
+              <a:rPr lang="sk-SK" sz="1200" dirty="0" smtClean="0"/>
+              <a:t>Konzola</a:t>
+            </a:r>
+            <a:endParaRPr lang="sk-SK" sz="1200" dirty="0"/>
+          </a:p>
+        </p:txBody>
+      </p:sp>
+      <p:sp>
+        <p:nvSpPr>
+          <p:cNvPr id="24" name="BlokTextu 23"/>
+          <p:cNvSpPr txBox="1"/>
+          <p:nvPr/>
+        </p:nvSpPr>
+        <p:spPr>
+          <a:xfrm rot="18900000">
+            <a:off x="5208721" y="1012170"/>
+            <a:ext cx="1052724" cy="646331"/>
+          </a:xfrm>
+          <a:prstGeom prst="rect">
+            <a:avLst/>
+          </a:prstGeom>
+          <a:noFill/>
+        </p:spPr>
+        <p:txBody>
+          <a:bodyPr wrap="none" rtlCol="0">
+            <a:spAutoFit/>
+          </a:bodyPr>
+          <a:lstStyle/>
+          <a:p>
+            <a:pPr algn="ctr"/>
+            <a:r>
+              <a:rPr lang="sk-SK" sz="1200" dirty="0" smtClean="0"/>
+              <a:t>Inštancie </a:t>
+            </a:r>
+          </a:p>
+          <a:p>
+            <a:pPr algn="ctr"/>
+            <a:r>
+              <a:rPr lang="sk-SK" sz="1200" dirty="0"/>
+              <a:t>k</a:t>
+            </a:r>
+            <a:r>
+              <a:rPr lang="sk-SK" sz="1200" dirty="0" smtClean="0"/>
+              <a:t>omponentov</a:t>
+            </a:r>
+          </a:p>
+          <a:p>
+            <a:pPr algn="ctr"/>
+            <a:r>
+              <a:rPr lang="sk-SK" sz="1200" dirty="0" smtClean="0"/>
+              <a:t>projektu</a:t>
+            </a:r>
+            <a:endParaRPr lang="sk-SK" sz="1200" dirty="0"/>
+          </a:p>
+        </p:txBody>
+      </p:sp>
+      <p:sp>
+        <p:nvSpPr>
+          <p:cNvPr id="25" name="BlokTextu 24"/>
+          <p:cNvSpPr txBox="1"/>
+          <p:nvPr/>
+        </p:nvSpPr>
+        <p:spPr>
+          <a:xfrm rot="18900000">
+            <a:off x="6787852" y="995704"/>
+            <a:ext cx="913905" cy="646331"/>
+          </a:xfrm>
+          <a:prstGeom prst="rect">
+            <a:avLst/>
+          </a:prstGeom>
+          <a:noFill/>
+        </p:spPr>
+        <p:txBody>
+          <a:bodyPr wrap="none" rtlCol="0">
+            <a:spAutoFit/>
+          </a:bodyPr>
+          <a:lstStyle/>
+          <a:p>
+            <a:pPr algn="ctr"/>
+            <a:r>
+              <a:rPr lang="sk-SK" sz="1200" dirty="0" smtClean="0"/>
+              <a:t>Editor</a:t>
+            </a:r>
+          </a:p>
+          <a:p>
+            <a:pPr algn="ctr"/>
+            <a:r>
+              <a:rPr lang="sk-SK" sz="1200" dirty="0" smtClean="0"/>
+              <a:t>zdrojového </a:t>
+            </a:r>
+          </a:p>
+          <a:p>
+            <a:pPr algn="ctr"/>
+            <a:r>
+              <a:rPr lang="sk-SK" sz="1200" dirty="0" smtClean="0"/>
+              <a:t>kódu</a:t>
+            </a:r>
+          </a:p>
+        </p:txBody>
+      </p:sp>
+      <p:sp>
+        <p:nvSpPr>
+          <p:cNvPr id="26" name="BlokTextu 25"/>
+          <p:cNvSpPr txBox="1"/>
+          <p:nvPr/>
+        </p:nvSpPr>
+        <p:spPr>
+          <a:xfrm rot="18900000">
+            <a:off x="4239315" y="1585732"/>
+            <a:ext cx="798360" cy="461665"/>
+          </a:xfrm>
+          <a:prstGeom prst="rect">
+            <a:avLst/>
+          </a:prstGeom>
+          <a:noFill/>
+        </p:spPr>
+        <p:txBody>
+          <a:bodyPr wrap="none" rtlCol="0">
+            <a:spAutoFit/>
+          </a:bodyPr>
+          <a:lstStyle/>
+          <a:p>
+            <a:r>
+              <a:rPr lang="sk-SK" sz="1200" dirty="0" smtClean="0"/>
+              <a:t>Vlastnosti</a:t>
+            </a:r>
+          </a:p>
+          <a:p>
+            <a:r>
+              <a:rPr lang="sk-SK" sz="1200" dirty="0" smtClean="0"/>
+              <a:t>inštancií</a:t>
+            </a:r>
+            <a:endParaRPr lang="sk-SK" sz="1200" dirty="0"/>
+          </a:p>
+        </p:txBody>
+      </p:sp>
+      <p:sp>
+        <p:nvSpPr>
+          <p:cNvPr id="27" name="BlokTextu 26"/>
+          <p:cNvSpPr txBox="1"/>
+          <p:nvPr/>
+        </p:nvSpPr>
+        <p:spPr>
+          <a:xfrm rot="18900000">
+            <a:off x="4025828" y="643884"/>
+            <a:ext cx="1052724" cy="461665"/>
+          </a:xfrm>
+          <a:prstGeom prst="rect">
+            <a:avLst/>
+          </a:prstGeom>
+          <a:noFill/>
+        </p:spPr>
+        <p:txBody>
+          <a:bodyPr wrap="none" rtlCol="0">
+            <a:spAutoFit/>
+          </a:bodyPr>
+          <a:lstStyle/>
+          <a:p>
+            <a:pPr algn="ctr"/>
+            <a:r>
+              <a:rPr lang="sk-SK" sz="1200" dirty="0" smtClean="0"/>
+              <a:t>Ponuka</a:t>
+            </a:r>
+          </a:p>
+          <a:p>
+            <a:pPr algn="ctr"/>
+            <a:r>
+              <a:rPr lang="sk-SK" sz="1200" dirty="0" smtClean="0"/>
+              <a:t>komponentov</a:t>
+            </a:r>
+            <a:endParaRPr lang="sk-SK" sz="1200" dirty="0"/>
+          </a:p>
+        </p:txBody>
+      </p:sp>
+    </p:spTree>
+    <p:extLst>
+      <p:ext uri="{BB962C8B-B14F-4D97-AF65-F5344CB8AC3E}">
+        <p14:creationId xmlns:p14="http://schemas.microsoft.com/office/powerpoint/2010/main" val="1072385494"/>
+      </p:ext>
+    </p:extLst>
+  </p:cSld>
+  <p:clrMapOvr>
+    <a:masterClrMapping/>
+  </p:clrMapOvr>
+  <p:timing>
+    <p:tnLst>
+      <p:par>
+        <p:cTn id="1" dur="indefinite" restart="never" nodeType="tmRoot"/>
+      </p:par>
+    </p:tnLst>
+  </p:timing>
 </p:sld>
 </file>
 

</xml_diff>

<commit_message>
Pridany abstrakt pre ucely SVK, doplnene obrazky a prve zapracovanie pripomienok od Fera.
</commit_message>
<xml_diff>
--- a/seminare/diplomovy-seminar-1/pics/DiplomovkaSchemy.pptx
+++ b/seminare/diplomovy-seminar-1/pics/DiplomovkaSchemy.pptx
@@ -10,6 +10,8 @@
     <p:sldId id="258" r:id="rId4"/>
     <p:sldId id="259" r:id="rId5"/>
     <p:sldId id="260" r:id="rId6"/>
+    <p:sldId id="261" r:id="rId7"/>
+    <p:sldId id="262" r:id="rId8"/>
   </p:sldIdLst>
   <p:sldSz cx="12192000" cy="6858000"/>
   <p:notesSz cx="6858000" cy="9144000"/>
@@ -247,7 +249,7 @@
           <a:p>
             <a:fld id="{F8CAFAE9-194C-4790-A945-25BD67049D41}" type="datetimeFigureOut">
               <a:rPr lang="sk-SK" smtClean="0"/>
-              <a:t>26. 03. 2018</a:t>
+              <a:t>08. 04. 2018</a:t>
             </a:fld>
             <a:endParaRPr lang="sk-SK"/>
           </a:p>
@@ -417,7 +419,7 @@
           <a:p>
             <a:fld id="{F8CAFAE9-194C-4790-A945-25BD67049D41}" type="datetimeFigureOut">
               <a:rPr lang="sk-SK" smtClean="0"/>
-              <a:t>26. 03. 2018</a:t>
+              <a:t>08. 04. 2018</a:t>
             </a:fld>
             <a:endParaRPr lang="sk-SK"/>
           </a:p>
@@ -597,7 +599,7 @@
           <a:p>
             <a:fld id="{F8CAFAE9-194C-4790-A945-25BD67049D41}" type="datetimeFigureOut">
               <a:rPr lang="sk-SK" smtClean="0"/>
-              <a:t>26. 03. 2018</a:t>
+              <a:t>08. 04. 2018</a:t>
             </a:fld>
             <a:endParaRPr lang="sk-SK"/>
           </a:p>
@@ -767,7 +769,7 @@
           <a:p>
             <a:fld id="{F8CAFAE9-194C-4790-A945-25BD67049D41}" type="datetimeFigureOut">
               <a:rPr lang="sk-SK" smtClean="0"/>
-              <a:t>26. 03. 2018</a:t>
+              <a:t>08. 04. 2018</a:t>
             </a:fld>
             <a:endParaRPr lang="sk-SK"/>
           </a:p>
@@ -1013,7 +1015,7 @@
           <a:p>
             <a:fld id="{F8CAFAE9-194C-4790-A945-25BD67049D41}" type="datetimeFigureOut">
               <a:rPr lang="sk-SK" smtClean="0"/>
-              <a:t>26. 03. 2018</a:t>
+              <a:t>08. 04. 2018</a:t>
             </a:fld>
             <a:endParaRPr lang="sk-SK"/>
           </a:p>
@@ -1245,7 +1247,7 @@
           <a:p>
             <a:fld id="{F8CAFAE9-194C-4790-A945-25BD67049D41}" type="datetimeFigureOut">
               <a:rPr lang="sk-SK" smtClean="0"/>
-              <a:t>26. 03. 2018</a:t>
+              <a:t>08. 04. 2018</a:t>
             </a:fld>
             <a:endParaRPr lang="sk-SK"/>
           </a:p>
@@ -1612,7 +1614,7 @@
           <a:p>
             <a:fld id="{F8CAFAE9-194C-4790-A945-25BD67049D41}" type="datetimeFigureOut">
               <a:rPr lang="sk-SK" smtClean="0"/>
-              <a:t>26. 03. 2018</a:t>
+              <a:t>08. 04. 2018</a:t>
             </a:fld>
             <a:endParaRPr lang="sk-SK"/>
           </a:p>
@@ -1730,7 +1732,7 @@
           <a:p>
             <a:fld id="{F8CAFAE9-194C-4790-A945-25BD67049D41}" type="datetimeFigureOut">
               <a:rPr lang="sk-SK" smtClean="0"/>
-              <a:t>26. 03. 2018</a:t>
+              <a:t>08. 04. 2018</a:t>
             </a:fld>
             <a:endParaRPr lang="sk-SK"/>
           </a:p>
@@ -1825,7 +1827,7 @@
           <a:p>
             <a:fld id="{F8CAFAE9-194C-4790-A945-25BD67049D41}" type="datetimeFigureOut">
               <a:rPr lang="sk-SK" smtClean="0"/>
-              <a:t>26. 03. 2018</a:t>
+              <a:t>08. 04. 2018</a:t>
             </a:fld>
             <a:endParaRPr lang="sk-SK"/>
           </a:p>
@@ -2102,7 +2104,7 @@
           <a:p>
             <a:fld id="{F8CAFAE9-194C-4790-A945-25BD67049D41}" type="datetimeFigureOut">
               <a:rPr lang="sk-SK" smtClean="0"/>
-              <a:t>26. 03. 2018</a:t>
+              <a:t>08. 04. 2018</a:t>
             </a:fld>
             <a:endParaRPr lang="sk-SK"/>
           </a:p>
@@ -2355,7 +2357,7 @@
           <a:p>
             <a:fld id="{F8CAFAE9-194C-4790-A945-25BD67049D41}" type="datetimeFigureOut">
               <a:rPr lang="sk-SK" smtClean="0"/>
-              <a:t>26. 03. 2018</a:t>
+              <a:t>08. 04. 2018</a:t>
             </a:fld>
             <a:endParaRPr lang="sk-SK"/>
           </a:p>
@@ -2568,7 +2570,7 @@
           <a:p>
             <a:fld id="{F8CAFAE9-194C-4790-A945-25BD67049D41}" type="datetimeFigureOut">
               <a:rPr lang="sk-SK" smtClean="0"/>
-              <a:t>26. 03. 2018</a:t>
+              <a:t>08. 04. 2018</a:t>
             </a:fld>
             <a:endParaRPr lang="sk-SK"/>
           </a:p>
@@ -8651,6 +8653,1839 @@
 </p:sld>
 </file>
 
+<file path=ppt/slides/slide6.xml><?xml version="1.0" encoding="utf-8"?>
+<p:sld xmlns:a="http://schemas.openxmlformats.org/drawingml/2006/main" xmlns:r="http://schemas.openxmlformats.org/officeDocument/2006/relationships" xmlns:p="http://schemas.openxmlformats.org/presentationml/2006/main">
+  <p:cSld>
+    <p:spTree>
+      <p:nvGrpSpPr>
+        <p:cNvPr id="1" name=""/>
+        <p:cNvGrpSpPr/>
+        <p:nvPr/>
+      </p:nvGrpSpPr>
+      <p:grpSpPr>
+        <a:xfrm>
+          <a:off x="0" y="0"/>
+          <a:ext cx="0" cy="0"/>
+          <a:chOff x="0" y="0"/>
+          <a:chExt cx="0" cy="0"/>
+        </a:xfrm>
+      </p:grpSpPr>
+      <p:sp>
+        <p:nvSpPr>
+          <p:cNvPr id="6" name="Bublina v tvare zaobleného obdĺžnika 5"/>
+          <p:cNvSpPr/>
+          <p:nvPr/>
+        </p:nvSpPr>
+        <p:spPr>
+          <a:xfrm>
+            <a:off x="457729" y="1221970"/>
+            <a:ext cx="2128059" cy="947651"/>
+          </a:xfrm>
+          <a:prstGeom prst="wedgeRoundRectCallout">
+            <a:avLst>
+              <a:gd name="adj1" fmla="val -21224"/>
+              <a:gd name="adj2" fmla="val -57676"/>
+              <a:gd name="adj3" fmla="val 16667"/>
+            </a:avLst>
+          </a:prstGeom>
+          <a:noFill/>
+          <a:ln w="9525" cap="flat" cmpd="sng" algn="ctr">
+            <a:solidFill>
+              <a:schemeClr val="accent6"/>
+            </a:solidFill>
+            <a:prstDash val="solid"/>
+            <a:round/>
+            <a:headEnd type="none" w="med" len="med"/>
+            <a:tailEnd type="none" w="med" len="med"/>
+          </a:ln>
+        </p:spPr>
+        <p:style>
+          <a:lnRef idx="0">
+            <a:scrgbClr r="0" g="0" b="0"/>
+          </a:lnRef>
+          <a:fillRef idx="0">
+            <a:scrgbClr r="0" g="0" b="0"/>
+          </a:fillRef>
+          <a:effectRef idx="0">
+            <a:scrgbClr r="0" g="0" b="0"/>
+          </a:effectRef>
+          <a:fontRef idx="minor">
+            <a:schemeClr val="accent6"/>
+          </a:fontRef>
+        </p:style>
+        <p:txBody>
+          <a:bodyPr rtlCol="0" anchor="ctr"/>
+          <a:lstStyle/>
+          <a:p>
+            <a:pPr algn="ctr"/>
+            <a:endParaRPr lang="sk-SK" noProof="1"/>
+          </a:p>
+        </p:txBody>
+      </p:sp>
+      <p:sp>
+        <p:nvSpPr>
+          <p:cNvPr id="4" name="Zaoblený obdĺžnik 3"/>
+          <p:cNvSpPr/>
+          <p:nvPr/>
+        </p:nvSpPr>
+        <p:spPr>
+          <a:xfrm>
+            <a:off x="440575" y="556953"/>
+            <a:ext cx="1704109" cy="465513"/>
+          </a:xfrm>
+          <a:prstGeom prst="roundRect">
+            <a:avLst/>
+          </a:prstGeom>
+        </p:spPr>
+        <p:style>
+          <a:lnRef idx="2">
+            <a:schemeClr val="accent1">
+              <a:shade val="50000"/>
+            </a:schemeClr>
+          </a:lnRef>
+          <a:fillRef idx="1">
+            <a:schemeClr val="accent1"/>
+          </a:fillRef>
+          <a:effectRef idx="0">
+            <a:schemeClr val="accent1"/>
+          </a:effectRef>
+          <a:fontRef idx="minor">
+            <a:schemeClr val="lt1"/>
+          </a:fontRef>
+        </p:style>
+        <p:txBody>
+          <a:bodyPr rtlCol="0" anchor="ctr"/>
+          <a:lstStyle/>
+          <a:p>
+            <a:pPr algn="ctr"/>
+            <a:r>
+              <a:rPr lang="sk-SK" noProof="1" smtClean="0"/>
+              <a:t>Stlač ma</a:t>
+            </a:r>
+            <a:endParaRPr lang="sk-SK" noProof="1"/>
+          </a:p>
+        </p:txBody>
+      </p:sp>
+      <p:sp>
+        <p:nvSpPr>
+          <p:cNvPr id="5" name="BlokTextu 4"/>
+          <p:cNvSpPr txBox="1"/>
+          <p:nvPr/>
+        </p:nvSpPr>
+        <p:spPr>
+          <a:xfrm>
+            <a:off x="606828" y="1372629"/>
+            <a:ext cx="1829860" cy="646331"/>
+          </a:xfrm>
+          <a:prstGeom prst="rect">
+            <a:avLst/>
+          </a:prstGeom>
+          <a:noFill/>
+        </p:spPr>
+        <p:txBody>
+          <a:bodyPr wrap="none" rtlCol="0">
+            <a:spAutoFit/>
+          </a:bodyPr>
+          <a:lstStyle/>
+          <a:p>
+            <a:r>
+              <a:rPr lang="sk-SK" noProof="1" smtClean="0"/>
+              <a:t>Typ komponentu:</a:t>
+            </a:r>
+          </a:p>
+          <a:p>
+            <a:r>
+              <a:rPr lang="sk-SK" b="1" noProof="1" smtClean="0"/>
+              <a:t>Tlačidlo</a:t>
+            </a:r>
+            <a:endParaRPr lang="sk-SK" b="1" noProof="1"/>
+          </a:p>
+        </p:txBody>
+      </p:sp>
+      <p:sp>
+        <p:nvSpPr>
+          <p:cNvPr id="7" name="Ovál 6"/>
+          <p:cNvSpPr/>
+          <p:nvPr/>
+        </p:nvSpPr>
+        <p:spPr>
+          <a:xfrm>
+            <a:off x="3227126" y="556953"/>
+            <a:ext cx="798022" cy="798022"/>
+          </a:xfrm>
+          <a:prstGeom prst="ellipse">
+            <a:avLst/>
+          </a:prstGeom>
+          <a:noFill/>
+          <a:ln w="57150" cap="flat" cmpd="sng" algn="ctr">
+            <a:solidFill>
+              <a:schemeClr val="dk1"/>
+            </a:solidFill>
+            <a:prstDash val="solid"/>
+            <a:round/>
+            <a:headEnd type="none" w="med" len="med"/>
+            <a:tailEnd type="none" w="med" len="med"/>
+          </a:ln>
+        </p:spPr>
+        <p:style>
+          <a:lnRef idx="0">
+            <a:scrgbClr r="0" g="0" b="0"/>
+          </a:lnRef>
+          <a:fillRef idx="0">
+            <a:scrgbClr r="0" g="0" b="0"/>
+          </a:fillRef>
+          <a:effectRef idx="0">
+            <a:scrgbClr r="0" g="0" b="0"/>
+          </a:effectRef>
+          <a:fontRef idx="minor">
+            <a:schemeClr val="dk1"/>
+          </a:fontRef>
+        </p:style>
+        <p:txBody>
+          <a:bodyPr rtlCol="0" anchor="ctr"/>
+          <a:lstStyle/>
+          <a:p>
+            <a:pPr algn="ctr"/>
+            <a:endParaRPr lang="sk-SK" noProof="1"/>
+          </a:p>
+        </p:txBody>
+      </p:sp>
+      <p:sp>
+        <p:nvSpPr>
+          <p:cNvPr id="8" name="Ovál 7"/>
+          <p:cNvSpPr/>
+          <p:nvPr/>
+        </p:nvSpPr>
+        <p:spPr>
+          <a:xfrm>
+            <a:off x="6480173" y="556953"/>
+            <a:ext cx="798022" cy="798022"/>
+          </a:xfrm>
+          <a:prstGeom prst="ellipse">
+            <a:avLst/>
+          </a:prstGeom>
+          <a:noFill/>
+          <a:ln w="57150" cap="flat" cmpd="sng" algn="ctr">
+            <a:solidFill>
+              <a:schemeClr val="dk1"/>
+            </a:solidFill>
+            <a:prstDash val="solid"/>
+            <a:round/>
+            <a:headEnd type="none" w="med" len="med"/>
+            <a:tailEnd type="none" w="med" len="med"/>
+          </a:ln>
+        </p:spPr>
+        <p:style>
+          <a:lnRef idx="0">
+            <a:scrgbClr r="0" g="0" b="0"/>
+          </a:lnRef>
+          <a:fillRef idx="0">
+            <a:scrgbClr r="0" g="0" b="0"/>
+          </a:fillRef>
+          <a:effectRef idx="0">
+            <a:scrgbClr r="0" g="0" b="0"/>
+          </a:effectRef>
+          <a:fontRef idx="minor">
+            <a:schemeClr val="dk1"/>
+          </a:fontRef>
+        </p:style>
+        <p:txBody>
+          <a:bodyPr rtlCol="0" anchor="ctr"/>
+          <a:lstStyle/>
+          <a:p>
+            <a:pPr algn="ctr"/>
+            <a:endParaRPr lang="sk-SK" noProof="1"/>
+          </a:p>
+        </p:txBody>
+      </p:sp>
+      <p:sp>
+        <p:nvSpPr>
+          <p:cNvPr id="9" name="Ovál 8"/>
+          <p:cNvSpPr/>
+          <p:nvPr/>
+        </p:nvSpPr>
+        <p:spPr>
+          <a:xfrm>
+            <a:off x="5075320" y="2510443"/>
+            <a:ext cx="920455" cy="920455"/>
+          </a:xfrm>
+          <a:prstGeom prst="ellipse">
+            <a:avLst/>
+          </a:prstGeom>
+          <a:noFill/>
+          <a:ln w="57150" cap="flat" cmpd="sng" algn="ctr">
+            <a:solidFill>
+              <a:schemeClr val="dk1"/>
+            </a:solidFill>
+            <a:prstDash val="solid"/>
+            <a:round/>
+            <a:headEnd type="none" w="med" len="med"/>
+            <a:tailEnd type="none" w="med" len="med"/>
+          </a:ln>
+        </p:spPr>
+        <p:style>
+          <a:lnRef idx="0">
+            <a:scrgbClr r="0" g="0" b="0"/>
+          </a:lnRef>
+          <a:fillRef idx="0">
+            <a:scrgbClr r="0" g="0" b="0"/>
+          </a:fillRef>
+          <a:effectRef idx="0">
+            <a:scrgbClr r="0" g="0" b="0"/>
+          </a:effectRef>
+          <a:fontRef idx="minor">
+            <a:schemeClr val="dk1"/>
+          </a:fontRef>
+        </p:style>
+        <p:txBody>
+          <a:bodyPr rtlCol="0" anchor="ctr"/>
+          <a:lstStyle/>
+          <a:p>
+            <a:pPr algn="ctr"/>
+            <a:endParaRPr lang="sk-SK" noProof="1"/>
+          </a:p>
+        </p:txBody>
+      </p:sp>
+      <p:cxnSp>
+        <p:nvCxnSpPr>
+          <p:cNvPr id="11" name="Zaoblená spojnica 10"/>
+          <p:cNvCxnSpPr>
+            <a:stCxn id="8" idx="1"/>
+            <a:endCxn id="7" idx="7"/>
+          </p:cNvCxnSpPr>
+          <p:nvPr/>
+        </p:nvCxnSpPr>
+        <p:spPr>
+          <a:xfrm rot="16200000" flipV="1">
+            <a:off x="5252661" y="-670560"/>
+            <a:ext cx="12700" cy="2688761"/>
+          </a:xfrm>
+          <a:prstGeom prst="curvedConnector3">
+            <a:avLst>
+              <a:gd name="adj1" fmla="val 1214748"/>
+            </a:avLst>
+          </a:prstGeom>
+          <a:ln>
+            <a:solidFill>
+              <a:schemeClr val="bg1">
+                <a:lumMod val="50000"/>
+              </a:schemeClr>
+            </a:solidFill>
+            <a:tailEnd type="triangle" w="lg" len="lg"/>
+          </a:ln>
+        </p:spPr>
+        <p:style>
+          <a:lnRef idx="1">
+            <a:schemeClr val="accent1"/>
+          </a:lnRef>
+          <a:fillRef idx="0">
+            <a:schemeClr val="accent1"/>
+          </a:fillRef>
+          <a:effectRef idx="0">
+            <a:schemeClr val="accent1"/>
+          </a:effectRef>
+          <a:fontRef idx="minor">
+            <a:schemeClr val="tx1"/>
+          </a:fontRef>
+        </p:style>
+      </p:cxnSp>
+      <p:cxnSp>
+        <p:nvCxnSpPr>
+          <p:cNvPr id="13" name="Zaoblená spojnica 12"/>
+          <p:cNvCxnSpPr>
+            <a:stCxn id="7" idx="5"/>
+            <a:endCxn id="8" idx="3"/>
+          </p:cNvCxnSpPr>
+          <p:nvPr/>
+        </p:nvCxnSpPr>
+        <p:spPr>
+          <a:xfrm rot="16200000" flipH="1">
+            <a:off x="5252660" y="-106274"/>
+            <a:ext cx="12700" cy="2688761"/>
+          </a:xfrm>
+          <a:prstGeom prst="curvedConnector3">
+            <a:avLst>
+              <a:gd name="adj1" fmla="val 1214748"/>
+            </a:avLst>
+          </a:prstGeom>
+          <a:ln>
+            <a:solidFill>
+              <a:schemeClr val="bg1">
+                <a:lumMod val="50000"/>
+              </a:schemeClr>
+            </a:solidFill>
+            <a:tailEnd type="triangle" w="lg" len="lg"/>
+          </a:ln>
+        </p:spPr>
+        <p:style>
+          <a:lnRef idx="1">
+            <a:schemeClr val="accent1"/>
+          </a:lnRef>
+          <a:fillRef idx="0">
+            <a:schemeClr val="accent1"/>
+          </a:fillRef>
+          <a:effectRef idx="0">
+            <a:schemeClr val="accent1"/>
+          </a:effectRef>
+          <a:fontRef idx="minor">
+            <a:schemeClr val="tx1"/>
+          </a:fontRef>
+        </p:style>
+      </p:cxnSp>
+      <p:cxnSp>
+        <p:nvCxnSpPr>
+          <p:cNvPr id="15" name="Zaoblená spojnica 14"/>
+          <p:cNvCxnSpPr>
+            <a:stCxn id="7" idx="3"/>
+            <a:endCxn id="9" idx="2"/>
+          </p:cNvCxnSpPr>
+          <p:nvPr/>
+        </p:nvCxnSpPr>
+        <p:spPr>
+          <a:xfrm rot="16200000" flipH="1">
+            <a:off x="3343375" y="1238726"/>
+            <a:ext cx="1732564" cy="1731326"/>
+          </a:xfrm>
+          <a:prstGeom prst="curvedConnector2">
+            <a:avLst/>
+          </a:prstGeom>
+          <a:ln>
+            <a:solidFill>
+              <a:schemeClr val="bg1">
+                <a:lumMod val="50000"/>
+              </a:schemeClr>
+            </a:solidFill>
+            <a:tailEnd type="triangle" w="lg" len="lg"/>
+          </a:ln>
+        </p:spPr>
+        <p:style>
+          <a:lnRef idx="1">
+            <a:schemeClr val="accent1"/>
+          </a:lnRef>
+          <a:fillRef idx="0">
+            <a:schemeClr val="accent1"/>
+          </a:fillRef>
+          <a:effectRef idx="0">
+            <a:schemeClr val="accent1"/>
+          </a:effectRef>
+          <a:fontRef idx="minor">
+            <a:schemeClr val="tx1"/>
+          </a:fontRef>
+        </p:style>
+      </p:cxnSp>
+      <p:cxnSp>
+        <p:nvCxnSpPr>
+          <p:cNvPr id="17" name="Zaoblená spojnica 16"/>
+          <p:cNvCxnSpPr>
+            <a:stCxn id="9" idx="7"/>
+            <a:endCxn id="7" idx="4"/>
+          </p:cNvCxnSpPr>
+          <p:nvPr/>
+        </p:nvCxnSpPr>
+        <p:spPr>
+          <a:xfrm rot="16200000" flipV="1">
+            <a:off x="4098424" y="882688"/>
+            <a:ext cx="1290266" cy="2234840"/>
+          </a:xfrm>
+          <a:prstGeom prst="curvedConnector3">
+            <a:avLst>
+              <a:gd name="adj1" fmla="val 55154"/>
+            </a:avLst>
+          </a:prstGeom>
+          <a:ln>
+            <a:solidFill>
+              <a:schemeClr val="bg1">
+                <a:lumMod val="50000"/>
+              </a:schemeClr>
+            </a:solidFill>
+            <a:tailEnd type="triangle" w="lg" len="lg"/>
+          </a:ln>
+        </p:spPr>
+        <p:style>
+          <a:lnRef idx="1">
+            <a:schemeClr val="accent1"/>
+          </a:lnRef>
+          <a:fillRef idx="0">
+            <a:schemeClr val="accent1"/>
+          </a:fillRef>
+          <a:effectRef idx="0">
+            <a:schemeClr val="accent1"/>
+          </a:effectRef>
+          <a:fontRef idx="minor">
+            <a:schemeClr val="tx1"/>
+          </a:fontRef>
+        </p:style>
+      </p:cxnSp>
+      <p:sp>
+        <p:nvSpPr>
+          <p:cNvPr id="27" name="BlokTextu 26"/>
+          <p:cNvSpPr txBox="1"/>
+          <p:nvPr/>
+        </p:nvSpPr>
+        <p:spPr>
+          <a:xfrm>
+            <a:off x="3186016" y="805977"/>
+            <a:ext cx="880241" cy="276999"/>
+          </a:xfrm>
+          <a:prstGeom prst="rect">
+            <a:avLst/>
+          </a:prstGeom>
+          <a:noFill/>
+        </p:spPr>
+        <p:txBody>
+          <a:bodyPr wrap="none" rtlCol="0">
+            <a:spAutoFit/>
+          </a:bodyPr>
+          <a:lstStyle/>
+          <a:p>
+            <a:r>
+              <a:rPr lang="sk-SK" sz="1200" noProof="1" smtClean="0"/>
+              <a:t>Nestlačené</a:t>
+            </a:r>
+            <a:endParaRPr lang="sk-SK" sz="1200" noProof="1"/>
+          </a:p>
+        </p:txBody>
+      </p:sp>
+      <p:sp>
+        <p:nvSpPr>
+          <p:cNvPr id="28" name="BlokTextu 27"/>
+          <p:cNvSpPr txBox="1"/>
+          <p:nvPr/>
+        </p:nvSpPr>
+        <p:spPr>
+          <a:xfrm>
+            <a:off x="6521282" y="817464"/>
+            <a:ext cx="715260" cy="276999"/>
+          </a:xfrm>
+          <a:prstGeom prst="rect">
+            <a:avLst/>
+          </a:prstGeom>
+          <a:noFill/>
+        </p:spPr>
+        <p:txBody>
+          <a:bodyPr wrap="none" rtlCol="0">
+            <a:spAutoFit/>
+          </a:bodyPr>
+          <a:lstStyle/>
+          <a:p>
+            <a:r>
+              <a:rPr lang="sk-SK" sz="1200" noProof="1" smtClean="0"/>
+              <a:t>Stlačené</a:t>
+            </a:r>
+            <a:endParaRPr lang="sk-SK" sz="1200" noProof="1"/>
+          </a:p>
+        </p:txBody>
+      </p:sp>
+      <p:sp>
+        <p:nvSpPr>
+          <p:cNvPr id="29" name="BlokTextu 28"/>
+          <p:cNvSpPr txBox="1"/>
+          <p:nvPr/>
+        </p:nvSpPr>
+        <p:spPr>
+          <a:xfrm>
+            <a:off x="5075320" y="2848802"/>
+            <a:ext cx="970843" cy="276999"/>
+          </a:xfrm>
+          <a:prstGeom prst="rect">
+            <a:avLst/>
+          </a:prstGeom>
+          <a:noFill/>
+        </p:spPr>
+        <p:txBody>
+          <a:bodyPr wrap="none" rtlCol="0">
+            <a:spAutoFit/>
+          </a:bodyPr>
+          <a:lstStyle/>
+          <a:p>
+            <a:r>
+              <a:rPr lang="sk-SK" sz="1200" noProof="1" smtClean="0"/>
+              <a:t>Zablokované</a:t>
+            </a:r>
+            <a:endParaRPr lang="sk-SK" sz="1200" noProof="1"/>
+          </a:p>
+        </p:txBody>
+      </p:sp>
+      <p:sp>
+        <p:nvSpPr>
+          <p:cNvPr id="35" name="BlokTextu 34"/>
+          <p:cNvSpPr txBox="1"/>
+          <p:nvPr/>
+        </p:nvSpPr>
+        <p:spPr>
+          <a:xfrm>
+            <a:off x="4669524" y="1037618"/>
+            <a:ext cx="1207382" cy="276999"/>
+          </a:xfrm>
+          <a:prstGeom prst="rect">
+            <a:avLst/>
+          </a:prstGeom>
+          <a:noFill/>
+        </p:spPr>
+        <p:txBody>
+          <a:bodyPr wrap="none" rtlCol="0">
+            <a:spAutoFit/>
+          </a:bodyPr>
+          <a:lstStyle/>
+          <a:p>
+            <a:r>
+              <a:rPr lang="sk-SK" sz="1200" noProof="1" smtClean="0">
+                <a:latin typeface="Courier New" panose="02070309020205020404" pitchFamily="49" charset="0"/>
+                <a:cs typeface="Courier New" panose="02070309020205020404" pitchFamily="49" charset="0"/>
+              </a:rPr>
+              <a:t>onPressed()</a:t>
+            </a:r>
+            <a:endParaRPr lang="sk-SK" sz="1200" noProof="1">
+              <a:latin typeface="Courier New" panose="02070309020205020404" pitchFamily="49" charset="0"/>
+              <a:cs typeface="Courier New" panose="02070309020205020404" pitchFamily="49" charset="0"/>
+            </a:endParaRPr>
+          </a:p>
+        </p:txBody>
+      </p:sp>
+      <p:sp>
+        <p:nvSpPr>
+          <p:cNvPr id="36" name="BlokTextu 35"/>
+          <p:cNvSpPr txBox="1"/>
+          <p:nvPr/>
+        </p:nvSpPr>
+        <p:spPr>
+          <a:xfrm>
+            <a:off x="4608832" y="231793"/>
+            <a:ext cx="1300356" cy="276999"/>
+          </a:xfrm>
+          <a:prstGeom prst="rect">
+            <a:avLst/>
+          </a:prstGeom>
+          <a:noFill/>
+        </p:spPr>
+        <p:txBody>
+          <a:bodyPr wrap="none" rtlCol="0">
+            <a:spAutoFit/>
+          </a:bodyPr>
+          <a:lstStyle/>
+          <a:p>
+            <a:r>
+              <a:rPr lang="sk-SK" sz="1200" noProof="1" smtClean="0">
+                <a:latin typeface="Courier New" panose="02070309020205020404" pitchFamily="49" charset="0"/>
+                <a:cs typeface="Courier New" panose="02070309020205020404" pitchFamily="49" charset="0"/>
+              </a:rPr>
+              <a:t>onReleased()</a:t>
+            </a:r>
+            <a:endParaRPr lang="sk-SK" sz="1200" noProof="1">
+              <a:latin typeface="Courier New" panose="02070309020205020404" pitchFamily="49" charset="0"/>
+              <a:cs typeface="Courier New" panose="02070309020205020404" pitchFamily="49" charset="0"/>
+            </a:endParaRPr>
+          </a:p>
+        </p:txBody>
+      </p:sp>
+      <p:sp>
+        <p:nvSpPr>
+          <p:cNvPr id="37" name="BlokTextu 36"/>
+          <p:cNvSpPr txBox="1"/>
+          <p:nvPr/>
+        </p:nvSpPr>
+        <p:spPr>
+          <a:xfrm>
+            <a:off x="3343994" y="2225015"/>
+            <a:ext cx="1300356" cy="276999"/>
+          </a:xfrm>
+          <a:prstGeom prst="rect">
+            <a:avLst/>
+          </a:prstGeom>
+          <a:noFill/>
+        </p:spPr>
+        <p:txBody>
+          <a:bodyPr wrap="none" rtlCol="0">
+            <a:spAutoFit/>
+          </a:bodyPr>
+          <a:lstStyle/>
+          <a:p>
+            <a:r>
+              <a:rPr lang="sk-SK" sz="1200" noProof="1" smtClean="0">
+                <a:latin typeface="Courier New" panose="02070309020205020404" pitchFamily="49" charset="0"/>
+                <a:cs typeface="Courier New" panose="02070309020205020404" pitchFamily="49" charset="0"/>
+              </a:rPr>
+              <a:t>onDisabled()</a:t>
+            </a:r>
+            <a:endParaRPr lang="sk-SK" sz="1200" noProof="1">
+              <a:latin typeface="Courier New" panose="02070309020205020404" pitchFamily="49" charset="0"/>
+              <a:cs typeface="Courier New" panose="02070309020205020404" pitchFamily="49" charset="0"/>
+            </a:endParaRPr>
+          </a:p>
+        </p:txBody>
+      </p:sp>
+      <p:sp>
+        <p:nvSpPr>
+          <p:cNvPr id="38" name="BlokTextu 37"/>
+          <p:cNvSpPr txBox="1"/>
+          <p:nvPr/>
+        </p:nvSpPr>
+        <p:spPr>
+          <a:xfrm>
+            <a:off x="4229051" y="1688962"/>
+            <a:ext cx="1207382" cy="276999"/>
+          </a:xfrm>
+          <a:prstGeom prst="rect">
+            <a:avLst/>
+          </a:prstGeom>
+          <a:noFill/>
+        </p:spPr>
+        <p:txBody>
+          <a:bodyPr wrap="none" rtlCol="0">
+            <a:spAutoFit/>
+          </a:bodyPr>
+          <a:lstStyle/>
+          <a:p>
+            <a:r>
+              <a:rPr lang="sk-SK" sz="1200" noProof="1" smtClean="0">
+                <a:latin typeface="Courier New" panose="02070309020205020404" pitchFamily="49" charset="0"/>
+                <a:cs typeface="Courier New" panose="02070309020205020404" pitchFamily="49" charset="0"/>
+              </a:rPr>
+              <a:t>onEnabled()</a:t>
+            </a:r>
+            <a:endParaRPr lang="sk-SK" sz="1200" noProof="1">
+              <a:latin typeface="Courier New" panose="02070309020205020404" pitchFamily="49" charset="0"/>
+              <a:cs typeface="Courier New" panose="02070309020205020404" pitchFamily="49" charset="0"/>
+            </a:endParaRPr>
+          </a:p>
+        </p:txBody>
+      </p:sp>
+    </p:spTree>
+    <p:extLst>
+      <p:ext uri="{BB962C8B-B14F-4D97-AF65-F5344CB8AC3E}">
+        <p14:creationId xmlns:p14="http://schemas.microsoft.com/office/powerpoint/2010/main" val="2860600115"/>
+      </p:ext>
+    </p:extLst>
+  </p:cSld>
+  <p:clrMapOvr>
+    <a:masterClrMapping/>
+  </p:clrMapOvr>
+</p:sld>
+</file>
+
+<file path=ppt/slides/slide7.xml><?xml version="1.0" encoding="utf-8"?>
+<p:sld xmlns:a="http://schemas.openxmlformats.org/drawingml/2006/main" xmlns:r="http://schemas.openxmlformats.org/officeDocument/2006/relationships" xmlns:p="http://schemas.openxmlformats.org/presentationml/2006/main">
+  <p:cSld>
+    <p:spTree>
+      <p:nvGrpSpPr>
+        <p:cNvPr id="1" name=""/>
+        <p:cNvGrpSpPr/>
+        <p:nvPr/>
+      </p:nvGrpSpPr>
+      <p:grpSpPr>
+        <a:xfrm>
+          <a:off x="0" y="0"/>
+          <a:ext cx="0" cy="0"/>
+          <a:chOff x="0" y="0"/>
+          <a:chExt cx="0" cy="0"/>
+        </a:xfrm>
+      </p:grpSpPr>
+      <p:cxnSp>
+        <p:nvCxnSpPr>
+          <p:cNvPr id="5" name="Rovná spojovacia šípka 4"/>
+          <p:cNvCxnSpPr/>
+          <p:nvPr/>
+        </p:nvCxnSpPr>
+        <p:spPr>
+          <a:xfrm>
+            <a:off x="490451" y="432262"/>
+            <a:ext cx="0" cy="964276"/>
+          </a:xfrm>
+          <a:prstGeom prst="straightConnector1">
+            <a:avLst/>
+          </a:prstGeom>
+          <a:ln>
+            <a:tailEnd type="triangle"/>
+          </a:ln>
+        </p:spPr>
+        <p:style>
+          <a:lnRef idx="3">
+            <a:schemeClr val="dk1"/>
+          </a:lnRef>
+          <a:fillRef idx="0">
+            <a:schemeClr val="dk1"/>
+          </a:fillRef>
+          <a:effectRef idx="2">
+            <a:schemeClr val="dk1"/>
+          </a:effectRef>
+          <a:fontRef idx="minor">
+            <a:schemeClr val="tx1"/>
+          </a:fontRef>
+        </p:style>
+      </p:cxnSp>
+      <p:sp>
+        <p:nvSpPr>
+          <p:cNvPr id="6" name="BlokTextu 5"/>
+          <p:cNvSpPr txBox="1"/>
+          <p:nvPr/>
+        </p:nvSpPr>
+        <p:spPr>
+          <a:xfrm>
+            <a:off x="289915" y="1396538"/>
+            <a:ext cx="401072" cy="276999"/>
+          </a:xfrm>
+          <a:prstGeom prst="rect">
+            <a:avLst/>
+          </a:prstGeom>
+          <a:noFill/>
+        </p:spPr>
+        <p:txBody>
+          <a:bodyPr wrap="none" rtlCol="0">
+            <a:spAutoFit/>
+          </a:bodyPr>
+          <a:lstStyle/>
+          <a:p>
+            <a:r>
+              <a:rPr lang="sk-SK" sz="1200" noProof="1" smtClean="0"/>
+              <a:t>Čas</a:t>
+            </a:r>
+            <a:endParaRPr lang="sk-SK" sz="1200" noProof="1"/>
+          </a:p>
+        </p:txBody>
+      </p:sp>
+      <p:sp>
+        <p:nvSpPr>
+          <p:cNvPr id="9" name="Obdĺžnik 8"/>
+          <p:cNvSpPr/>
+          <p:nvPr/>
+        </p:nvSpPr>
+        <p:spPr>
+          <a:xfrm>
+            <a:off x="889462" y="99753"/>
+            <a:ext cx="1662545" cy="4422371"/>
+          </a:xfrm>
+          <a:prstGeom prst="rect">
+            <a:avLst/>
+          </a:prstGeom>
+          <a:noFill/>
+          <a:ln w="9525" cap="flat" cmpd="sng" algn="ctr">
+            <a:solidFill>
+              <a:schemeClr val="bg1">
+                <a:lumMod val="65000"/>
+              </a:schemeClr>
+            </a:solidFill>
+            <a:prstDash val="solid"/>
+            <a:round/>
+            <a:headEnd type="none" w="med" len="med"/>
+            <a:tailEnd type="none" w="med" len="med"/>
+          </a:ln>
+        </p:spPr>
+        <p:style>
+          <a:lnRef idx="0">
+            <a:scrgbClr r="0" g="0" b="0"/>
+          </a:lnRef>
+          <a:fillRef idx="0">
+            <a:scrgbClr r="0" g="0" b="0"/>
+          </a:fillRef>
+          <a:effectRef idx="0">
+            <a:scrgbClr r="0" g="0" b="0"/>
+          </a:effectRef>
+          <a:fontRef idx="minor">
+            <a:schemeClr val="dk1"/>
+          </a:fontRef>
+        </p:style>
+        <p:txBody>
+          <a:bodyPr rtlCol="0" anchor="ctr"/>
+          <a:lstStyle/>
+          <a:p>
+            <a:pPr algn="ctr"/>
+            <a:endParaRPr lang="sk-SK" noProof="1"/>
+          </a:p>
+        </p:txBody>
+      </p:sp>
+      <p:sp>
+        <p:nvSpPr>
+          <p:cNvPr id="10" name="Obdĺžnik 9"/>
+          <p:cNvSpPr/>
+          <p:nvPr/>
+        </p:nvSpPr>
+        <p:spPr>
+          <a:xfrm>
+            <a:off x="2552007" y="99753"/>
+            <a:ext cx="1662545" cy="4422371"/>
+          </a:xfrm>
+          <a:prstGeom prst="rect">
+            <a:avLst/>
+          </a:prstGeom>
+          <a:noFill/>
+          <a:ln w="9525" cap="flat" cmpd="sng" algn="ctr">
+            <a:solidFill>
+              <a:schemeClr val="bg1">
+                <a:lumMod val="65000"/>
+              </a:schemeClr>
+            </a:solidFill>
+            <a:prstDash val="solid"/>
+            <a:round/>
+            <a:headEnd type="none" w="med" len="med"/>
+            <a:tailEnd type="none" w="med" len="med"/>
+          </a:ln>
+        </p:spPr>
+        <p:style>
+          <a:lnRef idx="0">
+            <a:scrgbClr r="0" g="0" b="0"/>
+          </a:lnRef>
+          <a:fillRef idx="0">
+            <a:scrgbClr r="0" g="0" b="0"/>
+          </a:fillRef>
+          <a:effectRef idx="0">
+            <a:scrgbClr r="0" g="0" b="0"/>
+          </a:effectRef>
+          <a:fontRef idx="minor">
+            <a:schemeClr val="dk1"/>
+          </a:fontRef>
+        </p:style>
+        <p:txBody>
+          <a:bodyPr rtlCol="0" anchor="ctr"/>
+          <a:lstStyle/>
+          <a:p>
+            <a:pPr algn="ctr"/>
+            <a:endParaRPr lang="sk-SK" noProof="1"/>
+          </a:p>
+        </p:txBody>
+      </p:sp>
+      <p:sp>
+        <p:nvSpPr>
+          <p:cNvPr id="11" name="Obdĺžnik 10"/>
+          <p:cNvSpPr/>
+          <p:nvPr/>
+        </p:nvSpPr>
+        <p:spPr>
+          <a:xfrm>
+            <a:off x="4214552" y="99753"/>
+            <a:ext cx="2021663" cy="4422371"/>
+          </a:xfrm>
+          <a:prstGeom prst="rect">
+            <a:avLst/>
+          </a:prstGeom>
+          <a:noFill/>
+          <a:ln w="9525" cap="flat" cmpd="sng" algn="ctr">
+            <a:solidFill>
+              <a:schemeClr val="bg1">
+                <a:lumMod val="65000"/>
+              </a:schemeClr>
+            </a:solidFill>
+            <a:prstDash val="solid"/>
+            <a:round/>
+            <a:headEnd type="none" w="med" len="med"/>
+            <a:tailEnd type="none" w="med" len="med"/>
+          </a:ln>
+        </p:spPr>
+        <p:style>
+          <a:lnRef idx="0">
+            <a:scrgbClr r="0" g="0" b="0"/>
+          </a:lnRef>
+          <a:fillRef idx="0">
+            <a:scrgbClr r="0" g="0" b="0"/>
+          </a:fillRef>
+          <a:effectRef idx="0">
+            <a:scrgbClr r="0" g="0" b="0"/>
+          </a:effectRef>
+          <a:fontRef idx="minor">
+            <a:schemeClr val="dk1"/>
+          </a:fontRef>
+        </p:style>
+        <p:txBody>
+          <a:bodyPr rtlCol="0" anchor="ctr"/>
+          <a:lstStyle/>
+          <a:p>
+            <a:pPr algn="ctr"/>
+            <a:endParaRPr lang="sk-SK" noProof="1"/>
+          </a:p>
+        </p:txBody>
+      </p:sp>
+      <p:sp>
+        <p:nvSpPr>
+          <p:cNvPr id="12" name="BlokTextu 11"/>
+          <p:cNvSpPr txBox="1"/>
+          <p:nvPr/>
+        </p:nvSpPr>
+        <p:spPr>
+          <a:xfrm>
+            <a:off x="1037406" y="157736"/>
+            <a:ext cx="1396023" cy="307777"/>
+          </a:xfrm>
+          <a:prstGeom prst="rect">
+            <a:avLst/>
+          </a:prstGeom>
+          <a:noFill/>
+        </p:spPr>
+        <p:txBody>
+          <a:bodyPr wrap="none" rtlCol="0">
+            <a:spAutoFit/>
+          </a:bodyPr>
+          <a:lstStyle/>
+          <a:p>
+            <a:r>
+              <a:rPr lang="sk-SK" sz="1400" b="1" noProof="1" smtClean="0"/>
+              <a:t>Správca udalostí</a:t>
+            </a:r>
+            <a:endParaRPr lang="sk-SK" sz="1400" b="1" noProof="1"/>
+          </a:p>
+        </p:txBody>
+      </p:sp>
+      <p:sp>
+        <p:nvSpPr>
+          <p:cNvPr id="13" name="BlokTextu 12"/>
+          <p:cNvSpPr txBox="1"/>
+          <p:nvPr/>
+        </p:nvSpPr>
+        <p:spPr>
+          <a:xfrm>
+            <a:off x="3001603" y="157736"/>
+            <a:ext cx="763351" cy="307777"/>
+          </a:xfrm>
+          <a:prstGeom prst="rect">
+            <a:avLst/>
+          </a:prstGeom>
+          <a:noFill/>
+        </p:spPr>
+        <p:txBody>
+          <a:bodyPr wrap="none" rtlCol="0">
+            <a:spAutoFit/>
+          </a:bodyPr>
+          <a:lstStyle/>
+          <a:p>
+            <a:r>
+              <a:rPr lang="sk-SK" sz="1400" b="1" noProof="1" smtClean="0"/>
+              <a:t>Tlačidlo</a:t>
+            </a:r>
+            <a:endParaRPr lang="sk-SK" sz="1400" b="1" noProof="1"/>
+          </a:p>
+        </p:txBody>
+      </p:sp>
+      <p:sp>
+        <p:nvSpPr>
+          <p:cNvPr id="14" name="BlokTextu 13"/>
+          <p:cNvSpPr txBox="1"/>
+          <p:nvPr/>
+        </p:nvSpPr>
+        <p:spPr>
+          <a:xfrm>
+            <a:off x="4333130" y="157736"/>
+            <a:ext cx="1903085" cy="307777"/>
+          </a:xfrm>
+          <a:prstGeom prst="rect">
+            <a:avLst/>
+          </a:prstGeom>
+          <a:noFill/>
+        </p:spPr>
+        <p:txBody>
+          <a:bodyPr wrap="none" rtlCol="0">
+            <a:spAutoFit/>
+          </a:bodyPr>
+          <a:lstStyle/>
+          <a:p>
+            <a:r>
+              <a:rPr lang="sk-SK" sz="1400" b="1" noProof="1" smtClean="0">
+                <a:latin typeface="Courier New" panose="02070309020205020404" pitchFamily="49" charset="0"/>
+                <a:cs typeface="Courier New" panose="02070309020205020404" pitchFamily="49" charset="0"/>
+              </a:rPr>
+              <a:t>spracujUdalosť()</a:t>
+            </a:r>
+            <a:endParaRPr lang="sk-SK" sz="1400" b="1" noProof="1">
+              <a:latin typeface="Courier New" panose="02070309020205020404" pitchFamily="49" charset="0"/>
+              <a:cs typeface="Courier New" panose="02070309020205020404" pitchFamily="49" charset="0"/>
+            </a:endParaRPr>
+          </a:p>
+        </p:txBody>
+      </p:sp>
+      <p:cxnSp>
+        <p:nvCxnSpPr>
+          <p:cNvPr id="16" name="Rovná spojnica 15"/>
+          <p:cNvCxnSpPr/>
+          <p:nvPr/>
+        </p:nvCxnSpPr>
+        <p:spPr>
+          <a:xfrm>
+            <a:off x="889462" y="465513"/>
+            <a:ext cx="5346753" cy="0"/>
+          </a:xfrm>
+          <a:prstGeom prst="line">
+            <a:avLst/>
+          </a:prstGeom>
+        </p:spPr>
+        <p:style>
+          <a:lnRef idx="1">
+            <a:schemeClr val="dk1"/>
+          </a:lnRef>
+          <a:fillRef idx="0">
+            <a:schemeClr val="dk1"/>
+          </a:fillRef>
+          <a:effectRef idx="0">
+            <a:schemeClr val="dk1"/>
+          </a:effectRef>
+          <a:fontRef idx="minor">
+            <a:schemeClr val="tx1"/>
+          </a:fontRef>
+        </p:style>
+      </p:cxnSp>
+      <p:cxnSp>
+        <p:nvCxnSpPr>
+          <p:cNvPr id="17" name="Rovná spojnica 16"/>
+          <p:cNvCxnSpPr/>
+          <p:nvPr/>
+        </p:nvCxnSpPr>
+        <p:spPr>
+          <a:xfrm>
+            <a:off x="889462" y="484910"/>
+            <a:ext cx="5346753" cy="0"/>
+          </a:xfrm>
+          <a:prstGeom prst="line">
+            <a:avLst/>
+          </a:prstGeom>
+        </p:spPr>
+        <p:style>
+          <a:lnRef idx="1">
+            <a:schemeClr val="dk1"/>
+          </a:lnRef>
+          <a:fillRef idx="0">
+            <a:schemeClr val="dk1"/>
+          </a:fillRef>
+          <a:effectRef idx="0">
+            <a:schemeClr val="dk1"/>
+          </a:effectRef>
+          <a:fontRef idx="minor">
+            <a:schemeClr val="tx1"/>
+          </a:fontRef>
+        </p:style>
+      </p:cxnSp>
+      <p:cxnSp>
+        <p:nvCxnSpPr>
+          <p:cNvPr id="19" name="Rovná spojovacia šípka 18"/>
+          <p:cNvCxnSpPr/>
+          <p:nvPr/>
+        </p:nvCxnSpPr>
+        <p:spPr>
+          <a:xfrm>
+            <a:off x="1662545" y="872836"/>
+            <a:ext cx="0" cy="854826"/>
+          </a:xfrm>
+          <a:prstGeom prst="straightConnector1">
+            <a:avLst/>
+          </a:prstGeom>
+          <a:ln>
+            <a:tailEnd type="triangle"/>
+          </a:ln>
+        </p:spPr>
+        <p:style>
+          <a:lnRef idx="1">
+            <a:schemeClr val="dk1"/>
+          </a:lnRef>
+          <a:fillRef idx="0">
+            <a:schemeClr val="dk1"/>
+          </a:fillRef>
+          <a:effectRef idx="0">
+            <a:schemeClr val="dk1"/>
+          </a:effectRef>
+          <a:fontRef idx="minor">
+            <a:schemeClr val="tx1"/>
+          </a:fontRef>
+        </p:style>
+      </p:cxnSp>
+      <p:cxnSp>
+        <p:nvCxnSpPr>
+          <p:cNvPr id="20" name="Rovná spojovacia šípka 19"/>
+          <p:cNvCxnSpPr/>
+          <p:nvPr/>
+        </p:nvCxnSpPr>
+        <p:spPr>
+          <a:xfrm>
+            <a:off x="1663254" y="2545080"/>
+            <a:ext cx="0" cy="1211580"/>
+          </a:xfrm>
+          <a:prstGeom prst="straightConnector1">
+            <a:avLst/>
+          </a:prstGeom>
+          <a:ln>
+            <a:tailEnd type="triangle"/>
+          </a:ln>
+        </p:spPr>
+        <p:style>
+          <a:lnRef idx="1">
+            <a:schemeClr val="dk1"/>
+          </a:lnRef>
+          <a:fillRef idx="0">
+            <a:schemeClr val="dk1"/>
+          </a:fillRef>
+          <a:effectRef idx="0">
+            <a:schemeClr val="dk1"/>
+          </a:effectRef>
+          <a:fontRef idx="minor">
+            <a:schemeClr val="tx1"/>
+          </a:fontRef>
+        </p:style>
+      </p:cxnSp>
+      <p:cxnSp>
+        <p:nvCxnSpPr>
+          <p:cNvPr id="21" name="Rovná spojovacia šípka 20"/>
+          <p:cNvCxnSpPr/>
+          <p:nvPr/>
+        </p:nvCxnSpPr>
+        <p:spPr>
+          <a:xfrm>
+            <a:off x="5273749" y="892140"/>
+            <a:ext cx="0" cy="708060"/>
+          </a:xfrm>
+          <a:prstGeom prst="straightConnector1">
+            <a:avLst/>
+          </a:prstGeom>
+          <a:ln>
+            <a:tailEnd type="triangle"/>
+          </a:ln>
+        </p:spPr>
+        <p:style>
+          <a:lnRef idx="1">
+            <a:schemeClr val="dk1"/>
+          </a:lnRef>
+          <a:fillRef idx="0">
+            <a:schemeClr val="dk1"/>
+          </a:fillRef>
+          <a:effectRef idx="0">
+            <a:schemeClr val="dk1"/>
+          </a:effectRef>
+          <a:fontRef idx="minor">
+            <a:schemeClr val="tx1"/>
+          </a:fontRef>
+        </p:style>
+      </p:cxnSp>
+      <p:cxnSp>
+        <p:nvCxnSpPr>
+          <p:cNvPr id="23" name="Rovná spojnica 22"/>
+          <p:cNvCxnSpPr/>
+          <p:nvPr/>
+        </p:nvCxnSpPr>
+        <p:spPr>
+          <a:xfrm>
+            <a:off x="5273749" y="667696"/>
+            <a:ext cx="0" cy="523702"/>
+          </a:xfrm>
+          <a:prstGeom prst="line">
+            <a:avLst/>
+          </a:prstGeom>
+          <a:ln w="57150"/>
+        </p:spPr>
+        <p:style>
+          <a:lnRef idx="3">
+            <a:schemeClr val="dk1"/>
+          </a:lnRef>
+          <a:fillRef idx="0">
+            <a:schemeClr val="dk1"/>
+          </a:fillRef>
+          <a:effectRef idx="2">
+            <a:schemeClr val="dk1"/>
+          </a:effectRef>
+          <a:fontRef idx="minor">
+            <a:schemeClr val="tx1"/>
+          </a:fontRef>
+        </p:style>
+      </p:cxnSp>
+      <p:cxnSp>
+        <p:nvCxnSpPr>
+          <p:cNvPr id="25" name="Rovná spojovacia šípka 24"/>
+          <p:cNvCxnSpPr/>
+          <p:nvPr/>
+        </p:nvCxnSpPr>
+        <p:spPr>
+          <a:xfrm flipH="1">
+            <a:off x="1662545" y="1203960"/>
+            <a:ext cx="3611204" cy="0"/>
+          </a:xfrm>
+          <a:prstGeom prst="straightConnector1">
+            <a:avLst/>
+          </a:prstGeom>
+          <a:ln w="25400">
+            <a:solidFill>
+              <a:srgbClr val="00B050"/>
+            </a:solidFill>
+            <a:tailEnd type="triangle" w="lg" len="lg"/>
+          </a:ln>
+        </p:spPr>
+        <p:style>
+          <a:lnRef idx="1">
+            <a:schemeClr val="accent1"/>
+          </a:lnRef>
+          <a:fillRef idx="0">
+            <a:schemeClr val="accent1"/>
+          </a:fillRef>
+          <a:effectRef idx="0">
+            <a:schemeClr val="accent1"/>
+          </a:effectRef>
+          <a:fontRef idx="minor">
+            <a:schemeClr val="tx1"/>
+          </a:fontRef>
+        </p:style>
+      </p:cxnSp>
+      <p:cxnSp>
+        <p:nvCxnSpPr>
+          <p:cNvPr id="26" name="Rovná spojnica 25"/>
+          <p:cNvCxnSpPr/>
+          <p:nvPr/>
+        </p:nvCxnSpPr>
+        <p:spPr>
+          <a:xfrm>
+            <a:off x="1670874" y="1203960"/>
+            <a:ext cx="0" cy="192578"/>
+          </a:xfrm>
+          <a:prstGeom prst="line">
+            <a:avLst/>
+          </a:prstGeom>
+          <a:ln w="57150"/>
+        </p:spPr>
+        <p:style>
+          <a:lnRef idx="3">
+            <a:schemeClr val="dk1"/>
+          </a:lnRef>
+          <a:fillRef idx="0">
+            <a:schemeClr val="dk1"/>
+          </a:fillRef>
+          <a:effectRef idx="2">
+            <a:schemeClr val="dk1"/>
+          </a:effectRef>
+          <a:fontRef idx="minor">
+            <a:schemeClr val="tx1"/>
+          </a:fontRef>
+        </p:style>
+      </p:cxnSp>
+      <p:cxnSp>
+        <p:nvCxnSpPr>
+          <p:cNvPr id="27" name="Rovná spojnica 26"/>
+          <p:cNvCxnSpPr/>
+          <p:nvPr/>
+        </p:nvCxnSpPr>
+        <p:spPr>
+          <a:xfrm>
+            <a:off x="3393009" y="2232660"/>
+            <a:ext cx="0" cy="312420"/>
+          </a:xfrm>
+          <a:prstGeom prst="line">
+            <a:avLst/>
+          </a:prstGeom>
+          <a:ln w="57150"/>
+        </p:spPr>
+        <p:style>
+          <a:lnRef idx="3">
+            <a:schemeClr val="dk1"/>
+          </a:lnRef>
+          <a:fillRef idx="0">
+            <a:schemeClr val="dk1"/>
+          </a:fillRef>
+          <a:effectRef idx="2">
+            <a:schemeClr val="dk1"/>
+          </a:effectRef>
+          <a:fontRef idx="minor">
+            <a:schemeClr val="tx1"/>
+          </a:fontRef>
+        </p:style>
+      </p:cxnSp>
+      <p:cxnSp>
+        <p:nvCxnSpPr>
+          <p:cNvPr id="32" name="Rovná spojovacia šípka 31"/>
+          <p:cNvCxnSpPr/>
+          <p:nvPr/>
+        </p:nvCxnSpPr>
+        <p:spPr>
+          <a:xfrm>
+            <a:off x="5275134" y="1600200"/>
+            <a:ext cx="0" cy="1609915"/>
+          </a:xfrm>
+          <a:prstGeom prst="straightConnector1">
+            <a:avLst/>
+          </a:prstGeom>
+          <a:ln>
+            <a:solidFill>
+              <a:schemeClr val="bg1">
+                <a:lumMod val="65000"/>
+              </a:schemeClr>
+            </a:solidFill>
+            <a:prstDash val="lgDash"/>
+            <a:tailEnd type="none"/>
+          </a:ln>
+        </p:spPr>
+        <p:style>
+          <a:lnRef idx="1">
+            <a:schemeClr val="dk1"/>
+          </a:lnRef>
+          <a:fillRef idx="0">
+            <a:schemeClr val="dk1"/>
+          </a:fillRef>
+          <a:effectRef idx="0">
+            <a:schemeClr val="dk1"/>
+          </a:effectRef>
+          <a:fontRef idx="minor">
+            <a:schemeClr val="tx1"/>
+          </a:fontRef>
+        </p:style>
+      </p:cxnSp>
+      <p:cxnSp>
+        <p:nvCxnSpPr>
+          <p:cNvPr id="36" name="Rovná spojovacia šípka 35"/>
+          <p:cNvCxnSpPr/>
+          <p:nvPr/>
+        </p:nvCxnSpPr>
+        <p:spPr>
+          <a:xfrm>
+            <a:off x="1663254" y="1727662"/>
+            <a:ext cx="0" cy="817418"/>
+          </a:xfrm>
+          <a:prstGeom prst="straightConnector1">
+            <a:avLst/>
+          </a:prstGeom>
+          <a:ln>
+            <a:solidFill>
+              <a:schemeClr val="bg1">
+                <a:lumMod val="65000"/>
+              </a:schemeClr>
+            </a:solidFill>
+            <a:prstDash val="lgDash"/>
+            <a:tailEnd type="none"/>
+          </a:ln>
+        </p:spPr>
+        <p:style>
+          <a:lnRef idx="1">
+            <a:schemeClr val="dk1"/>
+          </a:lnRef>
+          <a:fillRef idx="0">
+            <a:schemeClr val="dk1"/>
+          </a:fillRef>
+          <a:effectRef idx="0">
+            <a:schemeClr val="dk1"/>
+          </a:effectRef>
+          <a:fontRef idx="minor">
+            <a:schemeClr val="tx1"/>
+          </a:fontRef>
+        </p:style>
+      </p:cxnSp>
+      <p:cxnSp>
+        <p:nvCxnSpPr>
+          <p:cNvPr id="37" name="Rovná spojovacia šípka 36"/>
+          <p:cNvCxnSpPr/>
+          <p:nvPr/>
+        </p:nvCxnSpPr>
+        <p:spPr>
+          <a:xfrm>
+            <a:off x="3393009" y="872836"/>
+            <a:ext cx="0" cy="1359824"/>
+          </a:xfrm>
+          <a:prstGeom prst="straightConnector1">
+            <a:avLst/>
+          </a:prstGeom>
+          <a:ln>
+            <a:solidFill>
+              <a:schemeClr val="bg1">
+                <a:lumMod val="65000"/>
+              </a:schemeClr>
+            </a:solidFill>
+            <a:prstDash val="lgDash"/>
+            <a:tailEnd type="none"/>
+          </a:ln>
+        </p:spPr>
+        <p:style>
+          <a:lnRef idx="1">
+            <a:schemeClr val="dk1"/>
+          </a:lnRef>
+          <a:fillRef idx="0">
+            <a:schemeClr val="dk1"/>
+          </a:fillRef>
+          <a:effectRef idx="0">
+            <a:schemeClr val="dk1"/>
+          </a:effectRef>
+          <a:fontRef idx="minor">
+            <a:schemeClr val="tx1"/>
+          </a:fontRef>
+        </p:style>
+      </p:cxnSp>
+      <p:cxnSp>
+        <p:nvCxnSpPr>
+          <p:cNvPr id="41" name="Rovná spojovacia šípka 40"/>
+          <p:cNvCxnSpPr/>
+          <p:nvPr/>
+        </p:nvCxnSpPr>
+        <p:spPr>
+          <a:xfrm flipH="1">
+            <a:off x="1662545" y="2545080"/>
+            <a:ext cx="1730464" cy="0"/>
+          </a:xfrm>
+          <a:prstGeom prst="straightConnector1">
+            <a:avLst/>
+          </a:prstGeom>
+          <a:ln w="25400">
+            <a:solidFill>
+              <a:srgbClr val="00B050"/>
+            </a:solidFill>
+            <a:tailEnd type="triangle" w="lg" len="lg"/>
+          </a:ln>
+        </p:spPr>
+        <p:style>
+          <a:lnRef idx="1">
+            <a:schemeClr val="accent1"/>
+          </a:lnRef>
+          <a:fillRef idx="0">
+            <a:schemeClr val="accent1"/>
+          </a:fillRef>
+          <a:effectRef idx="0">
+            <a:schemeClr val="accent1"/>
+          </a:effectRef>
+          <a:fontRef idx="minor">
+            <a:schemeClr val="tx1"/>
+          </a:fontRef>
+        </p:style>
+      </p:cxnSp>
+      <p:cxnSp>
+        <p:nvCxnSpPr>
+          <p:cNvPr id="42" name="Rovná spojnica 41"/>
+          <p:cNvCxnSpPr/>
+          <p:nvPr/>
+        </p:nvCxnSpPr>
+        <p:spPr>
+          <a:xfrm>
+            <a:off x="1662545" y="2545080"/>
+            <a:ext cx="0" cy="665035"/>
+          </a:xfrm>
+          <a:prstGeom prst="line">
+            <a:avLst/>
+          </a:prstGeom>
+          <a:ln w="57150"/>
+        </p:spPr>
+        <p:style>
+          <a:lnRef idx="3">
+            <a:schemeClr val="dk1"/>
+          </a:lnRef>
+          <a:fillRef idx="0">
+            <a:schemeClr val="dk1"/>
+          </a:fillRef>
+          <a:effectRef idx="2">
+            <a:schemeClr val="dk1"/>
+          </a:effectRef>
+          <a:fontRef idx="minor">
+            <a:schemeClr val="tx1"/>
+          </a:fontRef>
+        </p:style>
+      </p:cxnSp>
+      <p:cxnSp>
+        <p:nvCxnSpPr>
+          <p:cNvPr id="43" name="Rovná spojovacia šípka 42"/>
+          <p:cNvCxnSpPr/>
+          <p:nvPr/>
+        </p:nvCxnSpPr>
+        <p:spPr>
+          <a:xfrm>
+            <a:off x="5273749" y="3210115"/>
+            <a:ext cx="0" cy="1011365"/>
+          </a:xfrm>
+          <a:prstGeom prst="straightConnector1">
+            <a:avLst/>
+          </a:prstGeom>
+          <a:ln>
+            <a:tailEnd type="triangle"/>
+          </a:ln>
+        </p:spPr>
+        <p:style>
+          <a:lnRef idx="1">
+            <a:schemeClr val="dk1"/>
+          </a:lnRef>
+          <a:fillRef idx="0">
+            <a:schemeClr val="dk1"/>
+          </a:fillRef>
+          <a:effectRef idx="0">
+            <a:schemeClr val="dk1"/>
+          </a:effectRef>
+          <a:fontRef idx="minor">
+            <a:schemeClr val="tx1"/>
+          </a:fontRef>
+        </p:style>
+      </p:cxnSp>
+      <p:cxnSp>
+        <p:nvCxnSpPr>
+          <p:cNvPr id="47" name="Rovná spojovacia šípka 46"/>
+          <p:cNvCxnSpPr/>
+          <p:nvPr/>
+        </p:nvCxnSpPr>
+        <p:spPr>
+          <a:xfrm>
+            <a:off x="1673468" y="3210115"/>
+            <a:ext cx="3611204" cy="0"/>
+          </a:xfrm>
+          <a:prstGeom prst="straightConnector1">
+            <a:avLst/>
+          </a:prstGeom>
+          <a:ln w="25400">
+            <a:solidFill>
+              <a:srgbClr val="00B050"/>
+            </a:solidFill>
+            <a:tailEnd type="triangle" w="lg" len="lg"/>
+          </a:ln>
+        </p:spPr>
+        <p:style>
+          <a:lnRef idx="1">
+            <a:schemeClr val="accent1"/>
+          </a:lnRef>
+          <a:fillRef idx="0">
+            <a:schemeClr val="accent1"/>
+          </a:fillRef>
+          <a:effectRef idx="0">
+            <a:schemeClr val="accent1"/>
+          </a:effectRef>
+          <a:fontRef idx="minor">
+            <a:schemeClr val="tx1"/>
+          </a:fontRef>
+        </p:style>
+      </p:cxnSp>
+      <p:cxnSp>
+        <p:nvCxnSpPr>
+          <p:cNvPr id="50" name="Rovná spojnica 49"/>
+          <p:cNvCxnSpPr/>
+          <p:nvPr/>
+        </p:nvCxnSpPr>
+        <p:spPr>
+          <a:xfrm>
+            <a:off x="5273749" y="3210115"/>
+            <a:ext cx="0" cy="523702"/>
+          </a:xfrm>
+          <a:prstGeom prst="line">
+            <a:avLst/>
+          </a:prstGeom>
+          <a:ln w="57150"/>
+        </p:spPr>
+        <p:style>
+          <a:lnRef idx="3">
+            <a:schemeClr val="dk1"/>
+          </a:lnRef>
+          <a:fillRef idx="0">
+            <a:schemeClr val="dk1"/>
+          </a:fillRef>
+          <a:effectRef idx="2">
+            <a:schemeClr val="dk1"/>
+          </a:effectRef>
+          <a:fontRef idx="minor">
+            <a:schemeClr val="tx1"/>
+          </a:fontRef>
+        </p:style>
+      </p:cxnSp>
+      <p:cxnSp>
+        <p:nvCxnSpPr>
+          <p:cNvPr id="52" name="Rovná spojovacia šípka 51"/>
+          <p:cNvCxnSpPr/>
+          <p:nvPr/>
+        </p:nvCxnSpPr>
+        <p:spPr>
+          <a:xfrm>
+            <a:off x="3387483" y="2232660"/>
+            <a:ext cx="0" cy="510540"/>
+          </a:xfrm>
+          <a:prstGeom prst="straightConnector1">
+            <a:avLst/>
+          </a:prstGeom>
+          <a:ln>
+            <a:tailEnd type="triangle"/>
+          </a:ln>
+        </p:spPr>
+        <p:style>
+          <a:lnRef idx="1">
+            <a:schemeClr val="dk1"/>
+          </a:lnRef>
+          <a:fillRef idx="0">
+            <a:schemeClr val="dk1"/>
+          </a:fillRef>
+          <a:effectRef idx="0">
+            <a:schemeClr val="dk1"/>
+          </a:effectRef>
+          <a:fontRef idx="minor">
+            <a:schemeClr val="tx1"/>
+          </a:fontRef>
+        </p:style>
+      </p:cxnSp>
+      <p:sp>
+        <p:nvSpPr>
+          <p:cNvPr id="54" name="BlokTextu 53"/>
+          <p:cNvSpPr txBox="1"/>
+          <p:nvPr/>
+        </p:nvSpPr>
+        <p:spPr>
+          <a:xfrm>
+            <a:off x="3658400" y="753585"/>
+            <a:ext cx="1587614" cy="461665"/>
+          </a:xfrm>
+          <a:prstGeom prst="rect">
+            <a:avLst/>
+          </a:prstGeom>
+          <a:noFill/>
+        </p:spPr>
+        <p:txBody>
+          <a:bodyPr wrap="none" rtlCol="0">
+            <a:spAutoFit/>
+          </a:bodyPr>
+          <a:lstStyle/>
+          <a:p>
+            <a:pPr algn="r"/>
+            <a:r>
+              <a:rPr lang="sk-SK" sz="1200" noProof="1" smtClean="0"/>
+              <a:t>Registrácia na udalosť:</a:t>
+            </a:r>
+          </a:p>
+          <a:p>
+            <a:pPr algn="r"/>
+            <a:r>
+              <a:rPr lang="sk-SK" sz="1200" b="1" noProof="1" smtClean="0"/>
+              <a:t>Stlačenie tlačidla</a:t>
+            </a:r>
+            <a:endParaRPr lang="sk-SK" sz="1200" b="1" noProof="1"/>
+          </a:p>
+        </p:txBody>
+      </p:sp>
+      <p:sp>
+        <p:nvSpPr>
+          <p:cNvPr id="55" name="BlokTextu 54"/>
+          <p:cNvSpPr txBox="1"/>
+          <p:nvPr/>
+        </p:nvSpPr>
+        <p:spPr>
+          <a:xfrm>
+            <a:off x="1662544" y="1176159"/>
+            <a:ext cx="1104405" cy="276999"/>
+          </a:xfrm>
+          <a:prstGeom prst="rect">
+            <a:avLst/>
+          </a:prstGeom>
+          <a:noFill/>
+        </p:spPr>
+        <p:txBody>
+          <a:bodyPr wrap="none" rtlCol="0">
+            <a:spAutoFit/>
+          </a:bodyPr>
+          <a:lstStyle/>
+          <a:p>
+            <a:r>
+              <a:rPr lang="sk-SK" sz="1200" noProof="1" smtClean="0"/>
+              <a:t>Zaregistrované</a:t>
+            </a:r>
+            <a:endParaRPr lang="sk-SK" sz="1200" b="1" noProof="1"/>
+          </a:p>
+        </p:txBody>
+      </p:sp>
+      <p:sp>
+        <p:nvSpPr>
+          <p:cNvPr id="56" name="BlokTextu 55"/>
+          <p:cNvSpPr txBox="1"/>
+          <p:nvPr/>
+        </p:nvSpPr>
+        <p:spPr>
+          <a:xfrm>
+            <a:off x="2130205" y="2084992"/>
+            <a:ext cx="1251753" cy="461665"/>
+          </a:xfrm>
+          <a:prstGeom prst="rect">
+            <a:avLst/>
+          </a:prstGeom>
+          <a:noFill/>
+        </p:spPr>
+        <p:txBody>
+          <a:bodyPr wrap="none" rtlCol="0">
+            <a:spAutoFit/>
+          </a:bodyPr>
+          <a:lstStyle/>
+          <a:p>
+            <a:pPr algn="r"/>
+            <a:r>
+              <a:rPr lang="sk-SK" sz="1200" noProof="1" smtClean="0"/>
+              <a:t>Používateľ stlačil</a:t>
+            </a:r>
+          </a:p>
+          <a:p>
+            <a:pPr algn="r"/>
+            <a:r>
+              <a:rPr lang="sk-SK" sz="1200" noProof="1" smtClean="0"/>
+              <a:t>tlačidlo</a:t>
+            </a:r>
+            <a:endParaRPr lang="sk-SK" sz="1200" b="1" noProof="1"/>
+          </a:p>
+        </p:txBody>
+      </p:sp>
+      <p:sp>
+        <p:nvSpPr>
+          <p:cNvPr id="57" name="BlokTextu 56"/>
+          <p:cNvSpPr txBox="1"/>
+          <p:nvPr/>
+        </p:nvSpPr>
+        <p:spPr>
+          <a:xfrm>
+            <a:off x="1670874" y="2774071"/>
+            <a:ext cx="2054730" cy="461665"/>
+          </a:xfrm>
+          <a:prstGeom prst="rect">
+            <a:avLst/>
+          </a:prstGeom>
+          <a:noFill/>
+        </p:spPr>
+        <p:txBody>
+          <a:bodyPr wrap="none" rtlCol="0">
+            <a:spAutoFit/>
+          </a:bodyPr>
+          <a:lstStyle/>
+          <a:p>
+            <a:r>
+              <a:rPr lang="sk-SK" sz="1200" noProof="1" smtClean="0"/>
+              <a:t>Správca udalostí spustí </a:t>
+            </a:r>
+          </a:p>
+          <a:p>
+            <a:r>
+              <a:rPr lang="sk-SK" sz="1200" noProof="1" smtClean="0"/>
+              <a:t>všetky zaregistrované udalosti</a:t>
+            </a:r>
+            <a:endParaRPr lang="sk-SK" sz="1200" noProof="1"/>
+          </a:p>
+        </p:txBody>
+      </p:sp>
+      <p:sp>
+        <p:nvSpPr>
+          <p:cNvPr id="63" name="BlokTextu 62"/>
+          <p:cNvSpPr txBox="1"/>
+          <p:nvPr/>
+        </p:nvSpPr>
+        <p:spPr>
+          <a:xfrm>
+            <a:off x="4318022" y="3294995"/>
+            <a:ext cx="937115" cy="461665"/>
+          </a:xfrm>
+          <a:prstGeom prst="rect">
+            <a:avLst/>
+          </a:prstGeom>
+          <a:noFill/>
+        </p:spPr>
+        <p:txBody>
+          <a:bodyPr wrap="none" rtlCol="0">
+            <a:spAutoFit/>
+          </a:bodyPr>
+          <a:lstStyle/>
+          <a:p>
+            <a:pPr algn="r"/>
+            <a:r>
+              <a:rPr lang="sk-SK" sz="1200" noProof="1" smtClean="0"/>
+              <a:t>Spracovanie</a:t>
+            </a:r>
+          </a:p>
+          <a:p>
+            <a:pPr algn="r"/>
+            <a:r>
+              <a:rPr lang="sk-SK" sz="1200" noProof="1" smtClean="0"/>
+              <a:t> udalosti</a:t>
+            </a:r>
+          </a:p>
+        </p:txBody>
+      </p:sp>
+    </p:spTree>
+    <p:extLst>
+      <p:ext uri="{BB962C8B-B14F-4D97-AF65-F5344CB8AC3E}">
+        <p14:creationId xmlns:p14="http://schemas.microsoft.com/office/powerpoint/2010/main" val="207646642"/>
+      </p:ext>
+    </p:extLst>
+  </p:cSld>
+  <p:clrMapOvr>
+    <a:masterClrMapping/>
+  </p:clrMapOvr>
+</p:sld>
+</file>
+
 <file path=ppt/theme/theme1.xml><?xml version="1.0" encoding="utf-8"?>
 <a:theme xmlns:a="http://schemas.openxmlformats.org/drawingml/2006/main" name="Motív balíka Office">
   <a:themeElements>

</xml_diff>

<commit_message>
Zapracovane vsetky pripomienky, dopisat poslednu kapitolu a zacat s uvodom aj zaverom.
</commit_message>
<xml_diff>
--- a/seminare/diplomovy-seminar-1/pics/DiplomovkaSchemy.pptx
+++ b/seminare/diplomovy-seminar-1/pics/DiplomovkaSchemy.pptx
@@ -12,6 +12,7 @@
     <p:sldId id="260" r:id="rId6"/>
     <p:sldId id="261" r:id="rId7"/>
     <p:sldId id="262" r:id="rId8"/>
+    <p:sldId id="263" r:id="rId9"/>
   </p:sldIdLst>
   <p:sldSz cx="12192000" cy="6858000"/>
   <p:notesSz cx="6858000" cy="9144000"/>
@@ -249,7 +250,7 @@
           <a:p>
             <a:fld id="{F8CAFAE9-194C-4790-A945-25BD67049D41}" type="datetimeFigureOut">
               <a:rPr lang="sk-SK" smtClean="0"/>
-              <a:t>08. 04. 2018</a:t>
+              <a:t>09. 04. 2018</a:t>
             </a:fld>
             <a:endParaRPr lang="sk-SK"/>
           </a:p>
@@ -419,7 +420,7 @@
           <a:p>
             <a:fld id="{F8CAFAE9-194C-4790-A945-25BD67049D41}" type="datetimeFigureOut">
               <a:rPr lang="sk-SK" smtClean="0"/>
-              <a:t>08. 04. 2018</a:t>
+              <a:t>09. 04. 2018</a:t>
             </a:fld>
             <a:endParaRPr lang="sk-SK"/>
           </a:p>
@@ -599,7 +600,7 @@
           <a:p>
             <a:fld id="{F8CAFAE9-194C-4790-A945-25BD67049D41}" type="datetimeFigureOut">
               <a:rPr lang="sk-SK" smtClean="0"/>
-              <a:t>08. 04. 2018</a:t>
+              <a:t>09. 04. 2018</a:t>
             </a:fld>
             <a:endParaRPr lang="sk-SK"/>
           </a:p>
@@ -769,7 +770,7 @@
           <a:p>
             <a:fld id="{F8CAFAE9-194C-4790-A945-25BD67049D41}" type="datetimeFigureOut">
               <a:rPr lang="sk-SK" smtClean="0"/>
-              <a:t>08. 04. 2018</a:t>
+              <a:t>09. 04. 2018</a:t>
             </a:fld>
             <a:endParaRPr lang="sk-SK"/>
           </a:p>
@@ -1015,7 +1016,7 @@
           <a:p>
             <a:fld id="{F8CAFAE9-194C-4790-A945-25BD67049D41}" type="datetimeFigureOut">
               <a:rPr lang="sk-SK" smtClean="0"/>
-              <a:t>08. 04. 2018</a:t>
+              <a:t>09. 04. 2018</a:t>
             </a:fld>
             <a:endParaRPr lang="sk-SK"/>
           </a:p>
@@ -1247,7 +1248,7 @@
           <a:p>
             <a:fld id="{F8CAFAE9-194C-4790-A945-25BD67049D41}" type="datetimeFigureOut">
               <a:rPr lang="sk-SK" smtClean="0"/>
-              <a:t>08. 04. 2018</a:t>
+              <a:t>09. 04. 2018</a:t>
             </a:fld>
             <a:endParaRPr lang="sk-SK"/>
           </a:p>
@@ -1614,7 +1615,7 @@
           <a:p>
             <a:fld id="{F8CAFAE9-194C-4790-A945-25BD67049D41}" type="datetimeFigureOut">
               <a:rPr lang="sk-SK" smtClean="0"/>
-              <a:t>08. 04. 2018</a:t>
+              <a:t>09. 04. 2018</a:t>
             </a:fld>
             <a:endParaRPr lang="sk-SK"/>
           </a:p>
@@ -1732,7 +1733,7 @@
           <a:p>
             <a:fld id="{F8CAFAE9-194C-4790-A945-25BD67049D41}" type="datetimeFigureOut">
               <a:rPr lang="sk-SK" smtClean="0"/>
-              <a:t>08. 04. 2018</a:t>
+              <a:t>09. 04. 2018</a:t>
             </a:fld>
             <a:endParaRPr lang="sk-SK"/>
           </a:p>
@@ -1827,7 +1828,7 @@
           <a:p>
             <a:fld id="{F8CAFAE9-194C-4790-A945-25BD67049D41}" type="datetimeFigureOut">
               <a:rPr lang="sk-SK" smtClean="0"/>
-              <a:t>08. 04. 2018</a:t>
+              <a:t>09. 04. 2018</a:t>
             </a:fld>
             <a:endParaRPr lang="sk-SK"/>
           </a:p>
@@ -2104,7 +2105,7 @@
           <a:p>
             <a:fld id="{F8CAFAE9-194C-4790-A945-25BD67049D41}" type="datetimeFigureOut">
               <a:rPr lang="sk-SK" smtClean="0"/>
-              <a:t>08. 04. 2018</a:t>
+              <a:t>09. 04. 2018</a:t>
             </a:fld>
             <a:endParaRPr lang="sk-SK"/>
           </a:p>
@@ -2357,7 +2358,7 @@
           <a:p>
             <a:fld id="{F8CAFAE9-194C-4790-A945-25BD67049D41}" type="datetimeFigureOut">
               <a:rPr lang="sk-SK" smtClean="0"/>
-              <a:t>08. 04. 2018</a:t>
+              <a:t>09. 04. 2018</a:t>
             </a:fld>
             <a:endParaRPr lang="sk-SK"/>
           </a:p>
@@ -2570,7 +2571,7 @@
           <a:p>
             <a:fld id="{F8CAFAE9-194C-4790-A945-25BD67049D41}" type="datetimeFigureOut">
               <a:rPr lang="sk-SK" smtClean="0"/>
-              <a:t>08. 04. 2018</a:t>
+              <a:t>09. 04. 2018</a:t>
             </a:fld>
             <a:endParaRPr lang="sk-SK"/>
           </a:p>
@@ -10486,6 +10487,707 @@
 </p:sld>
 </file>
 
+<file path=ppt/slides/slide8.xml><?xml version="1.0" encoding="utf-8"?>
+<p:sld xmlns:a="http://schemas.openxmlformats.org/drawingml/2006/main" xmlns:r="http://schemas.openxmlformats.org/officeDocument/2006/relationships" xmlns:p="http://schemas.openxmlformats.org/presentationml/2006/main">
+  <p:cSld>
+    <p:spTree>
+      <p:nvGrpSpPr>
+        <p:cNvPr id="1" name=""/>
+        <p:cNvGrpSpPr/>
+        <p:nvPr/>
+      </p:nvGrpSpPr>
+      <p:grpSpPr>
+        <a:xfrm>
+          <a:off x="0" y="0"/>
+          <a:ext cx="0" cy="0"/>
+          <a:chOff x="0" y="0"/>
+          <a:chExt cx="0" cy="0"/>
+        </a:xfrm>
+      </p:grpSpPr>
+      <p:sp>
+        <p:nvSpPr>
+          <p:cNvPr id="11" name="Obdĺžnik 10"/>
+          <p:cNvSpPr/>
+          <p:nvPr/>
+        </p:nvSpPr>
+        <p:spPr>
+          <a:xfrm>
+            <a:off x="127809" y="151186"/>
+            <a:ext cx="4178184" cy="3398347"/>
+          </a:xfrm>
+          <a:prstGeom prst="rect">
+            <a:avLst/>
+          </a:prstGeom>
+          <a:solidFill>
+            <a:schemeClr val="bg1">
+              <a:lumMod val="95000"/>
+            </a:schemeClr>
+          </a:solidFill>
+          <a:ln>
+            <a:noFill/>
+          </a:ln>
+        </p:spPr>
+        <p:style>
+          <a:lnRef idx="2">
+            <a:schemeClr val="accent1">
+              <a:shade val="50000"/>
+            </a:schemeClr>
+          </a:lnRef>
+          <a:fillRef idx="1">
+            <a:schemeClr val="accent1"/>
+          </a:fillRef>
+          <a:effectRef idx="0">
+            <a:schemeClr val="accent1"/>
+          </a:effectRef>
+          <a:fontRef idx="minor">
+            <a:schemeClr val="lt1"/>
+          </a:fontRef>
+        </p:style>
+        <p:txBody>
+          <a:bodyPr rtlCol="0" anchor="ctr"/>
+          <a:lstStyle/>
+          <a:p>
+            <a:pPr algn="ctr"/>
+            <a:endParaRPr lang="sk-SK" dirty="0"/>
+          </a:p>
+        </p:txBody>
+      </p:sp>
+      <p:sp>
+        <p:nvSpPr>
+          <p:cNvPr id="12" name="BlokTextu 11"/>
+          <p:cNvSpPr txBox="1"/>
+          <p:nvPr/>
+        </p:nvSpPr>
+        <p:spPr>
+          <a:xfrm>
+            <a:off x="127809" y="151186"/>
+            <a:ext cx="1382814" cy="276999"/>
+          </a:xfrm>
+          <a:prstGeom prst="rect">
+            <a:avLst/>
+          </a:prstGeom>
+          <a:noFill/>
+        </p:spPr>
+        <p:txBody>
+          <a:bodyPr wrap="none" rtlCol="0">
+            <a:spAutoFit/>
+          </a:bodyPr>
+          <a:lstStyle/>
+          <a:p>
+            <a:r>
+              <a:rPr lang="sk-SK" sz="1200" dirty="0" smtClean="0">
+                <a:latin typeface="Times New Roman" panose="02020603050405020304" pitchFamily="18" charset="0"/>
+                <a:cs typeface="Times New Roman" panose="02020603050405020304" pitchFamily="18" charset="0"/>
+              </a:rPr>
+              <a:t>XML konfigurácia:</a:t>
+            </a:r>
+            <a:endParaRPr lang="sk-SK" sz="1200" dirty="0">
+              <a:latin typeface="Times New Roman" panose="02020603050405020304" pitchFamily="18" charset="0"/>
+              <a:cs typeface="Times New Roman" panose="02020603050405020304" pitchFamily="18" charset="0"/>
+            </a:endParaRPr>
+          </a:p>
+        </p:txBody>
+      </p:sp>
+      <p:pic>
+        <p:nvPicPr>
+          <p:cNvPr id="1026" name="Picture 2" descr="https://cdn.arduino.cc/homepage/static/media/arduino-UNO.bcc69bde.png"/>
+          <p:cNvPicPr>
+            <a:picLocks noChangeAspect="1" noChangeArrowheads="1"/>
+          </p:cNvPicPr>
+          <p:nvPr/>
+        </p:nvPicPr>
+        <p:blipFill>
+          <a:blip r:embed="rId2">
+            <a:extLst>
+              <a:ext uri="{28A0092B-C50C-407E-A947-70E740481C1C}">
+                <a14:useLocalDpi xmlns:a14="http://schemas.microsoft.com/office/drawing/2010/main" val="0"/>
+              </a:ext>
+            </a:extLst>
+          </a:blip>
+          <a:srcRect/>
+          <a:stretch>
+            <a:fillRect/>
+          </a:stretch>
+        </p:blipFill>
+        <p:spPr bwMode="auto">
+          <a:xfrm>
+            <a:off x="612775" y="1513551"/>
+            <a:ext cx="2419350" cy="1724025"/>
+          </a:xfrm>
+          <a:prstGeom prst="rect">
+            <a:avLst/>
+          </a:prstGeom>
+          <a:noFill/>
+          <a:extLst>
+            <a:ext uri="{909E8E84-426E-40DD-AFC4-6F175D3DCCD1}">
+              <a14:hiddenFill xmlns:a14="http://schemas.microsoft.com/office/drawing/2010/main">
+                <a:solidFill>
+                  <a:srgbClr val="FFFFFF"/>
+                </a:solidFill>
+              </a14:hiddenFill>
+            </a:ext>
+          </a:extLst>
+        </p:spPr>
+      </p:pic>
+      <p:sp>
+        <p:nvSpPr>
+          <p:cNvPr id="4" name="Obdĺžnik 3"/>
+          <p:cNvSpPr/>
+          <p:nvPr/>
+        </p:nvSpPr>
+        <p:spPr>
+          <a:xfrm>
+            <a:off x="4441147" y="483523"/>
+            <a:ext cx="2485505" cy="3042458"/>
+          </a:xfrm>
+          <a:prstGeom prst="rect">
+            <a:avLst/>
+          </a:prstGeom>
+          <a:noFill/>
+          <a:ln w="9525" cap="flat" cmpd="sng" algn="ctr">
+            <a:solidFill>
+              <a:schemeClr val="dk1"/>
+            </a:solidFill>
+            <a:prstDash val="solid"/>
+            <a:round/>
+            <a:headEnd type="none" w="med" len="med"/>
+            <a:tailEnd type="none" w="med" len="med"/>
+          </a:ln>
+        </p:spPr>
+        <p:style>
+          <a:lnRef idx="0">
+            <a:scrgbClr r="0" g="0" b="0"/>
+          </a:lnRef>
+          <a:fillRef idx="0">
+            <a:scrgbClr r="0" g="0" b="0"/>
+          </a:fillRef>
+          <a:effectRef idx="0">
+            <a:scrgbClr r="0" g="0" b="0"/>
+          </a:effectRef>
+          <a:fontRef idx="minor">
+            <a:schemeClr val="dk1"/>
+          </a:fontRef>
+        </p:style>
+        <p:txBody>
+          <a:bodyPr rtlCol="0" anchor="ctr"/>
+          <a:lstStyle/>
+          <a:p>
+            <a:pPr algn="ctr"/>
+            <a:endParaRPr lang="sk-SK" noProof="1"/>
+          </a:p>
+        </p:txBody>
+      </p:sp>
+      <p:sp>
+        <p:nvSpPr>
+          <p:cNvPr id="5" name="BlokTextu 4"/>
+          <p:cNvSpPr txBox="1"/>
+          <p:nvPr/>
+        </p:nvSpPr>
+        <p:spPr>
+          <a:xfrm>
+            <a:off x="4524275" y="574961"/>
+            <a:ext cx="2468880" cy="2862322"/>
+          </a:xfrm>
+          <a:prstGeom prst="rect">
+            <a:avLst/>
+          </a:prstGeom>
+          <a:noFill/>
+        </p:spPr>
+        <p:txBody>
+          <a:bodyPr wrap="square" rtlCol="0">
+            <a:spAutoFit/>
+          </a:bodyPr>
+          <a:lstStyle/>
+          <a:p>
+            <a:r>
+              <a:rPr lang="sk-SK" sz="1200" noProof="1" smtClean="0">
+                <a:latin typeface="Courier New" panose="02070309020205020404" pitchFamily="49" charset="0"/>
+                <a:cs typeface="Courier New" panose="02070309020205020404" pitchFamily="49" charset="0"/>
+              </a:rPr>
+              <a:t>...</a:t>
+            </a:r>
+            <a:endParaRPr lang="sk-SK" sz="1200" noProof="1" smtClean="0">
+              <a:latin typeface="Courier New" panose="02070309020205020404" pitchFamily="49" charset="0"/>
+              <a:cs typeface="Courier New" panose="02070309020205020404" pitchFamily="49" charset="0"/>
+            </a:endParaRPr>
+          </a:p>
+          <a:p>
+            <a:endParaRPr lang="sk-SK" sz="1200" noProof="1" smtClean="0">
+              <a:latin typeface="Courier New" panose="02070309020205020404" pitchFamily="49" charset="0"/>
+              <a:cs typeface="Courier New" panose="02070309020205020404" pitchFamily="49" charset="0"/>
+            </a:endParaRPr>
+          </a:p>
+          <a:p>
+            <a:r>
+              <a:rPr lang="sk-SK" sz="1200" noProof="1" smtClean="0">
+                <a:latin typeface="Courier New" panose="02070309020205020404" pitchFamily="49" charset="0"/>
+                <a:cs typeface="Courier New" panose="02070309020205020404" pitchFamily="49" charset="0"/>
+              </a:rPr>
+              <a:t>void onButtonPressed() {</a:t>
+            </a:r>
+          </a:p>
+          <a:p>
+            <a:endParaRPr lang="sk-SK" sz="1200" noProof="1" smtClean="0">
+              <a:latin typeface="Courier New" panose="02070309020205020404" pitchFamily="49" charset="0"/>
+              <a:cs typeface="Courier New" panose="02070309020205020404" pitchFamily="49" charset="0"/>
+            </a:endParaRPr>
+          </a:p>
+          <a:p>
+            <a:r>
+              <a:rPr lang="sk-SK" sz="1200" noProof="1" smtClean="0">
+                <a:latin typeface="Courier New" panose="02070309020205020404" pitchFamily="49" charset="0"/>
+                <a:cs typeface="Courier New" panose="02070309020205020404" pitchFamily="49" charset="0"/>
+              </a:rPr>
+              <a:t>    ...</a:t>
+            </a:r>
+          </a:p>
+          <a:p>
+            <a:endParaRPr lang="sk-SK" sz="1200" noProof="1" smtClean="0">
+              <a:latin typeface="Courier New" panose="02070309020205020404" pitchFamily="49" charset="0"/>
+              <a:cs typeface="Courier New" panose="02070309020205020404" pitchFamily="49" charset="0"/>
+            </a:endParaRPr>
+          </a:p>
+          <a:p>
+            <a:r>
+              <a:rPr lang="sk-SK" sz="1200" noProof="1" smtClean="0">
+                <a:latin typeface="Courier New" panose="02070309020205020404" pitchFamily="49" charset="0"/>
+                <a:cs typeface="Courier New" panose="02070309020205020404" pitchFamily="49" charset="0"/>
+              </a:rPr>
+              <a:t>    motor.start(5);</a:t>
+            </a:r>
+          </a:p>
+          <a:p>
+            <a:endParaRPr lang="sk-SK" sz="1200" noProof="1" smtClean="0">
+              <a:latin typeface="Courier New" panose="02070309020205020404" pitchFamily="49" charset="0"/>
+              <a:cs typeface="Courier New" panose="02070309020205020404" pitchFamily="49" charset="0"/>
+            </a:endParaRPr>
+          </a:p>
+          <a:p>
+            <a:r>
+              <a:rPr lang="sk-SK" sz="1200" noProof="1" smtClean="0">
+                <a:latin typeface="Courier New" panose="02070309020205020404" pitchFamily="49" charset="0"/>
+                <a:cs typeface="Courier New" panose="02070309020205020404" pitchFamily="49" charset="0"/>
+              </a:rPr>
+              <a:t>    ...</a:t>
+            </a:r>
+            <a:endParaRPr lang="sk-SK" sz="1200" noProof="1">
+              <a:latin typeface="Courier New" panose="02070309020205020404" pitchFamily="49" charset="0"/>
+              <a:cs typeface="Courier New" panose="02070309020205020404" pitchFamily="49" charset="0"/>
+            </a:endParaRPr>
+          </a:p>
+          <a:p>
+            <a:endParaRPr lang="sk-SK" sz="1200" noProof="1" smtClean="0">
+              <a:latin typeface="Courier New" panose="02070309020205020404" pitchFamily="49" charset="0"/>
+              <a:cs typeface="Courier New" panose="02070309020205020404" pitchFamily="49" charset="0"/>
+            </a:endParaRPr>
+          </a:p>
+          <a:p>
+            <a:r>
+              <a:rPr lang="sk-SK" sz="1200" noProof="1" smtClean="0">
+                <a:latin typeface="Courier New" panose="02070309020205020404" pitchFamily="49" charset="0"/>
+                <a:cs typeface="Courier New" panose="02070309020205020404" pitchFamily="49" charset="0"/>
+              </a:rPr>
+              <a:t>    led.turnOn();</a:t>
+            </a:r>
+          </a:p>
+          <a:p>
+            <a:endParaRPr lang="sk-SK" sz="1200" noProof="1" smtClean="0">
+              <a:latin typeface="Courier New" panose="02070309020205020404" pitchFamily="49" charset="0"/>
+              <a:cs typeface="Courier New" panose="02070309020205020404" pitchFamily="49" charset="0"/>
+            </a:endParaRPr>
+          </a:p>
+          <a:p>
+            <a:r>
+              <a:rPr lang="sk-SK" sz="1200" noProof="1" smtClean="0">
+                <a:latin typeface="Courier New" panose="02070309020205020404" pitchFamily="49" charset="0"/>
+                <a:cs typeface="Courier New" panose="02070309020205020404" pitchFamily="49" charset="0"/>
+              </a:rPr>
+              <a:t>    ...</a:t>
+            </a:r>
+          </a:p>
+          <a:p>
+            <a:endParaRPr lang="sk-SK" sz="1200" noProof="1" smtClean="0">
+              <a:latin typeface="Courier New" panose="02070309020205020404" pitchFamily="49" charset="0"/>
+              <a:cs typeface="Courier New" panose="02070309020205020404" pitchFamily="49" charset="0"/>
+            </a:endParaRPr>
+          </a:p>
+          <a:p>
+            <a:r>
+              <a:rPr lang="sk-SK" sz="1200" noProof="1" smtClean="0">
+                <a:latin typeface="Courier New" panose="02070309020205020404" pitchFamily="49" charset="0"/>
+                <a:cs typeface="Courier New" panose="02070309020205020404" pitchFamily="49" charset="0"/>
+              </a:rPr>
+              <a:t>}</a:t>
+            </a:r>
+            <a:endParaRPr lang="sk-SK" sz="1200" noProof="1" smtClean="0">
+              <a:latin typeface="Courier New" panose="02070309020205020404" pitchFamily="49" charset="0"/>
+              <a:cs typeface="Courier New" panose="02070309020205020404" pitchFamily="49" charset="0"/>
+            </a:endParaRPr>
+          </a:p>
+        </p:txBody>
+      </p:sp>
+      <p:cxnSp>
+        <p:nvCxnSpPr>
+          <p:cNvPr id="8" name="Rovná spojnica 7"/>
+          <p:cNvCxnSpPr>
+            <a:endCxn id="9" idx="2"/>
+          </p:cNvCxnSpPr>
+          <p:nvPr/>
+        </p:nvCxnSpPr>
+        <p:spPr>
+          <a:xfrm flipH="1" flipV="1">
+            <a:off x="747929" y="1067209"/>
+            <a:ext cx="999909" cy="528835"/>
+          </a:xfrm>
+          <a:prstGeom prst="line">
+            <a:avLst/>
+          </a:prstGeom>
+        </p:spPr>
+        <p:style>
+          <a:lnRef idx="1">
+            <a:schemeClr val="accent1"/>
+          </a:lnRef>
+          <a:fillRef idx="0">
+            <a:schemeClr val="accent1"/>
+          </a:fillRef>
+          <a:effectRef idx="0">
+            <a:schemeClr val="accent1"/>
+          </a:effectRef>
+          <a:fontRef idx="minor">
+            <a:schemeClr val="tx1"/>
+          </a:fontRef>
+        </p:style>
+      </p:cxnSp>
+      <p:sp>
+        <p:nvSpPr>
+          <p:cNvPr id="9" name="BlokTextu 8"/>
+          <p:cNvSpPr txBox="1"/>
+          <p:nvPr/>
+        </p:nvSpPr>
+        <p:spPr>
+          <a:xfrm>
+            <a:off x="268951" y="605544"/>
+            <a:ext cx="957955" cy="461665"/>
+          </a:xfrm>
+          <a:prstGeom prst="rect">
+            <a:avLst/>
+          </a:prstGeom>
+          <a:solidFill>
+            <a:schemeClr val="accent3">
+              <a:alpha val="50000"/>
+            </a:schemeClr>
+          </a:solidFill>
+          <a:ln>
+            <a:noFill/>
+          </a:ln>
+        </p:spPr>
+        <p:style>
+          <a:lnRef idx="0">
+            <a:scrgbClr r="0" g="0" b="0"/>
+          </a:lnRef>
+          <a:fillRef idx="0">
+            <a:scrgbClr r="0" g="0" b="0"/>
+          </a:fillRef>
+          <a:effectRef idx="0">
+            <a:scrgbClr r="0" g="0" b="0"/>
+          </a:effectRef>
+          <a:fontRef idx="minor">
+            <a:schemeClr val="lt1"/>
+          </a:fontRef>
+        </p:style>
+        <p:txBody>
+          <a:bodyPr wrap="none" rtlCol="0">
+            <a:spAutoFit/>
+          </a:bodyPr>
+          <a:lstStyle/>
+          <a:p>
+            <a:r>
+              <a:rPr lang="sk-SK" sz="1200" noProof="1" smtClean="0">
+                <a:solidFill>
+                  <a:schemeClr val="tx1"/>
+                </a:solidFill>
+              </a:rPr>
+              <a:t>Komponent:</a:t>
+            </a:r>
+          </a:p>
+          <a:p>
+            <a:r>
+              <a:rPr lang="sk-SK" sz="1200" b="1" noProof="1" smtClean="0">
+                <a:solidFill>
+                  <a:schemeClr val="tx1"/>
+                </a:solidFill>
+              </a:rPr>
+              <a:t>led</a:t>
+            </a:r>
+            <a:endParaRPr lang="sk-SK" sz="1200" b="1" noProof="1">
+              <a:solidFill>
+                <a:schemeClr val="tx1"/>
+              </a:solidFill>
+            </a:endParaRPr>
+          </a:p>
+        </p:txBody>
+      </p:sp>
+      <p:sp>
+        <p:nvSpPr>
+          <p:cNvPr id="13" name="BlokTextu 12"/>
+          <p:cNvSpPr txBox="1"/>
+          <p:nvPr/>
+        </p:nvSpPr>
+        <p:spPr>
+          <a:xfrm>
+            <a:off x="1543166" y="251300"/>
+            <a:ext cx="957955" cy="461665"/>
+          </a:xfrm>
+          <a:prstGeom prst="rect">
+            <a:avLst/>
+          </a:prstGeom>
+          <a:solidFill>
+            <a:schemeClr val="accent3">
+              <a:alpha val="50000"/>
+            </a:schemeClr>
+          </a:solidFill>
+          <a:ln>
+            <a:noFill/>
+          </a:ln>
+        </p:spPr>
+        <p:style>
+          <a:lnRef idx="0">
+            <a:scrgbClr r="0" g="0" b="0"/>
+          </a:lnRef>
+          <a:fillRef idx="0">
+            <a:scrgbClr r="0" g="0" b="0"/>
+          </a:fillRef>
+          <a:effectRef idx="0">
+            <a:scrgbClr r="0" g="0" b="0"/>
+          </a:effectRef>
+          <a:fontRef idx="minor">
+            <a:schemeClr val="lt1"/>
+          </a:fontRef>
+        </p:style>
+        <p:txBody>
+          <a:bodyPr wrap="none" rtlCol="0">
+            <a:spAutoFit/>
+          </a:bodyPr>
+          <a:lstStyle/>
+          <a:p>
+            <a:r>
+              <a:rPr lang="sk-SK" sz="1200" noProof="1" smtClean="0">
+                <a:solidFill>
+                  <a:schemeClr val="tx1"/>
+                </a:solidFill>
+              </a:rPr>
+              <a:t>Komponent:</a:t>
+            </a:r>
+          </a:p>
+          <a:p>
+            <a:r>
+              <a:rPr lang="sk-SK" sz="1200" b="1" noProof="1" smtClean="0">
+                <a:solidFill>
+                  <a:schemeClr val="tx1"/>
+                </a:solidFill>
+              </a:rPr>
+              <a:t>motor</a:t>
+            </a:r>
+            <a:endParaRPr lang="sk-SK" sz="1200" b="1" noProof="1">
+              <a:solidFill>
+                <a:schemeClr val="tx1"/>
+              </a:solidFill>
+            </a:endParaRPr>
+          </a:p>
+        </p:txBody>
+      </p:sp>
+      <p:sp>
+        <p:nvSpPr>
+          <p:cNvPr id="14" name="BlokTextu 13"/>
+          <p:cNvSpPr txBox="1"/>
+          <p:nvPr/>
+        </p:nvSpPr>
+        <p:spPr>
+          <a:xfrm>
+            <a:off x="2654358" y="483523"/>
+            <a:ext cx="1550424" cy="615553"/>
+          </a:xfrm>
+          <a:prstGeom prst="rect">
+            <a:avLst/>
+          </a:prstGeom>
+          <a:solidFill>
+            <a:schemeClr val="accent4">
+              <a:alpha val="50000"/>
+            </a:schemeClr>
+          </a:solidFill>
+          <a:ln>
+            <a:noFill/>
+          </a:ln>
+        </p:spPr>
+        <p:style>
+          <a:lnRef idx="0">
+            <a:scrgbClr r="0" g="0" b="0"/>
+          </a:lnRef>
+          <a:fillRef idx="0">
+            <a:scrgbClr r="0" g="0" b="0"/>
+          </a:fillRef>
+          <a:effectRef idx="0">
+            <a:scrgbClr r="0" g="0" b="0"/>
+          </a:effectRef>
+          <a:fontRef idx="minor">
+            <a:schemeClr val="lt1"/>
+          </a:fontRef>
+        </p:style>
+        <p:txBody>
+          <a:bodyPr wrap="none" rtlCol="0">
+            <a:spAutoFit/>
+          </a:bodyPr>
+          <a:lstStyle/>
+          <a:p>
+            <a:r>
+              <a:rPr lang="sk-SK" sz="1200" noProof="1" smtClean="0">
+                <a:solidFill>
+                  <a:schemeClr val="tx1"/>
+                </a:solidFill>
+              </a:rPr>
+              <a:t>Komponent:</a:t>
+            </a:r>
+          </a:p>
+          <a:p>
+            <a:r>
+              <a:rPr lang="sk-SK" sz="1200" b="1" noProof="1" smtClean="0">
+                <a:solidFill>
+                  <a:schemeClr val="tx1"/>
+                </a:solidFill>
+              </a:rPr>
+              <a:t>button</a:t>
+            </a:r>
+          </a:p>
+          <a:p>
+            <a:r>
+              <a:rPr lang="sk-SK" sz="1000" noProof="1" smtClean="0">
+                <a:solidFill>
+                  <a:schemeClr val="tx1"/>
+                </a:solidFill>
+              </a:rPr>
+              <a:t>Event: onButtonPressed()</a:t>
+            </a:r>
+            <a:endParaRPr lang="sk-SK" sz="1000" noProof="1">
+              <a:solidFill>
+                <a:schemeClr val="tx1"/>
+              </a:solidFill>
+            </a:endParaRPr>
+          </a:p>
+        </p:txBody>
+      </p:sp>
+      <p:cxnSp>
+        <p:nvCxnSpPr>
+          <p:cNvPr id="16" name="Rovná spojnica 15"/>
+          <p:cNvCxnSpPr>
+            <a:endCxn id="13" idx="2"/>
+          </p:cNvCxnSpPr>
+          <p:nvPr/>
+        </p:nvCxnSpPr>
+        <p:spPr>
+          <a:xfrm flipV="1">
+            <a:off x="2005800" y="712965"/>
+            <a:ext cx="16344" cy="883079"/>
+          </a:xfrm>
+          <a:prstGeom prst="line">
+            <a:avLst/>
+          </a:prstGeom>
+        </p:spPr>
+        <p:style>
+          <a:lnRef idx="1">
+            <a:schemeClr val="accent1"/>
+          </a:lnRef>
+          <a:fillRef idx="0">
+            <a:schemeClr val="accent1"/>
+          </a:fillRef>
+          <a:effectRef idx="0">
+            <a:schemeClr val="accent1"/>
+          </a:effectRef>
+          <a:fontRef idx="minor">
+            <a:schemeClr val="tx1"/>
+          </a:fontRef>
+        </p:style>
+      </p:cxnSp>
+      <p:cxnSp>
+        <p:nvCxnSpPr>
+          <p:cNvPr id="18" name="Rovná spojnica 17"/>
+          <p:cNvCxnSpPr>
+            <a:endCxn id="14" idx="2"/>
+          </p:cNvCxnSpPr>
+          <p:nvPr/>
+        </p:nvCxnSpPr>
+        <p:spPr>
+          <a:xfrm flipV="1">
+            <a:off x="2624138" y="1099076"/>
+            <a:ext cx="805432" cy="496968"/>
+          </a:xfrm>
+          <a:prstGeom prst="line">
+            <a:avLst/>
+          </a:prstGeom>
+        </p:spPr>
+        <p:style>
+          <a:lnRef idx="1">
+            <a:schemeClr val="accent1"/>
+          </a:lnRef>
+          <a:fillRef idx="0">
+            <a:schemeClr val="accent1"/>
+          </a:fillRef>
+          <a:effectRef idx="0">
+            <a:schemeClr val="accent1"/>
+          </a:effectRef>
+          <a:fontRef idx="minor">
+            <a:schemeClr val="tx1"/>
+          </a:fontRef>
+        </p:style>
+      </p:cxnSp>
+      <p:sp>
+        <p:nvSpPr>
+          <p:cNvPr id="15" name="BlokTextu 14"/>
+          <p:cNvSpPr txBox="1"/>
+          <p:nvPr/>
+        </p:nvSpPr>
+        <p:spPr>
+          <a:xfrm>
+            <a:off x="4375901" y="141282"/>
+            <a:ext cx="1071127" cy="276999"/>
+          </a:xfrm>
+          <a:prstGeom prst="rect">
+            <a:avLst/>
+          </a:prstGeom>
+          <a:noFill/>
+        </p:spPr>
+        <p:txBody>
+          <a:bodyPr wrap="none" rtlCol="0">
+            <a:spAutoFit/>
+          </a:bodyPr>
+          <a:lstStyle/>
+          <a:p>
+            <a:r>
+              <a:rPr lang="sk-SK" sz="1200" dirty="0" smtClean="0">
+                <a:latin typeface="Times New Roman" panose="02020603050405020304" pitchFamily="18" charset="0"/>
+                <a:cs typeface="Times New Roman" panose="02020603050405020304" pitchFamily="18" charset="0"/>
+              </a:rPr>
+              <a:t>Zdrojový kód:</a:t>
+            </a:r>
+            <a:endParaRPr lang="sk-SK" sz="1200" dirty="0">
+              <a:latin typeface="Times New Roman" panose="02020603050405020304" pitchFamily="18" charset="0"/>
+              <a:cs typeface="Times New Roman" panose="02020603050405020304" pitchFamily="18" charset="0"/>
+            </a:endParaRPr>
+          </a:p>
+        </p:txBody>
+      </p:sp>
+    </p:spTree>
+    <p:extLst>
+      <p:ext uri="{BB962C8B-B14F-4D97-AF65-F5344CB8AC3E}">
+        <p14:creationId xmlns:p14="http://schemas.microsoft.com/office/powerpoint/2010/main" val="1186540623"/>
+      </p:ext>
+    </p:extLst>
+  </p:cSld>
+  <p:clrMapOvr>
+    <a:masterClrMapping/>
+  </p:clrMapOvr>
+</p:sld>
+</file>
+
 <file path=ppt/theme/theme1.xml><?xml version="1.0" encoding="utf-8"?>
 <a:theme xmlns:a="http://schemas.openxmlformats.org/drawingml/2006/main" name="Motív balíka Office">
   <a:themeElements>

</xml_diff>